<commit_message>
Add presentation and thesis
</commit_message>
<xml_diff>
--- a/docs/presentation.pptx
+++ b/docs/presentation.pptx
@@ -1,11 +1,11 @@
 
 <file path=ppt/presentation.xml><?xml version="1.0" encoding="utf-8"?>
-<p:presentation xmlns:a="http://schemas.openxmlformats.org/drawingml/2006/main" xmlns:r="http://schemas.openxmlformats.org/officeDocument/2006/relationships" xmlns:p="http://schemas.openxmlformats.org/presentationml/2006/main" strictFirstAndLastChars="0" embedTrueTypeFonts="1" saveSubsetFonts="1" autoCompressPictures="0">
+<p:presentation xmlns:a="http://schemas.openxmlformats.org/drawingml/2006/main" xmlns:r="http://schemas.openxmlformats.org/officeDocument/2006/relationships" xmlns:p="http://schemas.openxmlformats.org/presentationml/2006/main" showSpecialPlsOnTitleSld="0" strictFirstAndLastChars="0" embedTrueTypeFonts="1" saveSubsetFonts="1" autoCompressPictures="0">
   <p:sldMasterIdLst>
     <p:sldMasterId id="2147483650" r:id="rId1"/>
   </p:sldMasterIdLst>
   <p:notesMasterIdLst>
-    <p:notesMasterId r:id="rId16"/>
+    <p:notesMasterId r:id="rId20"/>
   </p:notesMasterIdLst>
   <p:sldIdLst>
     <p:sldId id="256" r:id="rId2"/>
@@ -15,34 +15,38 @@
     <p:sldId id="260" r:id="rId6"/>
     <p:sldId id="261" r:id="rId7"/>
     <p:sldId id="262" r:id="rId8"/>
-    <p:sldId id="263" r:id="rId9"/>
-    <p:sldId id="264" r:id="rId10"/>
-    <p:sldId id="265" r:id="rId11"/>
-    <p:sldId id="266" r:id="rId12"/>
-    <p:sldId id="267" r:id="rId13"/>
-    <p:sldId id="268" r:id="rId14"/>
-    <p:sldId id="269" r:id="rId15"/>
+    <p:sldId id="264" r:id="rId9"/>
+    <p:sldId id="265" r:id="rId10"/>
+    <p:sldId id="266" r:id="rId11"/>
+    <p:sldId id="270" r:id="rId12"/>
+    <p:sldId id="274" r:id="rId13"/>
+    <p:sldId id="271" r:id="rId14"/>
+    <p:sldId id="272" r:id="rId15"/>
+    <p:sldId id="273" r:id="rId16"/>
+    <p:sldId id="268" r:id="rId17"/>
+    <p:sldId id="275" r:id="rId18"/>
+    <p:sldId id="276" r:id="rId19"/>
   </p:sldIdLst>
   <p:sldSz cx="9144000" cy="5143500" type="screen16x9"/>
   <p:notesSz cx="6858000" cy="9144000"/>
   <p:embeddedFontLst>
     <p:embeddedFont>
       <p:font typeface="Calibri" panose="020F0502020204030204" pitchFamily="34" charset="0"/>
-      <p:regular r:id="rId17"/>
-      <p:bold r:id="rId18"/>
-      <p:italic r:id="rId19"/>
-      <p:boldItalic r:id="rId20"/>
+      <p:regular r:id="rId21"/>
+      <p:bold r:id="rId22"/>
+      <p:italic r:id="rId23"/>
+      <p:boldItalic r:id="rId24"/>
     </p:embeddedFont>
     <p:embeddedFont>
       <p:font typeface="Cambria Math" panose="02040503050406030204" pitchFamily="18" charset="0"/>
-      <p:regular r:id="rId21"/>
+      <p:regular r:id="rId25"/>
     </p:embeddedFont>
     <p:embeddedFont>
       <p:font typeface="Open Sans" panose="020B0604020202020204" charset="0"/>
-      <p:regular r:id="rId22"/>
-      <p:bold r:id="rId23"/>
-      <p:italic r:id="rId24"/>
-      <p:boldItalic r:id="rId25"/>
+      <p:regular r:id="rId26"/>
+      <p:bold r:id="rId27"/>
+      <p:italic r:id="rId28"/>
+      <p:boldItalic r:id="rId29"/>
     </p:embeddedFont>
   </p:embeddedFontLst>
   <p:defaultTextStyle>
@@ -1491,7 +1495,7 @@
   <p:cSld>
     <p:spTree>
       <p:nvGrpSpPr>
-        <p:cNvPr id="1" name="Shape 19"/>
+        <p:cNvPr id="1" name="Shape 18"/>
         <p:cNvGrpSpPr/>
         <p:nvPr/>
       </p:nvGrpSpPr>
@@ -1505,7 +1509,7 @@
       </p:grpSpPr>
       <p:sp>
         <p:nvSpPr>
-          <p:cNvPr id="20" name="Google Shape;20;p3:notes"/>
+          <p:cNvPr id="19" name="Google Shape;19;p3:notes"/>
           <p:cNvSpPr txBox="1">
             <a:spLocks noGrp="1"/>
           </p:cNvSpPr>
@@ -1550,7 +1554,7 @@
       </p:sp>
       <p:sp>
         <p:nvSpPr>
-          <p:cNvPr id="21" name="Google Shape;21;p3:notes"/>
+          <p:cNvPr id="20" name="Google Shape;20;p3:notes"/>
           <p:cNvSpPr>
             <a:spLocks noGrp="1" noRot="1" noChangeAspect="1"/>
           </p:cNvSpPr>
@@ -1602,7 +1606,7 @@
   <p:cSld>
     <p:spTree>
       <p:nvGrpSpPr>
-        <p:cNvPr id="1" name="Shape 25"/>
+        <p:cNvPr id="1" name="Shape 24"/>
         <p:cNvGrpSpPr/>
         <p:nvPr/>
       </p:nvGrpSpPr>
@@ -1616,7 +1620,7 @@
       </p:grpSpPr>
       <p:sp>
         <p:nvSpPr>
-          <p:cNvPr id="26" name="Google Shape;26;g734a1437c2_0_53:notes"/>
+          <p:cNvPr id="25" name="Google Shape;25;g734a1437c2_0_53:notes"/>
           <p:cNvSpPr>
             <a:spLocks noGrp="1" noRot="1" noChangeAspect="1"/>
           </p:cNvSpPr>
@@ -1657,7 +1661,7 @@
       </p:sp>
       <p:sp>
         <p:nvSpPr>
-          <p:cNvPr id="27" name="Google Shape;27;g734a1437c2_0_53:notes"/>
+          <p:cNvPr id="26" name="Google Shape;26;g734a1437c2_0_53:notes"/>
           <p:cNvSpPr txBox="1">
             <a:spLocks noGrp="1"/>
           </p:cNvSpPr>
@@ -1706,7 +1710,7 @@
       </p:sp>
       <p:sp>
         <p:nvSpPr>
-          <p:cNvPr id="28" name="Google Shape;28;g734a1437c2_0_53:notes"/>
+          <p:cNvPr id="27" name="Google Shape;27;g734a1437c2_0_53:notes"/>
           <p:cNvSpPr txBox="1">
             <a:spLocks noGrp="1"/>
           </p:cNvSpPr>
@@ -2230,9 +2234,15 @@
       </p:sp>
       <p:sp>
         <p:nvSpPr>
-          <p:cNvPr id="18" name="Google Shape;18;p3"/>
+          <p:cNvPr id="4" name="Google Shape;18;p3">
+            <a:extLst>
+              <a:ext uri="{FF2B5EF4-FFF2-40B4-BE49-F238E27FC236}">
+                <a16:creationId xmlns:a16="http://schemas.microsoft.com/office/drawing/2014/main" id="{C26507C7-7E83-4535-8552-9E90CFD403E0}"/>
+              </a:ext>
+            </a:extLst>
+          </p:cNvPr>
           <p:cNvSpPr txBox="1"/>
-          <p:nvPr/>
+          <p:nvPr userDrawn="1"/>
         </p:nvSpPr>
         <p:spPr>
           <a:xfrm>
@@ -2275,7 +2285,7 @@
               <a:t>‹#›</a:t>
             </a:fld>
             <a:r>
-              <a:rPr lang="ru-RU">
+              <a:rPr lang="ru-RU" dirty="0">
                 <a:solidFill>
                   <a:srgbClr val="000000"/>
                 </a:solidFill>
@@ -2287,15 +2297,24 @@
               <a:t> /</a:t>
             </a:r>
             <a:r>
-              <a:rPr lang="ru-RU">
+              <a:rPr lang="ru-RU" dirty="0">
                 <a:latin typeface="Open Sans"/>
                 <a:ea typeface="Open Sans"/>
                 <a:cs typeface="Open Sans"/>
                 <a:sym typeface="Open Sans"/>
               </a:rPr>
-              <a:t> 14</a:t>
+              <a:t> 1</a:t>
             </a:r>
-            <a:endParaRPr>
+            <a:r>
+              <a:rPr lang="en-US" dirty="0">
+                <a:latin typeface="Open Sans"/>
+                <a:ea typeface="Open Sans"/>
+                <a:cs typeface="Open Sans"/>
+                <a:sym typeface="Open Sans"/>
+              </a:rPr>
+              <a:t>8</a:t>
+            </a:r>
+            <a:endParaRPr dirty="0">
               <a:latin typeface="Open Sans"/>
               <a:ea typeface="Open Sans"/>
               <a:cs typeface="Open Sans"/>
@@ -2531,7 +2550,7 @@
             </a:lvl9pPr>
           </a:lstStyle>
           <a:p>
-            <a:endParaRPr/>
+            <a:endParaRPr dirty="0"/>
           </a:p>
         </p:txBody>
       </p:sp>
@@ -2772,7 +2791,7 @@
             </a:lvl9pPr>
           </a:lstStyle>
           <a:p>
-            <a:endParaRPr/>
+            <a:endParaRPr dirty="0"/>
           </a:p>
         </p:txBody>
       </p:sp>
@@ -2783,7 +2802,7 @@
     <p:sldLayoutId id="2147483648" r:id="rId1"/>
     <p:sldLayoutId id="2147483649" r:id="rId2"/>
   </p:sldLayoutIdLst>
-  <p:hf hdr="0" ftr="0" dt="0"/>
+  <p:hf hdr="0" dt="0"/>
   <p:txStyles>
     <p:titleStyle>
       <a:defPPr marR="0" lvl="0" algn="l" rtl="0">
@@ -3494,7 +3513,7 @@
     </p:bg>
     <p:spTree>
       <p:nvGrpSpPr>
-        <p:cNvPr id="1" name="Shape 22"/>
+        <p:cNvPr id="1" name="Shape 21"/>
         <p:cNvGrpSpPr/>
         <p:nvPr/>
       </p:nvGrpSpPr>
@@ -3511,7 +3530,7 @@
           <p:cNvPr id="4" name="Google Shape;23;p4">
             <a:extLst>
               <a:ext uri="{FF2B5EF4-FFF2-40B4-BE49-F238E27FC236}">
-                <a16:creationId xmlns:a16="http://schemas.microsoft.com/office/drawing/2014/main" id="{CAF34C3E-6701-47D9-8F7C-CDE282980AA8}"/>
+                <a16:creationId xmlns:a16="http://schemas.microsoft.com/office/drawing/2014/main" id="{89EAC3E1-137D-412B-A14D-3680C0C0B26A}"/>
               </a:ext>
             </a:extLst>
           </p:cNvPr>
@@ -3787,18 +3806,29 @@
           <a:p>
             <a:pPr algn="ctr"/>
             <a:r>
-              <a:rPr lang="ru-RU" sz="2400">
+              <a:rPr lang="ru-RU" sz="2400" dirty="0">
                 <a:solidFill>
                   <a:schemeClr val="bg1"/>
                 </a:solidFill>
               </a:rPr>
-              <a:t>Протоколы множественного доступа на основе графовых кодов для применения в сетях связи автономных транспортных средств</a:t>
+              <a:t>Протоколы множественного доступа на основе </a:t>
             </a:r>
-            <a:endParaRPr lang="ru-RU" sz="2400" dirty="0">
-              <a:solidFill>
-                <a:schemeClr val="bg1"/>
-              </a:solidFill>
-            </a:endParaRPr>
+            <a:r>
+              <a:rPr lang="ru-RU" sz="2400" dirty="0" err="1">
+                <a:solidFill>
+                  <a:schemeClr val="bg1"/>
+                </a:solidFill>
+              </a:rPr>
+              <a:t>графовых</a:t>
+            </a:r>
+            <a:r>
+              <a:rPr lang="ru-RU" sz="2400" dirty="0">
+                <a:solidFill>
+                  <a:schemeClr val="bg1"/>
+                </a:solidFill>
+              </a:rPr>
+              <a:t> кодов для применения в сетях связи автономных транспортных средств</a:t>
+            </a:r>
           </a:p>
         </p:txBody>
       </p:sp>
@@ -3807,7 +3837,7 @@
           <p:cNvPr id="5" name="Google Shape;24;p4">
             <a:extLst>
               <a:ext uri="{FF2B5EF4-FFF2-40B4-BE49-F238E27FC236}">
-                <a16:creationId xmlns:a16="http://schemas.microsoft.com/office/drawing/2014/main" id="{42E2BF64-3DD7-4A56-A4C5-E2FBCDB4F78D}"/>
+                <a16:creationId xmlns:a16="http://schemas.microsoft.com/office/drawing/2014/main" id="{CB89C682-F585-45FD-94D9-696A7E87128F}"/>
               </a:ext>
             </a:extLst>
           </p:cNvPr>
@@ -4093,14 +4123,14 @@
               <a:buNone/>
             </a:pPr>
             <a:r>
-              <a:rPr lang="ru-RU" sz="1800">
+              <a:rPr lang="ru-RU" sz="1800" dirty="0">
                 <a:solidFill>
                   <a:schemeClr val="lt1"/>
                 </a:solidFill>
               </a:rPr>
               <a:t>Галкин Егор Георгиевич, M3435</a:t>
             </a:r>
-            <a:endParaRPr lang="ru-RU">
+            <a:endParaRPr lang="ru-RU" dirty="0">
               <a:solidFill>
                 <a:schemeClr val="lt1"/>
               </a:solidFill>
@@ -4119,18 +4149,100 @@
               <a:buNone/>
             </a:pPr>
             <a:r>
-              <a:rPr lang="ru-RU" sz="1800">
+              <a:rPr lang="ru-RU" sz="1800" dirty="0">
                 <a:solidFill>
                   <a:schemeClr val="lt1"/>
                 </a:solidFill>
               </a:rPr>
-              <a:t>Научный руководитель: Бочарова И.Е., к.т.н, доцент ФИТиП</a:t>
+              <a:t>Научный руководитель: </a:t>
+            </a:r>
+            <a:r>
+              <a:rPr lang="ru-RU" sz="1800" dirty="0" err="1">
+                <a:solidFill>
+                  <a:schemeClr val="lt1"/>
+                </a:solidFill>
+              </a:rPr>
+              <a:t>Бочарова</a:t>
+            </a:r>
+            <a:r>
+              <a:rPr lang="ru-RU" sz="1800" dirty="0">
+                <a:solidFill>
+                  <a:schemeClr val="lt1"/>
+                </a:solidFill>
+              </a:rPr>
+              <a:t> И.Е., </a:t>
+            </a:r>
+            <a:r>
+              <a:rPr lang="ru-RU" sz="1800" dirty="0" err="1">
+                <a:solidFill>
+                  <a:schemeClr val="lt1"/>
+                </a:solidFill>
+              </a:rPr>
+              <a:t>к.т.н</a:t>
+            </a:r>
+            <a:r>
+              <a:rPr lang="ru-RU" sz="1800" dirty="0">
+                <a:solidFill>
+                  <a:schemeClr val="lt1"/>
+                </a:solidFill>
+              </a:rPr>
+              <a:t>, доцент </a:t>
+            </a:r>
+            <a:r>
+              <a:rPr lang="ru-RU" sz="1800" dirty="0" err="1">
+                <a:solidFill>
+                  <a:schemeClr val="lt1"/>
+                </a:solidFill>
+              </a:rPr>
+              <a:t>ФИТиП</a:t>
             </a:r>
             <a:endParaRPr lang="ru-RU" dirty="0">
               <a:solidFill>
                 <a:schemeClr val="lt1"/>
               </a:solidFill>
             </a:endParaRPr>
+          </a:p>
+        </p:txBody>
+      </p:sp>
+      <p:sp>
+        <p:nvSpPr>
+          <p:cNvPr id="3" name="TextBox 2">
+            <a:extLst>
+              <a:ext uri="{FF2B5EF4-FFF2-40B4-BE49-F238E27FC236}">
+                <a16:creationId xmlns:a16="http://schemas.microsoft.com/office/drawing/2014/main" id="{679F2004-399C-4874-B19A-FCA20083909F}"/>
+              </a:ext>
+            </a:extLst>
+          </p:cNvPr>
+          <p:cNvSpPr txBox="1"/>
+          <p:nvPr/>
+        </p:nvSpPr>
+        <p:spPr>
+          <a:xfrm>
+            <a:off x="3174822" y="1206298"/>
+            <a:ext cx="2794355" cy="307777"/>
+          </a:xfrm>
+          <a:prstGeom prst="rect">
+            <a:avLst/>
+          </a:prstGeom>
+          <a:noFill/>
+        </p:spPr>
+        <p:txBody>
+          <a:bodyPr wrap="none" rtlCol="0">
+            <a:spAutoFit/>
+          </a:bodyPr>
+          <a:lstStyle/>
+          <a:p>
+            <a:r>
+              <a:rPr lang="ru-RU" dirty="0">
+                <a:solidFill>
+                  <a:schemeClr val="bg1"/>
+                </a:solidFill>
+                <a:latin typeface="Open Sans" panose="020B0604020202020204" charset="0"/>
+                <a:ea typeface="Open Sans" panose="020B0604020202020204" charset="0"/>
+                <a:cs typeface="Open Sans" panose="020B0604020202020204" charset="0"/>
+              </a:rPr>
+              <a:t>Бакалаврская работа на тему:</a:t>
+            </a:r>
           </a:p>
         </p:txBody>
       </p:sp>
@@ -4159,363 +4271,12 @@
           <a:chExt cx="0" cy="0"/>
         </a:xfrm>
       </p:grpSpPr>
-      <mc:AlternateContent xmlns:mc="http://schemas.openxmlformats.org/markup-compatibility/2006">
-        <mc:Choice xmlns:a14="http://schemas.microsoft.com/office/drawing/2010/main" Requires="a14">
-          <p:sp>
-            <p:nvSpPr>
-              <p:cNvPr id="4" name="Текст 1">
-                <a:extLst>
-                  <a:ext uri="{FF2B5EF4-FFF2-40B4-BE49-F238E27FC236}">
-                    <a16:creationId xmlns:a16="http://schemas.microsoft.com/office/drawing/2014/main" id="{DF962066-38F3-4DD1-ABD9-6312A87C35AF}"/>
-                  </a:ext>
-                </a:extLst>
-              </p:cNvPr>
-              <p:cNvSpPr>
-                <a:spLocks noGrp="1"/>
-              </p:cNvSpPr>
-              <p:nvPr>
-                <p:ph type="body" idx="1"/>
-              </p:nvPr>
-            </p:nvSpPr>
-            <p:spPr>
-              <a:xfrm>
-                <a:off x="313058" y="1394786"/>
-                <a:ext cx="8520416" cy="3195216"/>
-              </a:xfrm>
-            </p:spPr>
-            <p:txBody>
-              <a:bodyPr/>
-              <a:lstStyle/>
-              <a:p>
-                <a:pPr marL="88900" indent="0">
-                  <a:buNone/>
-                </a:pPr>
-                <a:r>
-                  <a:rPr lang="ru-RU" sz="1400" dirty="0"/>
-                  <a:t>Декодирование в двоичном канале со стираниями сводится к решению системы линейных уравнений. В итоге мы получаем сложность алгоритма равную </a:t>
-                </a:r>
-                <a14:m>
-                  <m:oMath xmlns:m="http://schemas.openxmlformats.org/officeDocument/2006/math">
-                    <m:r>
-                      <a:rPr lang="en-US" sz="1400" b="0" i="1" smtClean="0">
-                        <a:latin typeface="Cambria Math" panose="02040503050406030204" pitchFamily="18" charset="0"/>
-                      </a:rPr>
-                      <m:t>𝑂</m:t>
-                    </m:r>
-                    <m:d>
-                      <m:dPr>
-                        <m:ctrlPr>
-                          <a:rPr lang="en-US" sz="1400" b="0" i="1" smtClean="0">
-                            <a:latin typeface="Cambria Math" panose="02040503050406030204" pitchFamily="18" charset="0"/>
-                          </a:rPr>
-                        </m:ctrlPr>
-                      </m:dPr>
-                      <m:e>
-                        <m:sSup>
-                          <m:sSupPr>
-                            <m:ctrlPr>
-                              <a:rPr lang="en-US" sz="1400" b="0" i="1" smtClean="0">
-                                <a:latin typeface="Cambria Math" panose="02040503050406030204" pitchFamily="18" charset="0"/>
-                              </a:rPr>
-                            </m:ctrlPr>
-                          </m:sSupPr>
-                          <m:e>
-                            <m:r>
-                              <a:rPr lang="en-US" sz="1400" b="0" i="1" smtClean="0">
-                                <a:latin typeface="Cambria Math" panose="02040503050406030204" pitchFamily="18" charset="0"/>
-                              </a:rPr>
-                              <m:t>𝑣</m:t>
-                            </m:r>
-                          </m:e>
-                          <m:sup>
-                            <m:r>
-                              <a:rPr lang="en-US" sz="1400" b="0" i="1" smtClean="0">
-                                <a:latin typeface="Cambria Math" panose="02040503050406030204" pitchFamily="18" charset="0"/>
-                              </a:rPr>
-                              <m:t>3</m:t>
-                            </m:r>
-                          </m:sup>
-                        </m:sSup>
-                      </m:e>
-                    </m:d>
-                  </m:oMath>
-                </a14:m>
-                <a:r>
-                  <a:rPr lang="en-US" sz="1400" dirty="0"/>
-                  <a:t>, </a:t>
-                </a:r>
-                <a:r>
-                  <a:rPr lang="ru-RU" sz="1400" dirty="0"/>
-                  <a:t>что значительно лучше алгоритма </a:t>
-                </a:r>
-                <a:r>
-                  <a:rPr lang="ru-RU" sz="1400" dirty="0" err="1"/>
-                  <a:t>Витерби</a:t>
-                </a:r>
-                <a:r>
-                  <a:rPr lang="ru-RU" sz="1400" dirty="0"/>
-                  <a:t> для </a:t>
-                </a:r>
-                <a:r>
-                  <a:rPr lang="ru-RU" sz="1400" dirty="0" err="1"/>
-                  <a:t>сверточных</a:t>
-                </a:r>
-                <a:r>
-                  <a:rPr lang="ru-RU" sz="1400" dirty="0"/>
-                  <a:t> кодов. Для декодирования будет использоваться проверочная матрица .</a:t>
-                </a:r>
-              </a:p>
-              <a:p>
-                <a:pPr marL="88900" indent="0">
-                  <a:buNone/>
-                </a:pPr>
-                <a:endParaRPr lang="ru-RU" sz="1400" dirty="0"/>
-              </a:p>
-              <a:p>
-                <a:pPr marL="88900" indent="0">
-                  <a:buNone/>
-                </a:pPr>
-                <a14:m>
-                  <m:oMathPara xmlns:m="http://schemas.openxmlformats.org/officeDocument/2006/math">
-                    <m:oMathParaPr>
-                      <m:jc m:val="centerGroup"/>
-                    </m:oMathParaPr>
-                    <m:oMath xmlns:m="http://schemas.openxmlformats.org/officeDocument/2006/math">
-                      <m:r>
-                        <a:rPr lang="en-US" sz="1400" b="0" i="1" smtClean="0">
-                          <a:latin typeface="Cambria Math" panose="02040503050406030204" pitchFamily="18" charset="0"/>
-                        </a:rPr>
-                        <m:t>𝐻</m:t>
-                      </m:r>
-                      <m:r>
-                        <a:rPr lang="en-US" sz="1400" b="0" i="1" smtClean="0">
-                          <a:latin typeface="Cambria Math" panose="02040503050406030204" pitchFamily="18" charset="0"/>
-                        </a:rPr>
-                        <m:t>= </m:t>
-                      </m:r>
-                      <m:d>
-                        <m:dPr>
-                          <m:ctrlPr>
-                            <a:rPr lang="en-US" sz="1400" b="0" i="1" smtClean="0">
-                              <a:latin typeface="Cambria Math" panose="02040503050406030204" pitchFamily="18" charset="0"/>
-                            </a:rPr>
-                          </m:ctrlPr>
-                        </m:dPr>
-                        <m:e>
-                          <m:m>
-                            <m:mPr>
-                              <m:mcs>
-                                <m:mc>
-                                  <m:mcPr>
-                                    <m:count m:val="4"/>
-                                    <m:mcJc m:val="center"/>
-                                  </m:mcPr>
-                                </m:mc>
-                              </m:mcs>
-                              <m:ctrlPr>
-                                <a:rPr lang="en-US" sz="1400" b="0" i="1" smtClean="0">
-                                  <a:latin typeface="Cambria Math" panose="02040503050406030204" pitchFamily="18" charset="0"/>
-                                </a:rPr>
-                              </m:ctrlPr>
-                            </m:mPr>
-                            <m:mr>
-                              <m:e>
-                                <m:r>
-                                  <m:rPr>
-                                    <m:brk m:alnAt="7"/>
-                                  </m:rPr>
-                                  <a:rPr lang="en-US" sz="1400" b="0" i="1" smtClean="0">
-                                    <a:latin typeface="Cambria Math" panose="02040503050406030204" pitchFamily="18" charset="0"/>
-                                  </a:rPr>
-                                  <m:t>1</m:t>
-                                </m:r>
-                                <m:r>
-                                  <a:rPr lang="en-US" sz="1400" b="0" i="1" smtClean="0">
-                                    <a:latin typeface="Cambria Math" panose="02040503050406030204" pitchFamily="18" charset="0"/>
-                                  </a:rPr>
-                                  <m:t>+</m:t>
-                                </m:r>
-                                <m:r>
-                                  <a:rPr lang="en-US" sz="1400" b="0" i="1" smtClean="0">
-                                    <a:latin typeface="Cambria Math" panose="02040503050406030204" pitchFamily="18" charset="0"/>
-                                  </a:rPr>
-                                  <m:t>𝐷</m:t>
-                                </m:r>
-                                <m:r>
-                                  <a:rPr lang="en-US" sz="1400" b="0" i="1" smtClean="0">
-                                    <a:latin typeface="Cambria Math" panose="02040503050406030204" pitchFamily="18" charset="0"/>
-                                  </a:rPr>
-                                  <m:t>+</m:t>
-                                </m:r>
-                                <m:sSup>
-                                  <m:sSupPr>
-                                    <m:ctrlPr>
-                                      <a:rPr lang="en-US" sz="1400" b="0" i="1" smtClean="0">
-                                        <a:latin typeface="Cambria Math" panose="02040503050406030204" pitchFamily="18" charset="0"/>
-                                      </a:rPr>
-                                    </m:ctrlPr>
-                                  </m:sSupPr>
-                                  <m:e>
-                                    <m:r>
-                                      <a:rPr lang="en-US" sz="1400" b="0" i="1" smtClean="0">
-                                        <a:latin typeface="Cambria Math" panose="02040503050406030204" pitchFamily="18" charset="0"/>
-                                      </a:rPr>
-                                      <m:t>𝐷</m:t>
-                                    </m:r>
-                                  </m:e>
-                                  <m:sup>
-                                    <m:r>
-                                      <a:rPr lang="en-US" sz="1400" b="0" i="1" smtClean="0">
-                                        <a:latin typeface="Cambria Math" panose="02040503050406030204" pitchFamily="18" charset="0"/>
-                                      </a:rPr>
-                                      <m:t>2</m:t>
-                                    </m:r>
-                                  </m:sup>
-                                </m:sSup>
-                              </m:e>
-                              <m:e>
-                                <m:r>
-                                  <a:rPr lang="en-US" sz="1400" b="0" i="1" smtClean="0">
-                                    <a:latin typeface="Cambria Math" panose="02040503050406030204" pitchFamily="18" charset="0"/>
-                                  </a:rPr>
-                                  <m:t>1+</m:t>
-                                </m:r>
-                                <m:sSup>
-                                  <m:sSupPr>
-                                    <m:ctrlPr>
-                                      <a:rPr lang="en-US" sz="1400" b="0" i="1" smtClean="0">
-                                        <a:latin typeface="Cambria Math" panose="02040503050406030204" pitchFamily="18" charset="0"/>
-                                      </a:rPr>
-                                    </m:ctrlPr>
-                                  </m:sSupPr>
-                                  <m:e>
-                                    <m:r>
-                                      <a:rPr lang="en-US" sz="1400" b="0" i="1" smtClean="0">
-                                        <a:latin typeface="Cambria Math" panose="02040503050406030204" pitchFamily="18" charset="0"/>
-                                      </a:rPr>
-                                      <m:t>𝐷</m:t>
-                                    </m:r>
-                                  </m:e>
-                                  <m:sup>
-                                    <m:r>
-                                      <a:rPr lang="en-US" sz="1400" b="0" i="1" smtClean="0">
-                                        <a:latin typeface="Cambria Math" panose="02040503050406030204" pitchFamily="18" charset="0"/>
-                                      </a:rPr>
-                                      <m:t>2</m:t>
-                                    </m:r>
-                                  </m:sup>
-                                </m:sSup>
-                              </m:e>
-                              <m:e>
-                                <m:r>
-                                  <a:rPr lang="en-US" sz="1400" b="0" i="1" smtClean="0">
-                                    <a:latin typeface="Cambria Math" panose="02040503050406030204" pitchFamily="18" charset="0"/>
-                                  </a:rPr>
-                                  <m:t>1+</m:t>
-                                </m:r>
-                                <m:r>
-                                  <a:rPr lang="en-US" sz="1400" b="0" i="1" smtClean="0">
-                                    <a:latin typeface="Cambria Math" panose="02040503050406030204" pitchFamily="18" charset="0"/>
-                                  </a:rPr>
-                                  <m:t>𝐷</m:t>
-                                </m:r>
-                              </m:e>
-                              <m:e>
-                                <m:r>
-                                  <a:rPr lang="en-US" sz="1400" b="0" i="1" smtClean="0">
-                                    <a:latin typeface="Cambria Math" panose="02040503050406030204" pitchFamily="18" charset="0"/>
-                                  </a:rPr>
-                                  <m:t>1</m:t>
-                                </m:r>
-                              </m:e>
-                            </m:mr>
-                          </m:m>
-                        </m:e>
-                      </m:d>
-                    </m:oMath>
-                  </m:oMathPara>
-                </a14:m>
-                <a:endParaRPr lang="en-US" sz="1400" dirty="0"/>
-              </a:p>
-              <a:p>
-                <a:pPr marL="88900" indent="0">
-                  <a:buNone/>
-                </a:pPr>
-                <a:r>
-                  <a:rPr lang="ru-RU" sz="1400" dirty="0"/>
-                  <a:t>Разложив эту матрицу по степеням </a:t>
-                </a:r>
-                <a:r>
-                  <a:rPr lang="en-US" sz="1400" dirty="0"/>
-                  <a:t>D, </a:t>
-                </a:r>
-                <a:r>
-                  <a:rPr lang="ru-RU" sz="1400" dirty="0"/>
-                  <a:t>получим </a:t>
-                </a:r>
-                <a:r>
-                  <a:rPr lang="ru-RU" sz="1400" dirty="0" err="1"/>
-                  <a:t>получбесконечную</a:t>
-                </a:r>
-                <a:r>
-                  <a:rPr lang="ru-RU" sz="1400" dirty="0"/>
-                  <a:t> матрицу, из которой мы возьмем только определенную подматрицу, использующуюся в процессе декодирования.</a:t>
-                </a:r>
-                <a:endParaRPr lang="en-US" sz="1400" dirty="0"/>
-              </a:p>
-            </p:txBody>
-          </p:sp>
-        </mc:Choice>
-        <mc:Fallback>
-          <p:sp>
-            <p:nvSpPr>
-              <p:cNvPr id="4" name="Текст 1">
-                <a:extLst>
-                  <a:ext uri="{FF2B5EF4-FFF2-40B4-BE49-F238E27FC236}">
-                    <a16:creationId xmlns:a16="http://schemas.microsoft.com/office/drawing/2014/main" id="{DF962066-38F3-4DD1-ABD9-6312A87C35AF}"/>
-                  </a:ext>
-                </a:extLst>
-              </p:cNvPr>
-              <p:cNvSpPr>
-                <a:spLocks noGrp="1" noRot="1" noChangeAspect="1" noMove="1" noResize="1" noEditPoints="1" noAdjustHandles="1" noChangeArrowheads="1" noChangeShapeType="1" noTextEdit="1"/>
-              </p:cNvSpPr>
-              <p:nvPr>
-                <p:ph type="body" idx="1"/>
-              </p:nvPr>
-            </p:nvSpPr>
-            <p:spPr>
-              <a:xfrm>
-                <a:off x="313058" y="1394786"/>
-                <a:ext cx="8520416" cy="3195216"/>
-              </a:xfrm>
-              <a:blipFill>
-                <a:blip r:embed="rId2"/>
-                <a:stretch>
-                  <a:fillRect r="-143"/>
-                </a:stretch>
-              </a:blipFill>
-            </p:spPr>
-            <p:txBody>
-              <a:bodyPr/>
-              <a:lstStyle/>
-              <a:p>
-                <a:r>
-                  <a:rPr lang="ru-RU">
-                    <a:noFill/>
-                  </a:rPr>
-                  <a:t> </a:t>
-                </a:r>
-              </a:p>
-            </p:txBody>
-          </p:sp>
-        </mc:Fallback>
-      </mc:AlternateContent>
       <p:sp>
         <p:nvSpPr>
-          <p:cNvPr id="5" name="Заголовок 2">
+          <p:cNvPr id="3" name="Заголовок 2">
             <a:extLst>
               <a:ext uri="{FF2B5EF4-FFF2-40B4-BE49-F238E27FC236}">
-                <a16:creationId xmlns:a16="http://schemas.microsoft.com/office/drawing/2014/main" id="{CE210E7C-38C7-4F3A-B2D0-D385B978BF76}"/>
+                <a16:creationId xmlns:a16="http://schemas.microsoft.com/office/drawing/2014/main" id="{1FF63A0E-AF68-42AB-A1F4-F992DB0FB6BF}"/>
               </a:ext>
             </a:extLst>
           </p:cNvPr>
@@ -4526,12 +4287,7 @@
             <p:ph type="title"/>
           </p:nvPr>
         </p:nvSpPr>
-        <p:spPr>
-          <a:xfrm>
-            <a:off x="297295" y="553498"/>
-            <a:ext cx="8536179" cy="620483"/>
-          </a:xfrm>
-        </p:spPr>
+        <p:spPr/>
         <p:txBody>
           <a:bodyPr/>
           <a:lstStyle/>
@@ -4543,44 +4299,14 @@
           </a:p>
         </p:txBody>
       </p:sp>
-    </p:spTree>
-    <p:extLst>
-      <p:ext uri="{BB962C8B-B14F-4D97-AF65-F5344CB8AC3E}">
-        <p14:creationId xmlns:p14="http://schemas.microsoft.com/office/powerpoint/2010/main" val="3488243067"/>
-      </p:ext>
-    </p:extLst>
-  </p:cSld>
-  <p:clrMapOvr>
-    <a:masterClrMapping/>
-  </p:clrMapOvr>
-</p:sld>
-</file>
-
-<file path=ppt/slides/slide11.xml><?xml version="1.0" encoding="utf-8"?>
-<p:sld xmlns:a="http://schemas.openxmlformats.org/drawingml/2006/main" xmlns:r="http://schemas.openxmlformats.org/officeDocument/2006/relationships" xmlns:p="http://schemas.openxmlformats.org/presentationml/2006/main">
-  <p:cSld>
-    <p:spTree>
-      <p:nvGrpSpPr>
-        <p:cNvPr id="1" name=""/>
-        <p:cNvGrpSpPr/>
-        <p:nvPr/>
-      </p:nvGrpSpPr>
-      <p:grpSpPr>
-        <a:xfrm>
-          <a:off x="0" y="0"/>
-          <a:ext cx="0" cy="0"/>
-          <a:chOff x="0" y="0"/>
-          <a:chExt cx="0" cy="0"/>
-        </a:xfrm>
-      </p:grpSpPr>
       <mc:AlternateContent xmlns:mc="http://schemas.openxmlformats.org/markup-compatibility/2006">
         <mc:Choice xmlns:a14="http://schemas.microsoft.com/office/drawing/2010/main" Requires="a14">
           <p:sp>
             <p:nvSpPr>
-              <p:cNvPr id="6" name="Текст 1">
+              <p:cNvPr id="4" name="Текст 1">
                 <a:extLst>
                   <a:ext uri="{FF2B5EF4-FFF2-40B4-BE49-F238E27FC236}">
-                    <a16:creationId xmlns:a16="http://schemas.microsoft.com/office/drawing/2014/main" id="{9349B38C-C70C-4CC0-9BEF-823332F0D8E3}"/>
+                    <a16:creationId xmlns:a16="http://schemas.microsoft.com/office/drawing/2014/main" id="{604BFE34-3014-44D2-AD3C-C84FCBC14C80}"/>
                   </a:ext>
                 </a:extLst>
               </p:cNvPr>
@@ -4870,10 +4596,10 @@
         <mc:Fallback>
           <p:sp>
             <p:nvSpPr>
-              <p:cNvPr id="6" name="Текст 1">
+              <p:cNvPr id="4" name="Текст 1">
                 <a:extLst>
                   <a:ext uri="{FF2B5EF4-FFF2-40B4-BE49-F238E27FC236}">
-                    <a16:creationId xmlns:a16="http://schemas.microsoft.com/office/drawing/2014/main" id="{9349B38C-C70C-4CC0-9BEF-823332F0D8E3}"/>
+                    <a16:creationId xmlns:a16="http://schemas.microsoft.com/office/drawing/2014/main" id="{604BFE34-3014-44D2-AD3C-C84FCBC14C80}"/>
                   </a:ext>
                 </a:extLst>
               </p:cNvPr>
@@ -4911,12 +4637,42 @@
           </p:sp>
         </mc:Fallback>
       </mc:AlternateContent>
+    </p:spTree>
+    <p:extLst>
+      <p:ext uri="{BB962C8B-B14F-4D97-AF65-F5344CB8AC3E}">
+        <p14:creationId xmlns:p14="http://schemas.microsoft.com/office/powerpoint/2010/main" val="833839303"/>
+      </p:ext>
+    </p:extLst>
+  </p:cSld>
+  <p:clrMapOvr>
+    <a:masterClrMapping/>
+  </p:clrMapOvr>
+</p:sld>
+</file>
+
+<file path=ppt/slides/slide11.xml><?xml version="1.0" encoding="utf-8"?>
+<p:sld xmlns:a="http://schemas.openxmlformats.org/drawingml/2006/main" xmlns:r="http://schemas.openxmlformats.org/officeDocument/2006/relationships" xmlns:p="http://schemas.openxmlformats.org/presentationml/2006/main">
+  <p:cSld>
+    <p:spTree>
+      <p:nvGrpSpPr>
+        <p:cNvPr id="1" name=""/>
+        <p:cNvGrpSpPr/>
+        <p:nvPr/>
+      </p:nvGrpSpPr>
+      <p:grpSpPr>
+        <a:xfrm>
+          <a:off x="0" y="0"/>
+          <a:ext cx="0" cy="0"/>
+          <a:chOff x="0" y="0"/>
+          <a:chExt cx="0" cy="0"/>
+        </a:xfrm>
+      </p:grpSpPr>
       <p:sp>
         <p:nvSpPr>
-          <p:cNvPr id="7" name="Заголовок 2">
+          <p:cNvPr id="3" name="Заголовок 2">
             <a:extLst>
               <a:ext uri="{FF2B5EF4-FFF2-40B4-BE49-F238E27FC236}">
-                <a16:creationId xmlns:a16="http://schemas.microsoft.com/office/drawing/2014/main" id="{3FC9FBEC-BAD4-4B74-BDEC-82663D5652BC}"/>
+                <a16:creationId xmlns:a16="http://schemas.microsoft.com/office/drawing/2014/main" id="{F2FAFBAB-C11A-4897-8512-550745EA2BAC}"/>
               </a:ext>
             </a:extLst>
           </p:cNvPr>
@@ -4927,27 +4683,370 @@
             <p:ph type="title"/>
           </p:nvPr>
         </p:nvSpPr>
-        <p:spPr>
-          <a:xfrm>
-            <a:off x="297295" y="553498"/>
-            <a:ext cx="8536179" cy="620483"/>
-          </a:xfrm>
-        </p:spPr>
+        <p:spPr/>
         <p:txBody>
           <a:bodyPr/>
           <a:lstStyle/>
           <a:p>
             <a:r>
               <a:rPr lang="ru-RU" dirty="0"/>
-              <a:t>Декодирование</a:t>
+              <a:t>Тестирование</a:t>
             </a:r>
           </a:p>
         </p:txBody>
       </p:sp>
+      <p:pic>
+        <p:nvPicPr>
+          <p:cNvPr id="5" name="Рисунок 4">
+            <a:extLst>
+              <a:ext uri="{FF2B5EF4-FFF2-40B4-BE49-F238E27FC236}">
+                <a16:creationId xmlns:a16="http://schemas.microsoft.com/office/drawing/2014/main" id="{C14CA6E3-1D44-4625-9EB3-6FA8B6010E30}"/>
+              </a:ext>
+            </a:extLst>
+          </p:cNvPr>
+          <p:cNvPicPr>
+            <a:picLocks noChangeAspect="1"/>
+          </p:cNvPicPr>
+          <p:nvPr/>
+        </p:nvPicPr>
+        <p:blipFill>
+          <a:blip r:embed="rId2"/>
+          <a:stretch>
+            <a:fillRect/>
+          </a:stretch>
+        </p:blipFill>
+        <p:spPr>
+          <a:xfrm>
+            <a:off x="927099" y="1409697"/>
+            <a:ext cx="3098802" cy="2324102"/>
+          </a:xfrm>
+          <a:prstGeom prst="rect">
+            <a:avLst/>
+          </a:prstGeom>
+        </p:spPr>
+      </p:pic>
+      <mc:AlternateContent xmlns:mc="http://schemas.openxmlformats.org/markup-compatibility/2006">
+        <mc:Choice xmlns:a14="http://schemas.microsoft.com/office/drawing/2010/main" Requires="a14">
+          <p:sp>
+            <p:nvSpPr>
+              <p:cNvPr id="8" name="TextBox 7">
+                <a:extLst>
+                  <a:ext uri="{FF2B5EF4-FFF2-40B4-BE49-F238E27FC236}">
+                    <a16:creationId xmlns:a16="http://schemas.microsoft.com/office/drawing/2014/main" id="{98D333F5-0CAC-49AA-BC0D-5928632D8291}"/>
+                  </a:ext>
+                </a:extLst>
+              </p:cNvPr>
+              <p:cNvSpPr txBox="1"/>
+              <p:nvPr/>
+            </p:nvSpPr>
+            <p:spPr>
+              <a:xfrm>
+                <a:off x="1512617" y="3733799"/>
+                <a:ext cx="1927771" cy="266483"/>
+              </a:xfrm>
+              <a:prstGeom prst="rect">
+                <a:avLst/>
+              </a:prstGeom>
+              <a:noFill/>
+            </p:spPr>
+            <p:txBody>
+              <a:bodyPr wrap="none" rtlCol="0">
+                <a:spAutoFit/>
+              </a:bodyPr>
+              <a:lstStyle/>
+              <a:p>
+                <a:pPr algn="ctr"/>
+                <a:r>
+                  <a:rPr lang="ru-RU" sz="800" dirty="0">
+                    <a:latin typeface="Open Sans" panose="020B0604020202020204" charset="0"/>
+                    <a:ea typeface="Open Sans" panose="020B0604020202020204" charset="0"/>
+                    <a:cs typeface="Open Sans" panose="020B0604020202020204" charset="0"/>
+                  </a:rPr>
+                  <a:t>Вероятность ошибки на бит, </a:t>
+                </a:r>
+                <a14:m>
+                  <m:oMath xmlns:m="http://schemas.openxmlformats.org/officeDocument/2006/math">
+                    <m:r>
+                      <a:rPr lang="en-US" sz="800" b="0" i="1" smtClean="0">
+                        <a:latin typeface="Cambria Math" panose="02040503050406030204" pitchFamily="18" charset="0"/>
+                        <a:ea typeface="Open Sans" panose="020B0604020202020204" charset="0"/>
+                        <a:cs typeface="Open Sans" panose="020B0604020202020204" charset="0"/>
+                      </a:rPr>
+                      <m:t>𝑅</m:t>
+                    </m:r>
+                    <m:r>
+                      <a:rPr lang="en-US" sz="800" b="0" i="1" smtClean="0">
+                        <a:latin typeface="Cambria Math" panose="02040503050406030204" pitchFamily="18" charset="0"/>
+                        <a:ea typeface="Open Sans" panose="020B0604020202020204" charset="0"/>
+                        <a:cs typeface="Open Sans" panose="020B0604020202020204" charset="0"/>
+                      </a:rPr>
+                      <m:t>=</m:t>
+                    </m:r>
+                    <m:f>
+                      <m:fPr>
+                        <m:ctrlPr>
+                          <a:rPr lang="en-US" sz="800" b="0" i="1" smtClean="0">
+                            <a:latin typeface="Cambria Math" panose="02040503050406030204" pitchFamily="18" charset="0"/>
+                            <a:ea typeface="Open Sans" panose="020B0604020202020204" charset="0"/>
+                            <a:cs typeface="Open Sans" panose="020B0604020202020204" charset="0"/>
+                          </a:rPr>
+                        </m:ctrlPr>
+                      </m:fPr>
+                      <m:num>
+                        <m:r>
+                          <a:rPr lang="en-US" sz="800" b="0" i="1" smtClean="0">
+                            <a:latin typeface="Cambria Math" panose="02040503050406030204" pitchFamily="18" charset="0"/>
+                            <a:ea typeface="Open Sans" panose="020B0604020202020204" charset="0"/>
+                            <a:cs typeface="Open Sans" panose="020B0604020202020204" charset="0"/>
+                          </a:rPr>
+                          <m:t>3</m:t>
+                        </m:r>
+                      </m:num>
+                      <m:den>
+                        <m:r>
+                          <a:rPr lang="en-US" sz="800" b="0" i="1" smtClean="0">
+                            <a:latin typeface="Cambria Math" panose="02040503050406030204" pitchFamily="18" charset="0"/>
+                            <a:ea typeface="Open Sans" panose="020B0604020202020204" charset="0"/>
+                            <a:cs typeface="Open Sans" panose="020B0604020202020204" charset="0"/>
+                          </a:rPr>
+                          <m:t>4</m:t>
+                        </m:r>
+                      </m:den>
+                    </m:f>
+                  </m:oMath>
+                </a14:m>
+                <a:endParaRPr lang="en-US" sz="800" dirty="0">
+                  <a:latin typeface="Open Sans" panose="020B0604020202020204" charset="0"/>
+                  <a:ea typeface="Open Sans" panose="020B0604020202020204" charset="0"/>
+                  <a:cs typeface="Open Sans" panose="020B0604020202020204" charset="0"/>
+                </a:endParaRPr>
+              </a:p>
+            </p:txBody>
+          </p:sp>
+        </mc:Choice>
+        <mc:Fallback>
+          <p:sp>
+            <p:nvSpPr>
+              <p:cNvPr id="8" name="TextBox 7">
+                <a:extLst>
+                  <a:ext uri="{FF2B5EF4-FFF2-40B4-BE49-F238E27FC236}">
+                    <a16:creationId xmlns:a16="http://schemas.microsoft.com/office/drawing/2014/main" id="{98D333F5-0CAC-49AA-BC0D-5928632D8291}"/>
+                  </a:ext>
+                </a:extLst>
+              </p:cNvPr>
+              <p:cNvSpPr txBox="1">
+                <a:spLocks noRot="1" noChangeAspect="1" noMove="1" noResize="1" noEditPoints="1" noAdjustHandles="1" noChangeArrowheads="1" noChangeShapeType="1" noTextEdit="1"/>
+              </p:cNvSpPr>
+              <p:nvPr/>
+            </p:nvSpPr>
+            <p:spPr>
+              <a:xfrm>
+                <a:off x="1512617" y="3733799"/>
+                <a:ext cx="1927771" cy="266483"/>
+              </a:xfrm>
+              <a:prstGeom prst="rect">
+                <a:avLst/>
+              </a:prstGeom>
+              <a:blipFill>
+                <a:blip r:embed="rId3"/>
+                <a:stretch>
+                  <a:fillRect/>
+                </a:stretch>
+              </a:blipFill>
+            </p:spPr>
+            <p:txBody>
+              <a:bodyPr/>
+              <a:lstStyle/>
+              <a:p>
+                <a:r>
+                  <a:rPr lang="ru-RU">
+                    <a:noFill/>
+                  </a:rPr>
+                  <a:t> </a:t>
+                </a:r>
+              </a:p>
+            </p:txBody>
+          </p:sp>
+        </mc:Fallback>
+      </mc:AlternateContent>
+      <mc:AlternateContent xmlns:mc="http://schemas.openxmlformats.org/markup-compatibility/2006">
+        <mc:Choice xmlns:a14="http://schemas.microsoft.com/office/drawing/2010/main" Requires="a14">
+          <p:sp>
+            <p:nvSpPr>
+              <p:cNvPr id="9" name="TextBox 8">
+                <a:extLst>
+                  <a:ext uri="{FF2B5EF4-FFF2-40B4-BE49-F238E27FC236}">
+                    <a16:creationId xmlns:a16="http://schemas.microsoft.com/office/drawing/2014/main" id="{7AB15830-F718-436F-90C0-4E27953F331F}"/>
+                  </a:ext>
+                </a:extLst>
+              </p:cNvPr>
+              <p:cNvSpPr txBox="1"/>
+              <p:nvPr/>
+            </p:nvSpPr>
+            <p:spPr>
+              <a:xfrm>
+                <a:off x="5703615" y="3733798"/>
+                <a:ext cx="1927772" cy="265778"/>
+              </a:xfrm>
+              <a:prstGeom prst="rect">
+                <a:avLst/>
+              </a:prstGeom>
+              <a:noFill/>
+            </p:spPr>
+            <p:txBody>
+              <a:bodyPr wrap="none" rtlCol="0">
+                <a:spAutoFit/>
+              </a:bodyPr>
+              <a:lstStyle/>
+              <a:p>
+                <a:pPr algn="ctr"/>
+                <a:r>
+                  <a:rPr lang="ru-RU" sz="800" dirty="0">
+                    <a:latin typeface="Open Sans" panose="020B0604020202020204" charset="0"/>
+                    <a:ea typeface="Open Sans" panose="020B0604020202020204" charset="0"/>
+                    <a:cs typeface="Open Sans" panose="020B0604020202020204" charset="0"/>
+                  </a:rPr>
+                  <a:t>Вероятность ошибки на бит, </a:t>
+                </a:r>
+                <a14:m>
+                  <m:oMath xmlns:m="http://schemas.openxmlformats.org/officeDocument/2006/math">
+                    <m:r>
+                      <a:rPr lang="en-US" sz="800" b="0" i="1" smtClean="0">
+                        <a:latin typeface="Cambria Math" panose="02040503050406030204" pitchFamily="18" charset="0"/>
+                        <a:ea typeface="Open Sans" panose="020B0604020202020204" charset="0"/>
+                        <a:cs typeface="Open Sans" panose="020B0604020202020204" charset="0"/>
+                      </a:rPr>
+                      <m:t>𝑅</m:t>
+                    </m:r>
+                    <m:r>
+                      <a:rPr lang="en-US" sz="800" b="0" i="1" smtClean="0">
+                        <a:latin typeface="Cambria Math" panose="02040503050406030204" pitchFamily="18" charset="0"/>
+                        <a:ea typeface="Open Sans" panose="020B0604020202020204" charset="0"/>
+                        <a:cs typeface="Open Sans" panose="020B0604020202020204" charset="0"/>
+                      </a:rPr>
+                      <m:t>=</m:t>
+                    </m:r>
+                    <m:f>
+                      <m:fPr>
+                        <m:ctrlPr>
+                          <a:rPr lang="en-US" sz="800" b="0" i="1" smtClean="0">
+                            <a:latin typeface="Cambria Math" panose="02040503050406030204" pitchFamily="18" charset="0"/>
+                            <a:ea typeface="Open Sans" panose="020B0604020202020204" charset="0"/>
+                            <a:cs typeface="Open Sans" panose="020B0604020202020204" charset="0"/>
+                          </a:rPr>
+                        </m:ctrlPr>
+                      </m:fPr>
+                      <m:num>
+                        <m:r>
+                          <a:rPr lang="en-US" sz="800" b="0" i="1" smtClean="0">
+                            <a:latin typeface="Cambria Math" panose="02040503050406030204" pitchFamily="18" charset="0"/>
+                            <a:ea typeface="Open Sans" panose="020B0604020202020204" charset="0"/>
+                            <a:cs typeface="Open Sans" panose="020B0604020202020204" charset="0"/>
+                          </a:rPr>
+                          <m:t>7</m:t>
+                        </m:r>
+                      </m:num>
+                      <m:den>
+                        <m:r>
+                          <a:rPr lang="en-US" sz="800" b="0" i="1" smtClean="0">
+                            <a:latin typeface="Cambria Math" panose="02040503050406030204" pitchFamily="18" charset="0"/>
+                            <a:ea typeface="Open Sans" panose="020B0604020202020204" charset="0"/>
+                            <a:cs typeface="Open Sans" panose="020B0604020202020204" charset="0"/>
+                          </a:rPr>
+                          <m:t>8</m:t>
+                        </m:r>
+                      </m:den>
+                    </m:f>
+                  </m:oMath>
+                </a14:m>
+                <a:endParaRPr lang="en-US" sz="800" dirty="0">
+                  <a:latin typeface="Open Sans" panose="020B0604020202020204" charset="0"/>
+                  <a:ea typeface="Open Sans" panose="020B0604020202020204" charset="0"/>
+                  <a:cs typeface="Open Sans" panose="020B0604020202020204" charset="0"/>
+                </a:endParaRPr>
+              </a:p>
+            </p:txBody>
+          </p:sp>
+        </mc:Choice>
+        <mc:Fallback>
+          <p:sp>
+            <p:nvSpPr>
+              <p:cNvPr id="9" name="TextBox 8">
+                <a:extLst>
+                  <a:ext uri="{FF2B5EF4-FFF2-40B4-BE49-F238E27FC236}">
+                    <a16:creationId xmlns:a16="http://schemas.microsoft.com/office/drawing/2014/main" id="{7AB15830-F718-436F-90C0-4E27953F331F}"/>
+                  </a:ext>
+                </a:extLst>
+              </p:cNvPr>
+              <p:cNvSpPr txBox="1">
+                <a:spLocks noRot="1" noChangeAspect="1" noMove="1" noResize="1" noEditPoints="1" noAdjustHandles="1" noChangeArrowheads="1" noChangeShapeType="1" noTextEdit="1"/>
+              </p:cNvSpPr>
+              <p:nvPr/>
+            </p:nvSpPr>
+            <p:spPr>
+              <a:xfrm>
+                <a:off x="5703615" y="3733798"/>
+                <a:ext cx="1927772" cy="265778"/>
+              </a:xfrm>
+              <a:prstGeom prst="rect">
+                <a:avLst/>
+              </a:prstGeom>
+              <a:blipFill>
+                <a:blip r:embed="rId4"/>
+                <a:stretch>
+                  <a:fillRect/>
+                </a:stretch>
+              </a:blipFill>
+            </p:spPr>
+            <p:txBody>
+              <a:bodyPr/>
+              <a:lstStyle/>
+              <a:p>
+                <a:r>
+                  <a:rPr lang="ru-RU">
+                    <a:noFill/>
+                  </a:rPr>
+                  <a:t> </a:t>
+                </a:r>
+              </a:p>
+            </p:txBody>
+          </p:sp>
+        </mc:Fallback>
+      </mc:AlternateContent>
+      <p:pic>
+        <p:nvPicPr>
+          <p:cNvPr id="11" name="Рисунок 10">
+            <a:extLst>
+              <a:ext uri="{FF2B5EF4-FFF2-40B4-BE49-F238E27FC236}">
+                <a16:creationId xmlns:a16="http://schemas.microsoft.com/office/drawing/2014/main" id="{88B5E171-E084-4119-A8E4-CE59F873D183}"/>
+              </a:ext>
+            </a:extLst>
+          </p:cNvPr>
+          <p:cNvPicPr>
+            <a:picLocks noChangeAspect="1"/>
+          </p:cNvPicPr>
+          <p:nvPr/>
+        </p:nvPicPr>
+        <p:blipFill>
+          <a:blip r:embed="rId5"/>
+          <a:stretch>
+            <a:fillRect/>
+          </a:stretch>
+        </p:blipFill>
+        <p:spPr>
+          <a:xfrm>
+            <a:off x="5118100" y="1409697"/>
+            <a:ext cx="3098801" cy="2324101"/>
+          </a:xfrm>
+          <a:prstGeom prst="rect">
+            <a:avLst/>
+          </a:prstGeom>
+        </p:spPr>
+      </p:pic>
     </p:spTree>
     <p:extLst>
       <p:ext uri="{BB962C8B-B14F-4D97-AF65-F5344CB8AC3E}">
-        <p14:creationId xmlns:p14="http://schemas.microsoft.com/office/powerpoint/2010/main" val="1460343310"/>
+        <p14:creationId xmlns:p14="http://schemas.microsoft.com/office/powerpoint/2010/main" val="1118542403"/>
       </p:ext>
     </p:extLst>
   </p:cSld>
@@ -4976,54 +5075,10 @@
       </p:grpSpPr>
       <p:sp>
         <p:nvSpPr>
-          <p:cNvPr id="6" name="Текст 1">
+          <p:cNvPr id="3" name="Заголовок 2">
             <a:extLst>
               <a:ext uri="{FF2B5EF4-FFF2-40B4-BE49-F238E27FC236}">
-                <a16:creationId xmlns:a16="http://schemas.microsoft.com/office/drawing/2014/main" id="{23A980AB-DC14-46B7-917F-16C9D54F69AB}"/>
-              </a:ext>
-            </a:extLst>
-          </p:cNvPr>
-          <p:cNvSpPr>
-            <a:spLocks noGrp="1"/>
-          </p:cNvSpPr>
-          <p:nvPr>
-            <p:ph type="body" idx="1"/>
-          </p:nvPr>
-        </p:nvSpPr>
-        <p:spPr>
-          <a:xfrm>
-            <a:off x="313058" y="1394786"/>
-            <a:ext cx="8520416" cy="3195216"/>
-          </a:xfrm>
-        </p:spPr>
-        <p:txBody>
-          <a:bodyPr/>
-          <a:lstStyle/>
-          <a:p>
-            <a:pPr marL="88900" indent="0" algn="just">
-              <a:buNone/>
-            </a:pPr>
-            <a:r>
-              <a:rPr lang="ru-RU" sz="1400" dirty="0"/>
-              <a:t>Особенностью декодера является то, что если стирания достаточно разнесены по полученному слов, то мы можем исправить значительно больше стираний чем </a:t>
-            </a:r>
-            <a:r>
-              <a:rPr lang="en-US" sz="1400" dirty="0"/>
-              <a:t>d-1 </a:t>
-            </a:r>
-            <a:r>
-              <a:rPr lang="ru-RU" sz="1400" dirty="0"/>
-              <a:t>для длинных слов.</a:t>
-            </a:r>
-          </a:p>
-        </p:txBody>
-      </p:sp>
-      <p:sp>
-        <p:nvSpPr>
-          <p:cNvPr id="7" name="Заголовок 2">
-            <a:extLst>
-              <a:ext uri="{FF2B5EF4-FFF2-40B4-BE49-F238E27FC236}">
-                <a16:creationId xmlns:a16="http://schemas.microsoft.com/office/drawing/2014/main" id="{00CD818B-920A-4B58-8D73-66CD60431CE9}"/>
+                <a16:creationId xmlns:a16="http://schemas.microsoft.com/office/drawing/2014/main" id="{01E65993-07E5-4843-A83A-58572077D948}"/>
               </a:ext>
             </a:extLst>
           </p:cNvPr>
@@ -5034,19 +5089,79 @@
             <p:ph type="title"/>
           </p:nvPr>
         </p:nvSpPr>
-        <p:spPr>
-          <a:xfrm>
-            <a:off x="297295" y="553498"/>
-            <a:ext cx="8536179" cy="620483"/>
-          </a:xfrm>
-        </p:spPr>
+        <p:spPr/>
         <p:txBody>
           <a:bodyPr/>
           <a:lstStyle/>
           <a:p>
             <a:r>
               <a:rPr lang="ru-RU" dirty="0"/>
-              <a:t>Особенности</a:t>
+              <a:t>Схема доступа в канал</a:t>
+            </a:r>
+          </a:p>
+        </p:txBody>
+      </p:sp>
+      <p:pic>
+        <p:nvPicPr>
+          <p:cNvPr id="5" name="Рисунок 4">
+            <a:extLst>
+              <a:ext uri="{FF2B5EF4-FFF2-40B4-BE49-F238E27FC236}">
+                <a16:creationId xmlns:a16="http://schemas.microsoft.com/office/drawing/2014/main" id="{74C5A3F9-A74F-4143-813D-E06978A3F41A}"/>
+              </a:ext>
+            </a:extLst>
+          </p:cNvPr>
+          <p:cNvPicPr>
+            <a:picLocks noChangeAspect="1"/>
+          </p:cNvPicPr>
+          <p:nvPr/>
+        </p:nvPicPr>
+        <p:blipFill>
+          <a:blip r:embed="rId2"/>
+          <a:stretch>
+            <a:fillRect/>
+          </a:stretch>
+        </p:blipFill>
+        <p:spPr>
+          <a:xfrm>
+            <a:off x="3194049" y="1303955"/>
+            <a:ext cx="2755902" cy="3221390"/>
+          </a:xfrm>
+          <a:prstGeom prst="rect">
+            <a:avLst/>
+          </a:prstGeom>
+        </p:spPr>
+      </p:pic>
+      <p:sp>
+        <p:nvSpPr>
+          <p:cNvPr id="6" name="TextBox 5">
+            <a:extLst>
+              <a:ext uri="{FF2B5EF4-FFF2-40B4-BE49-F238E27FC236}">
+                <a16:creationId xmlns:a16="http://schemas.microsoft.com/office/drawing/2014/main" id="{DE21BB87-2F47-4831-8E49-11A8F7060A00}"/>
+              </a:ext>
+            </a:extLst>
+          </p:cNvPr>
+          <p:cNvSpPr txBox="1"/>
+          <p:nvPr/>
+        </p:nvSpPr>
+        <p:spPr>
+          <a:xfrm>
+            <a:off x="3508043" y="4655319"/>
+            <a:ext cx="2114681" cy="307777"/>
+          </a:xfrm>
+          <a:prstGeom prst="rect">
+            <a:avLst/>
+          </a:prstGeom>
+          <a:noFill/>
+        </p:spPr>
+        <p:txBody>
+          <a:bodyPr wrap="none" rtlCol="0">
+            <a:spAutoFit/>
+          </a:bodyPr>
+          <a:lstStyle/>
+          <a:p>
+            <a:r>
+              <a:rPr lang="ru-RU" dirty="0"/>
+              <a:t>Схема доступа в канал</a:t>
             </a:r>
           </a:p>
         </p:txBody>
@@ -5054,7 +5169,7 @@
     </p:spTree>
     <p:extLst>
       <p:ext uri="{BB962C8B-B14F-4D97-AF65-F5344CB8AC3E}">
-        <p14:creationId xmlns:p14="http://schemas.microsoft.com/office/powerpoint/2010/main" val="2157969327"/>
+        <p14:creationId xmlns:p14="http://schemas.microsoft.com/office/powerpoint/2010/main" val="1591643807"/>
       </p:ext>
     </p:extLst>
   </p:cSld>
@@ -5083,10 +5198,10 @@
       </p:grpSpPr>
       <p:sp>
         <p:nvSpPr>
-          <p:cNvPr id="6" name="Текст 1">
+          <p:cNvPr id="2" name="Текст 1">
             <a:extLst>
               <a:ext uri="{FF2B5EF4-FFF2-40B4-BE49-F238E27FC236}">
-                <a16:creationId xmlns:a16="http://schemas.microsoft.com/office/drawing/2014/main" id="{73785F05-E348-4C48-B860-080D5EEC0485}"/>
+                <a16:creationId xmlns:a16="http://schemas.microsoft.com/office/drawing/2014/main" id="{59880103-70D4-4B1C-B6FB-68E083303FF3}"/>
               </a:ext>
             </a:extLst>
           </p:cNvPr>
@@ -5097,35 +5212,57 @@
             <p:ph type="body" idx="1"/>
           </p:nvPr>
         </p:nvSpPr>
-        <p:spPr>
-          <a:xfrm>
-            <a:off x="313058" y="1394786"/>
-            <a:ext cx="8520416" cy="3195216"/>
-          </a:xfrm>
-        </p:spPr>
+        <p:spPr/>
         <p:txBody>
           <a:bodyPr/>
           <a:lstStyle/>
           <a:p>
+            <a:pPr marL="88900" indent="0">
+              <a:buNone/>
+            </a:pPr>
             <a:r>
               <a:rPr lang="ru-RU" sz="1400" dirty="0"/>
-              <a:t>Был реализован эффективный код, способный исправлять стирания.</a:t>
+              <a:t>В качестве источника протокольных последовательностей используем </a:t>
+            </a:r>
+            <a:r>
+              <a:rPr lang="ru-RU" sz="1400" dirty="0" err="1"/>
+              <a:t>графовый</a:t>
+            </a:r>
+            <a:r>
+              <a:rPr lang="ru-RU" sz="1400" dirty="0"/>
+              <a:t> МППЧ-код. </a:t>
+            </a:r>
+            <a:r>
+              <a:rPr lang="ru-RU" sz="1400" dirty="0" err="1"/>
+              <a:t>Графовым</a:t>
+            </a:r>
+            <a:r>
+              <a:rPr lang="ru-RU" sz="1400" dirty="0"/>
+              <a:t> он называется, потому что этот класс кодов, удобно представлять в виде графа </a:t>
+            </a:r>
+            <a:r>
+              <a:rPr lang="ru-RU" sz="1400" dirty="0" err="1"/>
+              <a:t>Таннера</a:t>
+            </a:r>
+            <a:r>
+              <a:rPr lang="ru-RU" sz="1400" dirty="0"/>
+              <a:t>. </a:t>
             </a:r>
           </a:p>
           <a:p>
             <a:pPr marL="88900" indent="0">
               <a:buNone/>
             </a:pPr>
-            <a:endParaRPr lang="ru-RU" dirty="0"/>
+            <a:endParaRPr lang="ru-RU" sz="1400" dirty="0"/>
           </a:p>
         </p:txBody>
       </p:sp>
       <p:sp>
         <p:nvSpPr>
-          <p:cNvPr id="7" name="Заголовок 2">
+          <p:cNvPr id="3" name="Заголовок 2">
             <a:extLst>
               <a:ext uri="{FF2B5EF4-FFF2-40B4-BE49-F238E27FC236}">
-                <a16:creationId xmlns:a16="http://schemas.microsoft.com/office/drawing/2014/main" id="{478EA2FA-D750-4344-B894-DE15E5138C4E}"/>
+                <a16:creationId xmlns:a16="http://schemas.microsoft.com/office/drawing/2014/main" id="{DB02E6BB-9789-47DC-9A77-8B21FBEC4C2C}"/>
               </a:ext>
             </a:extLst>
           </p:cNvPr>
@@ -5136,27 +5273,92 @@
             <p:ph type="title"/>
           </p:nvPr>
         </p:nvSpPr>
-        <p:spPr>
-          <a:xfrm>
-            <a:off x="297295" y="553498"/>
-            <a:ext cx="8536179" cy="620483"/>
-          </a:xfrm>
-        </p:spPr>
+        <p:spPr/>
         <p:txBody>
           <a:bodyPr/>
           <a:lstStyle/>
           <a:p>
             <a:r>
               <a:rPr lang="ru-RU" dirty="0"/>
-              <a:t>Результаты</a:t>
+              <a:t>Построение протокольных последовательностей</a:t>
             </a:r>
+          </a:p>
+        </p:txBody>
+      </p:sp>
+      <p:pic>
+        <p:nvPicPr>
+          <p:cNvPr id="5" name="Рисунок 4">
+            <a:extLst>
+              <a:ext uri="{FF2B5EF4-FFF2-40B4-BE49-F238E27FC236}">
+                <a16:creationId xmlns:a16="http://schemas.microsoft.com/office/drawing/2014/main" id="{9C5A242B-B795-4976-ACB7-DABBCFF03570}"/>
+              </a:ext>
+            </a:extLst>
+          </p:cNvPr>
+          <p:cNvPicPr>
+            <a:picLocks noChangeAspect="1"/>
+          </p:cNvPicPr>
+          <p:nvPr/>
+        </p:nvPicPr>
+        <p:blipFill>
+          <a:blip r:embed="rId2"/>
+          <a:stretch>
+            <a:fillRect/>
+          </a:stretch>
+        </p:blipFill>
+        <p:spPr>
+          <a:xfrm>
+            <a:off x="2722296" y="2455862"/>
+            <a:ext cx="3686175" cy="1933575"/>
+          </a:xfrm>
+          <a:prstGeom prst="rect">
+            <a:avLst/>
+          </a:prstGeom>
+        </p:spPr>
+      </p:pic>
+      <p:sp>
+        <p:nvSpPr>
+          <p:cNvPr id="6" name="TextBox 5">
+            <a:extLst>
+              <a:ext uri="{FF2B5EF4-FFF2-40B4-BE49-F238E27FC236}">
+                <a16:creationId xmlns:a16="http://schemas.microsoft.com/office/drawing/2014/main" id="{E1153BE2-66CB-4C9E-AD5F-02DADB9C43B0}"/>
+              </a:ext>
+            </a:extLst>
+          </p:cNvPr>
+          <p:cNvSpPr txBox="1"/>
+          <p:nvPr/>
+        </p:nvSpPr>
+        <p:spPr>
+          <a:xfrm>
+            <a:off x="3495423" y="4282225"/>
+            <a:ext cx="2153154" cy="307777"/>
+          </a:xfrm>
+          <a:prstGeom prst="rect">
+            <a:avLst/>
+          </a:prstGeom>
+          <a:noFill/>
+        </p:spPr>
+        <p:txBody>
+          <a:bodyPr wrap="none" rtlCol="0">
+            <a:spAutoFit/>
+          </a:bodyPr>
+          <a:lstStyle/>
+          <a:p>
+            <a:r>
+              <a:rPr lang="ru-RU" dirty="0"/>
+              <a:t>Пример графа </a:t>
+            </a:r>
+            <a:r>
+              <a:rPr lang="ru-RU" dirty="0" err="1"/>
+              <a:t>Таннера</a:t>
+            </a:r>
+            <a:endParaRPr lang="ru-RU" dirty="0"/>
           </a:p>
         </p:txBody>
       </p:sp>
     </p:spTree>
     <p:extLst>
       <p:ext uri="{BB962C8B-B14F-4D97-AF65-F5344CB8AC3E}">
-        <p14:creationId xmlns:p14="http://schemas.microsoft.com/office/powerpoint/2010/main" val="3080730076"/>
+        <p14:creationId xmlns:p14="http://schemas.microsoft.com/office/powerpoint/2010/main" val="3526129673"/>
       </p:ext>
     </p:extLst>
   </p:cSld>
@@ -5183,12 +5385,1524 @@
           <a:chExt cx="0" cy="0"/>
         </a:xfrm>
       </p:grpSpPr>
+      <mc:AlternateContent xmlns:mc="http://schemas.openxmlformats.org/markup-compatibility/2006">
+        <mc:Choice xmlns:a14="http://schemas.microsoft.com/office/drawing/2010/main" Requires="a14">
+          <p:sp>
+            <p:nvSpPr>
+              <p:cNvPr id="2" name="Текст 1">
+                <a:extLst>
+                  <a:ext uri="{FF2B5EF4-FFF2-40B4-BE49-F238E27FC236}">
+                    <a16:creationId xmlns:a16="http://schemas.microsoft.com/office/drawing/2014/main" id="{EC18A83F-CE33-4A06-8231-1735BAA4F19C}"/>
+                  </a:ext>
+                </a:extLst>
+              </p:cNvPr>
+              <p:cNvSpPr>
+                <a:spLocks noGrp="1"/>
+              </p:cNvSpPr>
+              <p:nvPr>
+                <p:ph type="body" idx="1"/>
+              </p:nvPr>
+            </p:nvSpPr>
+            <p:spPr/>
+            <p:txBody>
+              <a:bodyPr/>
+              <a:lstStyle/>
+              <a:p>
+                <a:pPr marL="88900" indent="0">
+                  <a:buNone/>
+                </a:pPr>
+                <a:r>
+                  <a:rPr lang="ru-RU" sz="1400" dirty="0">
+                    <a:latin typeface="Cambria Math" panose="02040503050406030204" pitchFamily="18" charset="0"/>
+                  </a:rPr>
+                  <a:t>В качестве источника последовательностей был выбран </a:t>
+                </a:r>
+                <a:r>
+                  <a:rPr lang="en-US" sz="1400" dirty="0">
+                    <a:latin typeface="Cambria Math" panose="02040503050406030204" pitchFamily="18" charset="0"/>
+                  </a:rPr>
+                  <a:t>(2,4) </a:t>
+                </a:r>
+                <a:r>
+                  <a:rPr lang="ru-RU" sz="1400" dirty="0">
+                    <a:latin typeface="Cambria Math" panose="02040503050406030204" pitchFamily="18" charset="0"/>
+                  </a:rPr>
+                  <a:t>регулярный МППЧ-код. </a:t>
+                </a:r>
+                <a:endParaRPr lang="ru-RU" sz="1400" i="1" dirty="0">
+                  <a:latin typeface="Cambria Math" panose="02040503050406030204" pitchFamily="18" charset="0"/>
+                </a:endParaRPr>
+              </a:p>
+              <a:p>
+                <a:pPr marL="88900" indent="0">
+                  <a:buNone/>
+                </a:pPr>
+                <a:endParaRPr lang="ru-RU" sz="1400" i="1" dirty="0">
+                  <a:latin typeface="Cambria Math" panose="02040503050406030204" pitchFamily="18" charset="0"/>
+                </a:endParaRPr>
+              </a:p>
+              <a:p>
+                <a:pPr marL="88900" indent="0">
+                  <a:buNone/>
+                </a:pPr>
+                <a14:m>
+                  <m:oMathPara xmlns:m="http://schemas.openxmlformats.org/officeDocument/2006/math">
+                    <m:oMathParaPr>
+                      <m:jc m:val="centerGroup"/>
+                    </m:oMathParaPr>
+                    <m:oMath xmlns:m="http://schemas.openxmlformats.org/officeDocument/2006/math">
+                      <m:sSub>
+                        <m:sSubPr>
+                          <m:ctrlPr>
+                            <a:rPr lang="en-US" sz="1400" b="0" i="1" smtClean="0">
+                              <a:latin typeface="Cambria Math" panose="02040503050406030204" pitchFamily="18" charset="0"/>
+                            </a:rPr>
+                          </m:ctrlPr>
+                        </m:sSubPr>
+                        <m:e>
+                          <m:r>
+                            <a:rPr lang="en-US" sz="1400" b="0" i="1" smtClean="0">
+                              <a:latin typeface="Cambria Math" panose="02040503050406030204" pitchFamily="18" charset="0"/>
+                            </a:rPr>
+                            <m:t>𝐻</m:t>
+                          </m:r>
+                        </m:e>
+                        <m:sub>
+                          <m:r>
+                            <a:rPr lang="en-US" sz="1400" b="0" i="1" smtClean="0">
+                              <a:latin typeface="Cambria Math" panose="02040503050406030204" pitchFamily="18" charset="0"/>
+                            </a:rPr>
+                            <m:t>𝑐𝑜𝑛𝑣</m:t>
+                          </m:r>
+                        </m:sub>
+                      </m:sSub>
+                      <m:r>
+                        <a:rPr lang="en-US" sz="1400" b="0" i="1" smtClean="0">
+                          <a:latin typeface="Cambria Math" panose="02040503050406030204" pitchFamily="18" charset="0"/>
+                        </a:rPr>
+                        <m:t>= </m:t>
+                      </m:r>
+                      <m:d>
+                        <m:dPr>
+                          <m:ctrlPr>
+                            <a:rPr lang="ru-RU" sz="1400" i="1" smtClean="0">
+                              <a:latin typeface="Cambria Math" panose="02040503050406030204" pitchFamily="18" charset="0"/>
+                            </a:rPr>
+                          </m:ctrlPr>
+                        </m:dPr>
+                        <m:e>
+                          <m:m>
+                            <m:mPr>
+                              <m:mcs>
+                                <m:mc>
+                                  <m:mcPr>
+                                    <m:count m:val="4"/>
+                                    <m:mcJc m:val="center"/>
+                                  </m:mcPr>
+                                </m:mc>
+                              </m:mcs>
+                              <m:ctrlPr>
+                                <a:rPr lang="ru-RU" sz="1400" i="1" smtClean="0">
+                                  <a:latin typeface="Cambria Math" panose="02040503050406030204" pitchFamily="18" charset="0"/>
+                                </a:rPr>
+                              </m:ctrlPr>
+                            </m:mPr>
+                            <m:mr>
+                              <m:e>
+                                <m:r>
+                                  <m:rPr>
+                                    <m:brk m:alnAt="7"/>
+                                  </m:rPr>
+                                  <a:rPr lang="ru-RU" sz="1400" b="0" i="1" smtClean="0">
+                                    <a:latin typeface="Cambria Math" panose="02040503050406030204" pitchFamily="18" charset="0"/>
+                                  </a:rPr>
+                                  <m:t>(1,0)</m:t>
+                                </m:r>
+                              </m:e>
+                              <m:e>
+                                <m:r>
+                                  <a:rPr lang="ru-RU" sz="1400" b="0" i="1" smtClean="0">
+                                    <a:latin typeface="Cambria Math" panose="02040503050406030204" pitchFamily="18" charset="0"/>
+                                  </a:rPr>
+                                  <m:t>(2,0)</m:t>
+                                </m:r>
+                              </m:e>
+                              <m:e>
+                                <m:r>
+                                  <a:rPr lang="ru-RU" sz="1400" b="0" i="1" smtClean="0">
+                                    <a:latin typeface="Cambria Math" panose="02040503050406030204" pitchFamily="18" charset="0"/>
+                                  </a:rPr>
+                                  <m:t>(3,0)</m:t>
+                                </m:r>
+                              </m:e>
+                              <m:e>
+                                <m:r>
+                                  <a:rPr lang="ru-RU" sz="1400" b="0" i="1" smtClean="0">
+                                    <a:latin typeface="Cambria Math" panose="02040503050406030204" pitchFamily="18" charset="0"/>
+                                  </a:rPr>
+                                  <m:t>(4,0)</m:t>
+                                </m:r>
+                              </m:e>
+                            </m:mr>
+                            <m:mr>
+                              <m:e>
+                                <m:r>
+                                  <a:rPr lang="ru-RU" sz="1400" b="0" i="1" smtClean="0">
+                                    <a:latin typeface="Cambria Math" panose="02040503050406030204" pitchFamily="18" charset="0"/>
+                                  </a:rPr>
+                                  <m:t>(1,1)</m:t>
+                                </m:r>
+                              </m:e>
+                              <m:e>
+                                <m:r>
+                                  <a:rPr lang="ru-RU" sz="1400" b="0" i="1" smtClean="0">
+                                    <a:latin typeface="Cambria Math" panose="02040503050406030204" pitchFamily="18" charset="0"/>
+                                  </a:rPr>
+                                  <m:t>(5,0)</m:t>
+                                </m:r>
+                              </m:e>
+                              <m:e>
+                                <m:r>
+                                  <a:rPr lang="ru-RU" sz="1400" b="0" i="1" smtClean="0">
+                                    <a:latin typeface="Cambria Math" panose="02040503050406030204" pitchFamily="18" charset="0"/>
+                                  </a:rPr>
+                                  <m:t>(6,0)</m:t>
+                                </m:r>
+                              </m:e>
+                              <m:e>
+                                <m:r>
+                                  <a:rPr lang="ru-RU" sz="1400" b="0" i="1" smtClean="0">
+                                    <a:latin typeface="Cambria Math" panose="02040503050406030204" pitchFamily="18" charset="0"/>
+                                  </a:rPr>
+                                  <m:t>(7,0)</m:t>
+                                </m:r>
+                              </m:e>
+                            </m:mr>
+                            <m:mr>
+                              <m:e>
+                                <m:r>
+                                  <a:rPr lang="ru-RU" sz="1400" b="0" i="1" smtClean="0">
+                                    <a:latin typeface="Cambria Math" panose="02040503050406030204" pitchFamily="18" charset="0"/>
+                                  </a:rPr>
+                                  <m:t>(2,4)</m:t>
+                                </m:r>
+                              </m:e>
+                              <m:e>
+                                <m:r>
+                                  <a:rPr lang="ru-RU" sz="1400" b="0" i="1" smtClean="0">
+                                    <a:latin typeface="Cambria Math" panose="02040503050406030204" pitchFamily="18" charset="0"/>
+                                  </a:rPr>
+                                  <m:t>(5,0)</m:t>
+                                </m:r>
+                              </m:e>
+                              <m:e>
+                                <m:r>
+                                  <a:rPr lang="ru-RU" sz="1400" b="0" i="1" smtClean="0">
+                                    <a:latin typeface="Cambria Math" panose="02040503050406030204" pitchFamily="18" charset="0"/>
+                                  </a:rPr>
+                                  <m:t>(8,0)</m:t>
+                                </m:r>
+                              </m:e>
+                              <m:e>
+                                <m:r>
+                                  <a:rPr lang="ru-RU" sz="1400" b="0" i="1" smtClean="0">
+                                    <a:latin typeface="Cambria Math" panose="02040503050406030204" pitchFamily="18" charset="0"/>
+                                  </a:rPr>
+                                  <m:t>(9,35)</m:t>
+                                </m:r>
+                              </m:e>
+                            </m:mr>
+                            <m:mr>
+                              <m:e>
+                                <m:r>
+                                  <a:rPr lang="ru-RU" sz="1400" b="0" i="1" smtClean="0">
+                                    <a:latin typeface="Cambria Math" panose="02040503050406030204" pitchFamily="18" charset="0"/>
+                                  </a:rPr>
+                                  <m:t>(3,29)</m:t>
+                                </m:r>
+                              </m:e>
+                              <m:e>
+                                <m:r>
+                                  <a:rPr lang="ru-RU" sz="1400" b="0" i="1" smtClean="0">
+                                    <a:latin typeface="Cambria Math" panose="02040503050406030204" pitchFamily="18" charset="0"/>
+                                  </a:rPr>
+                                  <m:t>(6,15)</m:t>
+                                </m:r>
+                              </m:e>
+                              <m:e>
+                                <m:r>
+                                  <a:rPr lang="ru-RU" sz="1400" b="0" i="1" smtClean="0">
+                                    <a:latin typeface="Cambria Math" panose="02040503050406030204" pitchFamily="18" charset="0"/>
+                                  </a:rPr>
+                                  <m:t>(8,0)</m:t>
+                                </m:r>
+                              </m:e>
+                              <m:e>
+                                <m:r>
+                                  <a:rPr lang="ru-RU" sz="1400" b="0" i="1" smtClean="0">
+                                    <a:latin typeface="Cambria Math" panose="02040503050406030204" pitchFamily="18" charset="0"/>
+                                  </a:rPr>
+                                  <m:t>(10,0)</m:t>
+                                </m:r>
+                              </m:e>
+                            </m:mr>
+                            <m:mr>
+                              <m:e>
+                                <m:r>
+                                  <a:rPr lang="ru-RU" sz="1400" b="0" i="1" smtClean="0">
+                                    <a:latin typeface="Cambria Math" panose="02040503050406030204" pitchFamily="18" charset="0"/>
+                                  </a:rPr>
+                                  <m:t>(4,0)</m:t>
+                                </m:r>
+                              </m:e>
+                              <m:e>
+                                <m:r>
+                                  <a:rPr lang="ru-RU" sz="1400" b="0" i="1" smtClean="0">
+                                    <a:latin typeface="Cambria Math" panose="02040503050406030204" pitchFamily="18" charset="0"/>
+                                  </a:rPr>
+                                  <m:t>(7,0)</m:t>
+                                </m:r>
+                              </m:e>
+                              <m:e>
+                                <m:r>
+                                  <a:rPr lang="ru-RU" sz="1400" b="0" i="1" smtClean="0">
+                                    <a:latin typeface="Cambria Math" panose="02040503050406030204" pitchFamily="18" charset="0"/>
+                                  </a:rPr>
+                                  <m:t>(9,0)</m:t>
+                                </m:r>
+                              </m:e>
+                              <m:e>
+                                <m:r>
+                                  <a:rPr lang="ru-RU" sz="1400" b="0" i="1" smtClean="0">
+                                    <a:latin typeface="Cambria Math" panose="02040503050406030204" pitchFamily="18" charset="0"/>
+                                  </a:rPr>
+                                  <m:t>(10,26)</m:t>
+                                </m:r>
+                              </m:e>
+                            </m:mr>
+                          </m:m>
+                        </m:e>
+                      </m:d>
+                    </m:oMath>
+                  </m:oMathPara>
+                </a14:m>
+                <a:endParaRPr lang="ru-RU" sz="1400" dirty="0"/>
+              </a:p>
+              <a:p>
+                <a:pPr marL="88900" indent="0">
+                  <a:buNone/>
+                </a:pPr>
+                <a:r>
+                  <a:rPr lang="ru-RU" sz="1400" dirty="0"/>
+                  <a:t>Проведя его усечение, получим набор последовательностей, в качестве которого будут выступать строки из проверочной матрицы.</a:t>
+                </a:r>
+              </a:p>
+            </p:txBody>
+          </p:sp>
+        </mc:Choice>
+        <mc:Fallback>
+          <p:sp>
+            <p:nvSpPr>
+              <p:cNvPr id="2" name="Текст 1">
+                <a:extLst>
+                  <a:ext uri="{FF2B5EF4-FFF2-40B4-BE49-F238E27FC236}">
+                    <a16:creationId xmlns:a16="http://schemas.microsoft.com/office/drawing/2014/main" id="{EC18A83F-CE33-4A06-8231-1735BAA4F19C}"/>
+                  </a:ext>
+                </a:extLst>
+              </p:cNvPr>
+              <p:cNvSpPr>
+                <a:spLocks noGrp="1" noRot="1" noChangeAspect="1" noMove="1" noResize="1" noEditPoints="1" noAdjustHandles="1" noChangeArrowheads="1" noChangeShapeType="1" noTextEdit="1"/>
+              </p:cNvSpPr>
+              <p:nvPr>
+                <p:ph type="body" idx="1"/>
+              </p:nvPr>
+            </p:nvSpPr>
+            <p:spPr>
+              <a:blipFill>
+                <a:blip r:embed="rId2"/>
+                <a:stretch>
+                  <a:fillRect/>
+                </a:stretch>
+              </a:blipFill>
+            </p:spPr>
+            <p:txBody>
+              <a:bodyPr/>
+              <a:lstStyle/>
+              <a:p>
+                <a:r>
+                  <a:rPr lang="ru-RU">
+                    <a:noFill/>
+                  </a:rPr>
+                  <a:t> </a:t>
+                </a:r>
+              </a:p>
+            </p:txBody>
+          </p:sp>
+        </mc:Fallback>
+      </mc:AlternateContent>
       <p:sp>
         <p:nvSpPr>
-          <p:cNvPr id="4" name="Текст 1">
+          <p:cNvPr id="3" name="Заголовок 2">
             <a:extLst>
               <a:ext uri="{FF2B5EF4-FFF2-40B4-BE49-F238E27FC236}">
-                <a16:creationId xmlns:a16="http://schemas.microsoft.com/office/drawing/2014/main" id="{FF587CA9-E8F9-4E97-A60E-AF3813FB7C95}"/>
+                <a16:creationId xmlns:a16="http://schemas.microsoft.com/office/drawing/2014/main" id="{5DDF3616-8337-4F09-82CC-24506BCA73F3}"/>
+              </a:ext>
+            </a:extLst>
+          </p:cNvPr>
+          <p:cNvSpPr>
+            <a:spLocks noGrp="1"/>
+          </p:cNvSpPr>
+          <p:nvPr>
+            <p:ph type="title"/>
+          </p:nvPr>
+        </p:nvSpPr>
+        <p:spPr/>
+        <p:txBody>
+          <a:bodyPr/>
+          <a:lstStyle/>
+          <a:p>
+            <a:r>
+              <a:rPr lang="ru-RU" dirty="0"/>
+              <a:t>Источник протокольных последовательностей</a:t>
+            </a:r>
+          </a:p>
+        </p:txBody>
+      </p:sp>
+    </p:spTree>
+    <p:extLst>
+      <p:ext uri="{BB962C8B-B14F-4D97-AF65-F5344CB8AC3E}">
+        <p14:creationId xmlns:p14="http://schemas.microsoft.com/office/powerpoint/2010/main" val="4036235455"/>
+      </p:ext>
+    </p:extLst>
+  </p:cSld>
+  <p:clrMapOvr>
+    <a:masterClrMapping/>
+  </p:clrMapOvr>
+</p:sld>
+</file>
+
+<file path=ppt/slides/slide15.xml><?xml version="1.0" encoding="utf-8"?>
+<p:sld xmlns:a="http://schemas.openxmlformats.org/drawingml/2006/main" xmlns:r="http://schemas.openxmlformats.org/officeDocument/2006/relationships" xmlns:p="http://schemas.openxmlformats.org/presentationml/2006/main">
+  <p:cSld>
+    <p:spTree>
+      <p:nvGrpSpPr>
+        <p:cNvPr id="1" name=""/>
+        <p:cNvGrpSpPr/>
+        <p:nvPr/>
+      </p:nvGrpSpPr>
+      <p:grpSpPr>
+        <a:xfrm>
+          <a:off x="0" y="0"/>
+          <a:ext cx="0" cy="0"/>
+          <a:chOff x="0" y="0"/>
+          <a:chExt cx="0" cy="0"/>
+        </a:xfrm>
+      </p:grpSpPr>
+      <p:sp>
+        <p:nvSpPr>
+          <p:cNvPr id="3" name="Заголовок 2">
+            <a:extLst>
+              <a:ext uri="{FF2B5EF4-FFF2-40B4-BE49-F238E27FC236}">
+                <a16:creationId xmlns:a16="http://schemas.microsoft.com/office/drawing/2014/main" id="{A54CB18B-7004-4686-A765-DF14D84C1A9B}"/>
+              </a:ext>
+            </a:extLst>
+          </p:cNvPr>
+          <p:cNvSpPr>
+            <a:spLocks noGrp="1"/>
+          </p:cNvSpPr>
+          <p:nvPr>
+            <p:ph type="title"/>
+          </p:nvPr>
+        </p:nvSpPr>
+        <p:spPr/>
+        <p:txBody>
+          <a:bodyPr/>
+          <a:lstStyle/>
+          <a:p>
+            <a:r>
+              <a:rPr lang="ru-RU" dirty="0"/>
+              <a:t>Тестирование протокольных последовательностей</a:t>
+            </a:r>
+          </a:p>
+        </p:txBody>
+      </p:sp>
+      <p:pic>
+        <p:nvPicPr>
+          <p:cNvPr id="5" name="Рисунок 4">
+            <a:extLst>
+              <a:ext uri="{FF2B5EF4-FFF2-40B4-BE49-F238E27FC236}">
+                <a16:creationId xmlns:a16="http://schemas.microsoft.com/office/drawing/2014/main" id="{2BC4788C-13D9-422A-B756-3D7ECD31C411}"/>
+              </a:ext>
+            </a:extLst>
+          </p:cNvPr>
+          <p:cNvPicPr>
+            <a:picLocks noChangeAspect="1"/>
+          </p:cNvPicPr>
+          <p:nvPr/>
+        </p:nvPicPr>
+        <p:blipFill>
+          <a:blip r:embed="rId2"/>
+          <a:stretch>
+            <a:fillRect/>
+          </a:stretch>
+        </p:blipFill>
+        <p:spPr>
+          <a:xfrm>
+            <a:off x="571500" y="1716044"/>
+            <a:ext cx="3403600" cy="2552700"/>
+          </a:xfrm>
+          <a:prstGeom prst="rect">
+            <a:avLst/>
+          </a:prstGeom>
+        </p:spPr>
+      </p:pic>
+      <p:pic>
+        <p:nvPicPr>
+          <p:cNvPr id="7" name="Рисунок 6">
+            <a:extLst>
+              <a:ext uri="{FF2B5EF4-FFF2-40B4-BE49-F238E27FC236}">
+                <a16:creationId xmlns:a16="http://schemas.microsoft.com/office/drawing/2014/main" id="{9EF9CCC2-2A0C-4995-A590-5329A49D7906}"/>
+              </a:ext>
+            </a:extLst>
+          </p:cNvPr>
+          <p:cNvPicPr>
+            <a:picLocks noChangeAspect="1"/>
+          </p:cNvPicPr>
+          <p:nvPr/>
+        </p:nvPicPr>
+        <p:blipFill>
+          <a:blip r:embed="rId3"/>
+          <a:stretch>
+            <a:fillRect/>
+          </a:stretch>
+        </p:blipFill>
+        <p:spPr>
+          <a:xfrm>
+            <a:off x="5016499" y="1716044"/>
+            <a:ext cx="3403601" cy="2552700"/>
+          </a:xfrm>
+          <a:prstGeom prst="rect">
+            <a:avLst/>
+          </a:prstGeom>
+        </p:spPr>
+      </p:pic>
+      <p:sp>
+        <p:nvSpPr>
+          <p:cNvPr id="8" name="TextBox 7">
+            <a:extLst>
+              <a:ext uri="{FF2B5EF4-FFF2-40B4-BE49-F238E27FC236}">
+                <a16:creationId xmlns:a16="http://schemas.microsoft.com/office/drawing/2014/main" id="{C3027F84-9318-4AC8-8785-4B25D3ABEBD4}"/>
+              </a:ext>
+            </a:extLst>
+          </p:cNvPr>
+          <p:cNvSpPr txBox="1"/>
+          <p:nvPr/>
+        </p:nvSpPr>
+        <p:spPr>
+          <a:xfrm>
+            <a:off x="865703" y="4268744"/>
+            <a:ext cx="2815194" cy="307777"/>
+          </a:xfrm>
+          <a:prstGeom prst="rect">
+            <a:avLst/>
+          </a:prstGeom>
+          <a:noFill/>
+        </p:spPr>
+        <p:txBody>
+          <a:bodyPr wrap="none" rtlCol="0">
+            <a:spAutoFit/>
+          </a:bodyPr>
+          <a:lstStyle/>
+          <a:p>
+            <a:r>
+              <a:rPr lang="ru-RU" dirty="0"/>
+              <a:t>Число конфликтов на </a:t>
+            </a:r>
+            <a:r>
+              <a:rPr lang="ru-RU" dirty="0" err="1"/>
+              <a:t>подкадре</a:t>
+            </a:r>
+            <a:endParaRPr lang="ru-RU" dirty="0"/>
+          </a:p>
+        </p:txBody>
+      </p:sp>
+      <p:sp>
+        <p:nvSpPr>
+          <p:cNvPr id="9" name="TextBox 8">
+            <a:extLst>
+              <a:ext uri="{FF2B5EF4-FFF2-40B4-BE49-F238E27FC236}">
+                <a16:creationId xmlns:a16="http://schemas.microsoft.com/office/drawing/2014/main" id="{5EF59EB7-26FB-4149-97C9-0432BA02FF3E}"/>
+              </a:ext>
+            </a:extLst>
+          </p:cNvPr>
+          <p:cNvSpPr txBox="1"/>
+          <p:nvPr/>
+        </p:nvSpPr>
+        <p:spPr>
+          <a:xfrm>
+            <a:off x="5175248" y="4161022"/>
+            <a:ext cx="3086101" cy="523220"/>
+          </a:xfrm>
+          <a:prstGeom prst="rect">
+            <a:avLst/>
+          </a:prstGeom>
+          <a:noFill/>
+        </p:spPr>
+        <p:txBody>
+          <a:bodyPr wrap="none" rtlCol="0">
+            <a:spAutoFit/>
+          </a:bodyPr>
+          <a:lstStyle/>
+          <a:p>
+            <a:pPr algn="ctr"/>
+            <a:r>
+              <a:rPr lang="ru-RU" dirty="0"/>
+              <a:t>Число конфликтов на </a:t>
+            </a:r>
+            <a:r>
+              <a:rPr lang="ru-RU" dirty="0" err="1"/>
+              <a:t>подкадре</a:t>
+            </a:r>
+            <a:r>
+              <a:rPr lang="ru-RU" dirty="0"/>
+              <a:t> </a:t>
+            </a:r>
+          </a:p>
+          <a:p>
+            <a:pPr algn="ctr"/>
+            <a:r>
+              <a:rPr lang="ru-RU" dirty="0"/>
+              <a:t>(уникальные последовательности)</a:t>
+            </a:r>
+          </a:p>
+        </p:txBody>
+      </p:sp>
+    </p:spTree>
+    <p:extLst>
+      <p:ext uri="{BB962C8B-B14F-4D97-AF65-F5344CB8AC3E}">
+        <p14:creationId xmlns:p14="http://schemas.microsoft.com/office/powerpoint/2010/main" val="1834235151"/>
+      </p:ext>
+    </p:extLst>
+  </p:cSld>
+  <p:clrMapOvr>
+    <a:masterClrMapping/>
+  </p:clrMapOvr>
+</p:sld>
+</file>
+
+<file path=ppt/slides/slide16.xml><?xml version="1.0" encoding="utf-8"?>
+<p:sld xmlns:a="http://schemas.openxmlformats.org/drawingml/2006/main" xmlns:r="http://schemas.openxmlformats.org/officeDocument/2006/relationships" xmlns:p="http://schemas.openxmlformats.org/presentationml/2006/main">
+  <p:cSld>
+    <p:spTree>
+      <p:nvGrpSpPr>
+        <p:cNvPr id="1" name=""/>
+        <p:cNvGrpSpPr/>
+        <p:nvPr/>
+      </p:nvGrpSpPr>
+      <p:grpSpPr>
+        <a:xfrm>
+          <a:off x="0" y="0"/>
+          <a:ext cx="0" cy="0"/>
+          <a:chOff x="0" y="0"/>
+          <a:chExt cx="0" cy="0"/>
+        </a:xfrm>
+      </p:grpSpPr>
+      <p:sp>
+        <p:nvSpPr>
+          <p:cNvPr id="3" name="Заголовок 2">
+            <a:extLst>
+              <a:ext uri="{FF2B5EF4-FFF2-40B4-BE49-F238E27FC236}">
+                <a16:creationId xmlns:a16="http://schemas.microsoft.com/office/drawing/2014/main" id="{2FA0A401-9427-4FF8-B2C9-3D5D1A1210B9}"/>
+              </a:ext>
+            </a:extLst>
+          </p:cNvPr>
+          <p:cNvSpPr>
+            <a:spLocks noGrp="1"/>
+          </p:cNvSpPr>
+          <p:nvPr>
+            <p:ph type="title"/>
+          </p:nvPr>
+        </p:nvSpPr>
+        <p:spPr/>
+        <p:txBody>
+          <a:bodyPr/>
+          <a:lstStyle/>
+          <a:p>
+            <a:r>
+              <a:rPr lang="ru-RU" dirty="0"/>
+              <a:t>Математическая оценка вероятности потери пакета</a:t>
+            </a:r>
+          </a:p>
+        </p:txBody>
+      </p:sp>
+      <mc:AlternateContent xmlns:mc="http://schemas.openxmlformats.org/markup-compatibility/2006">
+        <mc:Choice xmlns:a14="http://schemas.microsoft.com/office/drawing/2010/main" Requires="a14">
+          <p:sp>
+            <p:nvSpPr>
+              <p:cNvPr id="4" name="Текст 1">
+                <a:extLst>
+                  <a:ext uri="{FF2B5EF4-FFF2-40B4-BE49-F238E27FC236}">
+                    <a16:creationId xmlns:a16="http://schemas.microsoft.com/office/drawing/2014/main" id="{C1EECF80-4F72-495D-8F8E-869F5AB55F23}"/>
+                  </a:ext>
+                </a:extLst>
+              </p:cNvPr>
+              <p:cNvSpPr>
+                <a:spLocks noGrp="1"/>
+              </p:cNvSpPr>
+              <p:nvPr>
+                <p:ph type="body" idx="1"/>
+              </p:nvPr>
+            </p:nvSpPr>
+            <p:spPr>
+              <a:xfrm>
+                <a:off x="313058" y="1394786"/>
+                <a:ext cx="8520416" cy="3195216"/>
+              </a:xfrm>
+            </p:spPr>
+            <p:txBody>
+              <a:bodyPr/>
+              <a:lstStyle/>
+              <a:p>
+                <a:pPr marL="88900" indent="0">
+                  <a:buNone/>
+                </a:pPr>
+                <a14:m>
+                  <m:oMathPara xmlns:m="http://schemas.openxmlformats.org/officeDocument/2006/math">
+                    <m:oMathParaPr>
+                      <m:jc m:val="centerGroup"/>
+                    </m:oMathParaPr>
+                    <m:oMath xmlns:m="http://schemas.openxmlformats.org/officeDocument/2006/math">
+                      <m:sSub>
+                        <m:sSubPr>
+                          <m:ctrlPr>
+                            <a:rPr lang="en-US" sz="1400" b="0" i="1" smtClean="0">
+                              <a:latin typeface="Cambria Math" panose="02040503050406030204" pitchFamily="18" charset="0"/>
+                            </a:rPr>
+                          </m:ctrlPr>
+                        </m:sSubPr>
+                        <m:e>
+                          <m:r>
+                            <a:rPr lang="en-US" sz="1400" b="0" i="1" smtClean="0">
+                              <a:latin typeface="Cambria Math" panose="02040503050406030204" pitchFamily="18" charset="0"/>
+                            </a:rPr>
+                            <m:t>𝑃</m:t>
+                          </m:r>
+                        </m:e>
+                        <m:sub>
+                          <m:r>
+                            <a:rPr lang="en-US" sz="1400" b="0" i="1" smtClean="0">
+                              <a:latin typeface="Cambria Math" panose="02040503050406030204" pitchFamily="18" charset="0"/>
+                            </a:rPr>
+                            <m:t>𝑒</m:t>
+                          </m:r>
+                        </m:sub>
+                      </m:sSub>
+                      <m:d>
+                        <m:dPr>
+                          <m:ctrlPr>
+                            <a:rPr lang="en-US" sz="1400" b="0" i="1" smtClean="0">
+                              <a:latin typeface="Cambria Math" panose="02040503050406030204" pitchFamily="18" charset="0"/>
+                            </a:rPr>
+                          </m:ctrlPr>
+                        </m:dPr>
+                        <m:e>
+                          <m:r>
+                            <a:rPr lang="en-US" sz="1400" b="0" i="1" smtClean="0">
+                              <a:latin typeface="Cambria Math" panose="02040503050406030204" pitchFamily="18" charset="0"/>
+                            </a:rPr>
+                            <m:t>𝑘</m:t>
+                          </m:r>
+                        </m:e>
+                      </m:d>
+                      <m:r>
+                        <a:rPr lang="en-US" sz="1400" b="0" i="1" smtClean="0">
+                          <a:latin typeface="Cambria Math" panose="02040503050406030204" pitchFamily="18" charset="0"/>
+                        </a:rPr>
+                        <m:t>=</m:t>
+                      </m:r>
+                      <m:sSub>
+                        <m:sSubPr>
+                          <m:ctrlPr>
+                            <a:rPr lang="en-US" sz="1400" i="1">
+                              <a:latin typeface="Cambria Math" panose="02040503050406030204" pitchFamily="18" charset="0"/>
+                            </a:rPr>
+                          </m:ctrlPr>
+                        </m:sSubPr>
+                        <m:e>
+                          <m:r>
+                            <a:rPr lang="en-US" sz="1400" i="1">
+                              <a:latin typeface="Cambria Math" panose="02040503050406030204" pitchFamily="18" charset="0"/>
+                            </a:rPr>
+                            <m:t>𝑃</m:t>
+                          </m:r>
+                        </m:e>
+                        <m:sub>
+                          <m:r>
+                            <a:rPr lang="en-US" sz="1400" b="0" i="1" smtClean="0">
+                              <a:latin typeface="Cambria Math" panose="02040503050406030204" pitchFamily="18" charset="0"/>
+                            </a:rPr>
+                            <m:t>𝑎</m:t>
+                          </m:r>
+                        </m:sub>
+                      </m:sSub>
+                      <m:d>
+                        <m:dPr>
+                          <m:ctrlPr>
+                            <a:rPr lang="en-US" sz="1400" i="1">
+                              <a:latin typeface="Cambria Math" panose="02040503050406030204" pitchFamily="18" charset="0"/>
+                            </a:rPr>
+                          </m:ctrlPr>
+                        </m:dPr>
+                        <m:e>
+                          <m:r>
+                            <a:rPr lang="en-US" sz="1400" i="1">
+                              <a:latin typeface="Cambria Math" panose="02040503050406030204" pitchFamily="18" charset="0"/>
+                            </a:rPr>
+                            <m:t>𝑘</m:t>
+                          </m:r>
+                        </m:e>
+                      </m:d>
+                      <m:r>
+                        <a:rPr lang="en-US" sz="1400" b="0" i="1" smtClean="0">
+                          <a:latin typeface="Cambria Math" panose="02040503050406030204" pitchFamily="18" charset="0"/>
+                        </a:rPr>
+                        <m:t> </m:t>
+                      </m:r>
+                      <m:sSup>
+                        <m:sSupPr>
+                          <m:ctrlPr>
+                            <a:rPr lang="en-US" sz="1400" b="0" i="1" smtClean="0">
+                              <a:latin typeface="Cambria Math" panose="02040503050406030204" pitchFamily="18" charset="0"/>
+                            </a:rPr>
+                          </m:ctrlPr>
+                        </m:sSupPr>
+                        <m:e>
+                          <m:d>
+                            <m:dPr>
+                              <m:ctrlPr>
+                                <a:rPr lang="en-US" sz="1400" b="0" i="1" smtClean="0">
+                                  <a:latin typeface="Cambria Math" panose="02040503050406030204" pitchFamily="18" charset="0"/>
+                                </a:rPr>
+                              </m:ctrlPr>
+                            </m:dPr>
+                            <m:e>
+                              <m:f>
+                                <m:fPr>
+                                  <m:type m:val="noBar"/>
+                                  <m:ctrlPr>
+                                    <a:rPr lang="en-US" sz="1400" b="0" i="1" smtClean="0">
+                                      <a:latin typeface="Cambria Math" panose="02040503050406030204" pitchFamily="18" charset="0"/>
+                                    </a:rPr>
+                                  </m:ctrlPr>
+                                </m:fPr>
+                                <m:num>
+                                  <m:r>
+                                    <a:rPr lang="en-US" sz="1400" b="0" i="1" smtClean="0">
+                                      <a:latin typeface="Cambria Math" panose="02040503050406030204" pitchFamily="18" charset="0"/>
+                                    </a:rPr>
+                                    <m:t>𝑀</m:t>
+                                  </m:r>
+                                </m:num>
+                                <m:den>
+                                  <m:r>
+                                    <a:rPr lang="en-US" sz="1400" b="0" i="1" smtClean="0">
+                                      <a:latin typeface="Cambria Math" panose="02040503050406030204" pitchFamily="18" charset="0"/>
+                                    </a:rPr>
+                                    <m:t>𝐾</m:t>
+                                  </m:r>
+                                </m:den>
+                              </m:f>
+                            </m:e>
+                          </m:d>
+                        </m:e>
+                        <m:sup>
+                          <m:r>
+                            <a:rPr lang="en-US" sz="1400" b="0" i="1" smtClean="0">
+                              <a:latin typeface="Cambria Math" panose="02040503050406030204" pitchFamily="18" charset="0"/>
+                            </a:rPr>
+                            <m:t>−1</m:t>
+                          </m:r>
+                        </m:sup>
+                      </m:sSup>
+                      <m:sSup>
+                        <m:sSupPr>
+                          <m:ctrlPr>
+                            <a:rPr lang="en-US" sz="1400" b="0" i="1" smtClean="0">
+                              <a:latin typeface="Cambria Math" panose="02040503050406030204" pitchFamily="18" charset="0"/>
+                            </a:rPr>
+                          </m:ctrlPr>
+                        </m:sSupPr>
+                        <m:e>
+                          <m:r>
+                            <a:rPr lang="en-US" sz="1400" b="0" i="1" smtClean="0">
+                              <a:latin typeface="Cambria Math" panose="02040503050406030204" pitchFamily="18" charset="0"/>
+                            </a:rPr>
+                            <m:t>𝑁</m:t>
+                          </m:r>
+                        </m:e>
+                        <m:sup>
+                          <m:r>
+                            <a:rPr lang="en-US" sz="1400" b="0" i="1" smtClean="0">
+                              <a:latin typeface="Cambria Math" panose="02040503050406030204" pitchFamily="18" charset="0"/>
+                            </a:rPr>
+                            <m:t>−1</m:t>
+                          </m:r>
+                        </m:sup>
+                      </m:sSup>
+                      <m:nary>
+                        <m:naryPr>
+                          <m:chr m:val="∑"/>
+                          <m:supHide m:val="on"/>
+                          <m:ctrlPr>
+                            <a:rPr lang="en-US" sz="1400" b="0" i="1" smtClean="0">
+                              <a:latin typeface="Cambria Math" panose="02040503050406030204" pitchFamily="18" charset="0"/>
+                            </a:rPr>
+                          </m:ctrlPr>
+                        </m:naryPr>
+                        <m:sub>
+                          <m:r>
+                            <m:rPr>
+                              <m:brk m:alnAt="7"/>
+                            </m:rPr>
+                            <a:rPr lang="en-US" sz="1400" b="0" i="1" smtClean="0">
+                              <a:latin typeface="Cambria Math" panose="02040503050406030204" pitchFamily="18" charset="0"/>
+                            </a:rPr>
+                            <m:t>(</m:t>
+                          </m:r>
+                          <m:sSub>
+                            <m:sSubPr>
+                              <m:ctrlPr>
+                                <a:rPr lang="en-US" sz="1400" b="0" i="1" smtClean="0">
+                                  <a:latin typeface="Cambria Math" panose="02040503050406030204" pitchFamily="18" charset="0"/>
+                                </a:rPr>
+                              </m:ctrlPr>
+                            </m:sSubPr>
+                            <m:e>
+                              <m:r>
+                                <m:rPr>
+                                  <m:brk m:alnAt="7"/>
+                                </m:rPr>
+                                <a:rPr lang="en-US" sz="1400" b="0" i="1" smtClean="0">
+                                  <a:latin typeface="Cambria Math" panose="02040503050406030204" pitchFamily="18" charset="0"/>
+                                </a:rPr>
+                                <m:t>𝑖</m:t>
+                              </m:r>
+                            </m:e>
+                            <m:sub>
+                              <m:r>
+                                <m:rPr>
+                                  <m:brk m:alnAt="7"/>
+                                </m:rPr>
+                                <a:rPr lang="en-US" sz="1400" b="0" i="1" smtClean="0">
+                                  <a:latin typeface="Cambria Math" panose="02040503050406030204" pitchFamily="18" charset="0"/>
+                                </a:rPr>
+                                <m:t>1</m:t>
+                              </m:r>
+                            </m:sub>
+                          </m:sSub>
+                          <m:r>
+                            <m:rPr>
+                              <m:brk m:alnAt="7"/>
+                            </m:rPr>
+                            <a:rPr lang="en-US" sz="1400" b="0" i="1" smtClean="0">
+                              <a:latin typeface="Cambria Math" panose="02040503050406030204" pitchFamily="18" charset="0"/>
+                            </a:rPr>
+                            <m:t>,..,</m:t>
+                          </m:r>
+                          <m:sSub>
+                            <m:sSubPr>
+                              <m:ctrlPr>
+                                <a:rPr lang="en-US" sz="1400" b="0" i="1" smtClean="0">
+                                  <a:latin typeface="Cambria Math" panose="02040503050406030204" pitchFamily="18" charset="0"/>
+                                </a:rPr>
+                              </m:ctrlPr>
+                            </m:sSubPr>
+                            <m:e>
+                              <m:r>
+                                <m:rPr>
+                                  <m:brk m:alnAt="7"/>
+                                </m:rPr>
+                                <a:rPr lang="en-US" sz="1400" b="0" i="1" smtClean="0">
+                                  <a:latin typeface="Cambria Math" panose="02040503050406030204" pitchFamily="18" charset="0"/>
+                                </a:rPr>
+                                <m:t>𝑖</m:t>
+                              </m:r>
+                            </m:e>
+                            <m:sub>
+                              <m:r>
+                                <m:rPr>
+                                  <m:brk m:alnAt="7"/>
+                                </m:rPr>
+                                <a:rPr lang="en-US" sz="1400" b="0" i="1" smtClean="0">
+                                  <a:latin typeface="Cambria Math" panose="02040503050406030204" pitchFamily="18" charset="0"/>
+                                </a:rPr>
+                                <m:t>𝑘</m:t>
+                              </m:r>
+                            </m:sub>
+                          </m:sSub>
+                          <m:r>
+                            <m:rPr>
+                              <m:brk m:alnAt="7"/>
+                            </m:rPr>
+                            <a:rPr lang="en-US" sz="1400" b="0" i="1" smtClean="0">
+                              <a:latin typeface="Cambria Math" panose="02040503050406030204" pitchFamily="18" charset="0"/>
+                            </a:rPr>
+                            <m:t>)</m:t>
+                          </m:r>
+                          <m:r>
+                            <a:rPr lang="en-US" sz="1400" b="0" i="1" smtClean="0">
+                              <a:latin typeface="Cambria Math" panose="02040503050406030204" pitchFamily="18" charset="0"/>
+                            </a:rPr>
+                            <m:t> </m:t>
+                          </m:r>
+                        </m:sub>
+                        <m:sup/>
+                        <m:e>
+                          <m:r>
+                            <a:rPr lang="en-US" sz="1400" b="0" i="1" smtClean="0">
+                              <a:latin typeface="Cambria Math" panose="02040503050406030204" pitchFamily="18" charset="0"/>
+                            </a:rPr>
+                            <m:t>𝑤</m:t>
+                          </m:r>
+                          <m:r>
+                            <a:rPr lang="en-US" sz="1400" b="0" i="1" smtClean="0">
+                              <a:latin typeface="Cambria Math" panose="02040503050406030204" pitchFamily="18" charset="0"/>
+                            </a:rPr>
+                            <m:t>(</m:t>
+                          </m:r>
+                          <m:sSub>
+                            <m:sSubPr>
+                              <m:ctrlPr>
+                                <a:rPr lang="en-US" sz="1400" b="0" i="1" smtClean="0">
+                                  <a:latin typeface="Cambria Math" panose="02040503050406030204" pitchFamily="18" charset="0"/>
+                                </a:rPr>
+                              </m:ctrlPr>
+                            </m:sSubPr>
+                            <m:e>
+                              <m:r>
+                                <a:rPr lang="en-US" sz="1400" b="0" i="1" smtClean="0">
+                                  <a:latin typeface="Cambria Math" panose="02040503050406030204" pitchFamily="18" charset="0"/>
+                                </a:rPr>
+                                <m:t>𝑥</m:t>
+                              </m:r>
+                            </m:e>
+                            <m:sub>
+                              <m:r>
+                                <a:rPr lang="en-US" sz="1400" b="0" i="1" smtClean="0">
+                                  <a:latin typeface="Cambria Math" panose="02040503050406030204" pitchFamily="18" charset="0"/>
+                                </a:rPr>
+                                <m:t>1</m:t>
+                              </m:r>
+                            </m:sub>
+                          </m:sSub>
+                          <m:r>
+                            <a:rPr lang="en-US" sz="1400" b="0" i="1" smtClean="0">
+                              <a:latin typeface="Cambria Math" panose="02040503050406030204" pitchFamily="18" charset="0"/>
+                            </a:rPr>
+                            <m:t>∩(</m:t>
+                          </m:r>
+                          <m:sSub>
+                            <m:sSubPr>
+                              <m:ctrlPr>
+                                <a:rPr lang="en-US" sz="1400" b="0" i="1" smtClean="0">
+                                  <a:latin typeface="Cambria Math" panose="02040503050406030204" pitchFamily="18" charset="0"/>
+                                </a:rPr>
+                              </m:ctrlPr>
+                            </m:sSubPr>
+                            <m:e>
+                              <m:r>
+                                <a:rPr lang="en-US" sz="1400" b="0" i="1" smtClean="0">
+                                  <a:latin typeface="Cambria Math" panose="02040503050406030204" pitchFamily="18" charset="0"/>
+                                </a:rPr>
+                                <m:t>𝑥</m:t>
+                              </m:r>
+                            </m:e>
+                            <m:sub>
+                              <m:sSub>
+                                <m:sSubPr>
+                                  <m:ctrlPr>
+                                    <a:rPr lang="en-US" sz="1400" b="0" i="1" smtClean="0">
+                                      <a:latin typeface="Cambria Math" panose="02040503050406030204" pitchFamily="18" charset="0"/>
+                                    </a:rPr>
+                                  </m:ctrlPr>
+                                </m:sSubPr>
+                                <m:e>
+                                  <m:r>
+                                    <a:rPr lang="en-US" sz="1400" b="0" i="1" smtClean="0">
+                                      <a:latin typeface="Cambria Math" panose="02040503050406030204" pitchFamily="18" charset="0"/>
+                                    </a:rPr>
+                                    <m:t>𝑖</m:t>
+                                  </m:r>
+                                </m:e>
+                                <m:sub>
+                                  <m:r>
+                                    <a:rPr lang="en-US" sz="1400" b="0" i="1" smtClean="0">
+                                      <a:latin typeface="Cambria Math" panose="02040503050406030204" pitchFamily="18" charset="0"/>
+                                    </a:rPr>
+                                    <m:t>1</m:t>
+                                  </m:r>
+                                </m:sub>
+                              </m:sSub>
+                            </m:sub>
+                          </m:sSub>
+                          <m:r>
+                            <a:rPr lang="en-US" sz="1400" b="0" i="1" smtClean="0">
+                              <a:latin typeface="Cambria Math" panose="02040503050406030204" pitchFamily="18" charset="0"/>
+                            </a:rPr>
+                            <m:t>∪</m:t>
+                          </m:r>
+                        </m:e>
+                      </m:nary>
+                      <m:sSub>
+                        <m:sSubPr>
+                          <m:ctrlPr>
+                            <a:rPr lang="en-US" sz="1400" i="1">
+                              <a:latin typeface="Cambria Math" panose="02040503050406030204" pitchFamily="18" charset="0"/>
+                            </a:rPr>
+                          </m:ctrlPr>
+                        </m:sSubPr>
+                        <m:e>
+                          <m:r>
+                            <a:rPr lang="en-US" sz="1400" i="1">
+                              <a:latin typeface="Cambria Math" panose="02040503050406030204" pitchFamily="18" charset="0"/>
+                            </a:rPr>
+                            <m:t>𝑥</m:t>
+                          </m:r>
+                        </m:e>
+                        <m:sub>
+                          <m:sSub>
+                            <m:sSubPr>
+                              <m:ctrlPr>
+                                <a:rPr lang="en-US" sz="1400" b="0" i="1" smtClean="0">
+                                  <a:latin typeface="Cambria Math" panose="02040503050406030204" pitchFamily="18" charset="0"/>
+                                </a:rPr>
+                              </m:ctrlPr>
+                            </m:sSubPr>
+                            <m:e>
+                              <m:r>
+                                <a:rPr lang="en-US" sz="1400" b="0" i="1" smtClean="0">
+                                  <a:latin typeface="Cambria Math" panose="02040503050406030204" pitchFamily="18" charset="0"/>
+                                </a:rPr>
+                                <m:t>𝑖</m:t>
+                              </m:r>
+                            </m:e>
+                            <m:sub>
+                              <m:r>
+                                <a:rPr lang="en-US" sz="1400" b="0" i="1" smtClean="0">
+                                  <a:latin typeface="Cambria Math" panose="02040503050406030204" pitchFamily="18" charset="0"/>
+                                </a:rPr>
+                                <m:t>2</m:t>
+                              </m:r>
+                            </m:sub>
+                          </m:sSub>
+                        </m:sub>
+                      </m:sSub>
+                      <m:r>
+                        <a:rPr lang="en-US" sz="1400" b="0" i="1" smtClean="0">
+                          <a:latin typeface="Cambria Math" panose="02040503050406030204" pitchFamily="18" charset="0"/>
+                        </a:rPr>
+                        <m:t>…∪</m:t>
+                      </m:r>
+                      <m:sSub>
+                        <m:sSubPr>
+                          <m:ctrlPr>
+                            <a:rPr lang="en-US" sz="1400" i="1">
+                              <a:latin typeface="Cambria Math" panose="02040503050406030204" pitchFamily="18" charset="0"/>
+                            </a:rPr>
+                          </m:ctrlPr>
+                        </m:sSubPr>
+                        <m:e>
+                          <m:r>
+                            <a:rPr lang="en-US" sz="1400" i="1">
+                              <a:latin typeface="Cambria Math" panose="02040503050406030204" pitchFamily="18" charset="0"/>
+                            </a:rPr>
+                            <m:t>𝑥</m:t>
+                          </m:r>
+                        </m:e>
+                        <m:sub>
+                          <m:sSub>
+                            <m:sSubPr>
+                              <m:ctrlPr>
+                                <a:rPr lang="en-US" sz="1400" b="0" i="1" smtClean="0">
+                                  <a:latin typeface="Cambria Math" panose="02040503050406030204" pitchFamily="18" charset="0"/>
+                                </a:rPr>
+                              </m:ctrlPr>
+                            </m:sSubPr>
+                            <m:e>
+                              <m:r>
+                                <a:rPr lang="en-US" sz="1400" b="0" i="1" smtClean="0">
+                                  <a:latin typeface="Cambria Math" panose="02040503050406030204" pitchFamily="18" charset="0"/>
+                                </a:rPr>
+                                <m:t>𝑖</m:t>
+                              </m:r>
+                            </m:e>
+                            <m:sub>
+                              <m:r>
+                                <a:rPr lang="en-US" sz="1400" b="0" i="1" smtClean="0">
+                                  <a:latin typeface="Cambria Math" panose="02040503050406030204" pitchFamily="18" charset="0"/>
+                                </a:rPr>
+                                <m:t>𝑘</m:t>
+                              </m:r>
+                            </m:sub>
+                          </m:sSub>
+                        </m:sub>
+                      </m:sSub>
+                      <m:r>
+                        <a:rPr lang="en-US" sz="1400" b="0" i="1" smtClean="0">
+                          <a:latin typeface="Cambria Math" panose="02040503050406030204" pitchFamily="18" charset="0"/>
+                        </a:rPr>
+                        <m:t> )</m:t>
+                      </m:r>
+                    </m:oMath>
+                  </m:oMathPara>
+                </a14:m>
+                <a:endParaRPr lang="en-US" sz="1400" b="0" dirty="0"/>
+              </a:p>
+              <a:p>
+                <a:pPr marL="88900" indent="0">
+                  <a:buNone/>
+                </a:pPr>
+                <a:endParaRPr lang="en-US" sz="1400" i="1" dirty="0">
+                  <a:latin typeface="Cambria Math" panose="02040503050406030204" pitchFamily="18" charset="0"/>
+                </a:endParaRPr>
+              </a:p>
+              <a:p>
+                <a:pPr marL="88900" indent="0">
+                  <a:buNone/>
+                </a:pPr>
+                <a14:m>
+                  <m:oMath xmlns:m="http://schemas.openxmlformats.org/officeDocument/2006/math">
+                    <m:sSub>
+                      <m:sSubPr>
+                        <m:ctrlPr>
+                          <a:rPr lang="en-US" sz="1400" i="1">
+                            <a:latin typeface="Cambria Math" panose="02040503050406030204" pitchFamily="18" charset="0"/>
+                          </a:rPr>
+                        </m:ctrlPr>
+                      </m:sSubPr>
+                      <m:e>
+                        <m:r>
+                          <a:rPr lang="en-US" sz="1400" i="1">
+                            <a:latin typeface="Cambria Math" panose="02040503050406030204" pitchFamily="18" charset="0"/>
+                          </a:rPr>
+                          <m:t>𝑃</m:t>
+                        </m:r>
+                      </m:e>
+                      <m:sub>
+                        <m:r>
+                          <a:rPr lang="en-US" sz="1400" i="1">
+                            <a:latin typeface="Cambria Math" panose="02040503050406030204" pitchFamily="18" charset="0"/>
+                          </a:rPr>
+                          <m:t>𝑎</m:t>
+                        </m:r>
+                      </m:sub>
+                    </m:sSub>
+                    <m:d>
+                      <m:dPr>
+                        <m:ctrlPr>
+                          <a:rPr lang="en-US" sz="1400" i="1">
+                            <a:latin typeface="Cambria Math" panose="02040503050406030204" pitchFamily="18" charset="0"/>
+                          </a:rPr>
+                        </m:ctrlPr>
+                      </m:dPr>
+                      <m:e>
+                        <m:r>
+                          <a:rPr lang="en-US" sz="1400" i="1">
+                            <a:latin typeface="Cambria Math" panose="02040503050406030204" pitchFamily="18" charset="0"/>
+                          </a:rPr>
+                          <m:t>𝑘</m:t>
+                        </m:r>
+                      </m:e>
+                    </m:d>
+                  </m:oMath>
+                </a14:m>
+                <a:r>
+                  <a:rPr lang="en-US" sz="1400" dirty="0"/>
+                  <a:t> --- </a:t>
+                </a:r>
+                <a:r>
+                  <a:rPr lang="ru-RU" sz="1400" dirty="0"/>
+                  <a:t>вероятность того, что </a:t>
+                </a:r>
+                <a:r>
+                  <a:rPr lang="en-US" sz="1400" dirty="0"/>
+                  <a:t>k </a:t>
+                </a:r>
+                <a:r>
+                  <a:rPr lang="ru-RU" sz="1400" dirty="0"/>
+                  <a:t>пользователей одновременно выйдут в канал.</a:t>
+                </a:r>
+                <a:endParaRPr lang="en-US" sz="1400" dirty="0"/>
+              </a:p>
+              <a:p>
+                <a:pPr marL="88900" indent="0">
+                  <a:buNone/>
+                </a:pPr>
+                <a14:m>
+                  <m:oMath xmlns:m="http://schemas.openxmlformats.org/officeDocument/2006/math">
+                    <m:r>
+                      <a:rPr lang="en-US" sz="1400" b="0" i="1" smtClean="0">
+                        <a:latin typeface="Cambria Math" panose="02040503050406030204" pitchFamily="18" charset="0"/>
+                      </a:rPr>
+                      <m:t>𝑁</m:t>
+                    </m:r>
+                  </m:oMath>
+                </a14:m>
+                <a:r>
+                  <a:rPr lang="en-US" sz="1400" i="1" dirty="0"/>
+                  <a:t> --- </a:t>
+                </a:r>
+                <a:r>
+                  <a:rPr lang="ru-RU" sz="1400" dirty="0"/>
+                  <a:t>это вес одного кадра.</a:t>
+                </a:r>
+              </a:p>
+              <a:p>
+                <a:pPr marL="88900" indent="0">
+                  <a:buNone/>
+                </a:pPr>
+                <a14:m>
+                  <m:oMath xmlns:m="http://schemas.openxmlformats.org/officeDocument/2006/math">
+                    <m:r>
+                      <a:rPr lang="en-US" sz="1400" b="0" i="1" smtClean="0">
+                        <a:latin typeface="Cambria Math" panose="02040503050406030204" pitchFamily="18" charset="0"/>
+                      </a:rPr>
+                      <m:t>𝑤</m:t>
+                    </m:r>
+                    <m:d>
+                      <m:dPr>
+                        <m:ctrlPr>
+                          <a:rPr lang="en-US" sz="1400" b="0" i="1" smtClean="0">
+                            <a:latin typeface="Cambria Math" panose="02040503050406030204" pitchFamily="18" charset="0"/>
+                          </a:rPr>
+                        </m:ctrlPr>
+                      </m:dPr>
+                      <m:e>
+                        <m:r>
+                          <a:rPr lang="en-US" sz="1400" b="0" i="1" smtClean="0">
+                            <a:latin typeface="Cambria Math" panose="02040503050406030204" pitchFamily="18" charset="0"/>
+                          </a:rPr>
+                          <m:t>..</m:t>
+                        </m:r>
+                      </m:e>
+                    </m:d>
+                  </m:oMath>
+                </a14:m>
+                <a:r>
+                  <a:rPr lang="en-US" sz="1400" i="1" dirty="0"/>
+                  <a:t> --- </a:t>
+                </a:r>
+                <a:r>
+                  <a:rPr lang="ru-RU" sz="1400" dirty="0"/>
+                  <a:t>число конфликтов.</a:t>
+                </a:r>
+                <a:endParaRPr lang="en-US" sz="1400" i="1" dirty="0"/>
+              </a:p>
+              <a:p>
+                <a:pPr marL="88900" indent="0">
+                  <a:buNone/>
+                </a:pPr>
+                <a:endParaRPr lang="ru-RU" sz="1400" dirty="0"/>
+              </a:p>
+            </p:txBody>
+          </p:sp>
+        </mc:Choice>
+        <mc:Fallback>
+          <p:sp>
+            <p:nvSpPr>
+              <p:cNvPr id="4" name="Текст 1">
+                <a:extLst>
+                  <a:ext uri="{FF2B5EF4-FFF2-40B4-BE49-F238E27FC236}">
+                    <a16:creationId xmlns:a16="http://schemas.microsoft.com/office/drawing/2014/main" id="{C1EECF80-4F72-495D-8F8E-869F5AB55F23}"/>
+                  </a:ext>
+                </a:extLst>
+              </p:cNvPr>
+              <p:cNvSpPr>
+                <a:spLocks noGrp="1" noRot="1" noChangeAspect="1" noMove="1" noResize="1" noEditPoints="1" noAdjustHandles="1" noChangeArrowheads="1" noChangeShapeType="1" noTextEdit="1"/>
+              </p:cNvSpPr>
+              <p:nvPr>
+                <p:ph type="body" idx="1"/>
+              </p:nvPr>
+            </p:nvSpPr>
+            <p:spPr>
+              <a:xfrm>
+                <a:off x="313058" y="1394786"/>
+                <a:ext cx="8520416" cy="3195216"/>
+              </a:xfrm>
+              <a:blipFill>
+                <a:blip r:embed="rId2"/>
+                <a:stretch>
+                  <a:fillRect/>
+                </a:stretch>
+              </a:blipFill>
+            </p:spPr>
+            <p:txBody>
+              <a:bodyPr/>
+              <a:lstStyle/>
+              <a:p>
+                <a:r>
+                  <a:rPr lang="ru-RU">
+                    <a:noFill/>
+                  </a:rPr>
+                  <a:t> </a:t>
+                </a:r>
+              </a:p>
+            </p:txBody>
+          </p:sp>
+        </mc:Fallback>
+      </mc:AlternateContent>
+    </p:spTree>
+    <p:extLst>
+      <p:ext uri="{BB962C8B-B14F-4D97-AF65-F5344CB8AC3E}">
+        <p14:creationId xmlns:p14="http://schemas.microsoft.com/office/powerpoint/2010/main" val="1265859957"/>
+      </p:ext>
+    </p:extLst>
+  </p:cSld>
+  <p:clrMapOvr>
+    <a:masterClrMapping/>
+  </p:clrMapOvr>
+</p:sld>
+</file>
+
+<file path=ppt/slides/slide17.xml><?xml version="1.0" encoding="utf-8"?>
+<p:sld xmlns:a="http://schemas.openxmlformats.org/drawingml/2006/main" xmlns:r="http://schemas.openxmlformats.org/officeDocument/2006/relationships" xmlns:p="http://schemas.openxmlformats.org/presentationml/2006/main">
+  <p:cSld>
+    <p:spTree>
+      <p:nvGrpSpPr>
+        <p:cNvPr id="1" name=""/>
+        <p:cNvGrpSpPr/>
+        <p:nvPr/>
+      </p:nvGrpSpPr>
+      <p:grpSpPr>
+        <a:xfrm>
+          <a:off x="0" y="0"/>
+          <a:ext cx="0" cy="0"/>
+          <a:chOff x="0" y="0"/>
+          <a:chExt cx="0" cy="0"/>
+        </a:xfrm>
+      </p:grpSpPr>
+      <p:sp>
+        <p:nvSpPr>
+          <p:cNvPr id="3" name="Заголовок 2">
+            <a:extLst>
+              <a:ext uri="{FF2B5EF4-FFF2-40B4-BE49-F238E27FC236}">
+                <a16:creationId xmlns:a16="http://schemas.microsoft.com/office/drawing/2014/main" id="{326B2F7C-4A6F-4901-8085-36FBCEBB22DC}"/>
+              </a:ext>
+            </a:extLst>
+          </p:cNvPr>
+          <p:cNvSpPr>
+            <a:spLocks noGrp="1"/>
+          </p:cNvSpPr>
+          <p:nvPr>
+            <p:ph type="title"/>
+          </p:nvPr>
+        </p:nvSpPr>
+        <p:spPr/>
+        <p:txBody>
+          <a:bodyPr/>
+          <a:lstStyle/>
+          <a:p>
+            <a:r>
+              <a:rPr lang="ru-RU" dirty="0"/>
+              <a:t>Моделирование</a:t>
+            </a:r>
+          </a:p>
+        </p:txBody>
+      </p:sp>
+      <p:pic>
+        <p:nvPicPr>
+          <p:cNvPr id="5" name="Рисунок 4">
+            <a:extLst>
+              <a:ext uri="{FF2B5EF4-FFF2-40B4-BE49-F238E27FC236}">
+                <a16:creationId xmlns:a16="http://schemas.microsoft.com/office/drawing/2014/main" id="{8D157D3A-0A92-45AB-A831-7DC220C9A103}"/>
+              </a:ext>
+            </a:extLst>
+          </p:cNvPr>
+          <p:cNvPicPr>
+            <a:picLocks noChangeAspect="1"/>
+          </p:cNvPicPr>
+          <p:nvPr/>
+        </p:nvPicPr>
+        <p:blipFill>
+          <a:blip r:embed="rId2"/>
+          <a:stretch>
+            <a:fillRect/>
+          </a:stretch>
+        </p:blipFill>
+        <p:spPr>
+          <a:xfrm>
+            <a:off x="2253718" y="1320601"/>
+            <a:ext cx="4623332" cy="3467498"/>
+          </a:xfrm>
+          <a:prstGeom prst="rect">
+            <a:avLst/>
+          </a:prstGeom>
+        </p:spPr>
+      </p:pic>
+    </p:spTree>
+    <p:extLst>
+      <p:ext uri="{BB962C8B-B14F-4D97-AF65-F5344CB8AC3E}">
+        <p14:creationId xmlns:p14="http://schemas.microsoft.com/office/powerpoint/2010/main" val="3601928344"/>
+      </p:ext>
+    </p:extLst>
+  </p:cSld>
+  <p:clrMapOvr>
+    <a:masterClrMapping/>
+  </p:clrMapOvr>
+</p:sld>
+</file>
+
+<file path=ppt/slides/slide18.xml><?xml version="1.0" encoding="utf-8"?>
+<p:sld xmlns:a="http://schemas.openxmlformats.org/drawingml/2006/main" xmlns:r="http://schemas.openxmlformats.org/officeDocument/2006/relationships" xmlns:p="http://schemas.openxmlformats.org/presentationml/2006/main">
+  <p:cSld>
+    <p:spTree>
+      <p:nvGrpSpPr>
+        <p:cNvPr id="1" name=""/>
+        <p:cNvGrpSpPr/>
+        <p:nvPr/>
+      </p:nvGrpSpPr>
+      <p:grpSpPr>
+        <a:xfrm>
+          <a:off x="0" y="0"/>
+          <a:ext cx="0" cy="0"/>
+          <a:chOff x="0" y="0"/>
+          <a:chExt cx="0" cy="0"/>
+        </a:xfrm>
+      </p:grpSpPr>
+      <p:sp>
+        <p:nvSpPr>
+          <p:cNvPr id="3" name="Заголовок 2">
+            <a:extLst>
+              <a:ext uri="{FF2B5EF4-FFF2-40B4-BE49-F238E27FC236}">
+                <a16:creationId xmlns:a16="http://schemas.microsoft.com/office/drawing/2014/main" id="{C194D3E0-A377-4839-A55A-81F5FF83EF8E}"/>
+              </a:ext>
+            </a:extLst>
+          </p:cNvPr>
+          <p:cNvSpPr>
+            <a:spLocks noGrp="1"/>
+          </p:cNvSpPr>
+          <p:nvPr>
+            <p:ph type="title"/>
+          </p:nvPr>
+        </p:nvSpPr>
+        <p:spPr/>
+        <p:txBody>
+          <a:bodyPr/>
+          <a:lstStyle/>
+          <a:p>
+            <a:r>
+              <a:rPr lang="ru-RU" dirty="0"/>
+              <a:t>Результаты</a:t>
+            </a:r>
+          </a:p>
+        </p:txBody>
+      </p:sp>
+      <p:sp>
+        <p:nvSpPr>
+          <p:cNvPr id="9" name="Текст 1">
+            <a:extLst>
+              <a:ext uri="{FF2B5EF4-FFF2-40B4-BE49-F238E27FC236}">
+                <a16:creationId xmlns:a16="http://schemas.microsoft.com/office/drawing/2014/main" id="{EAC0BB8B-1661-4D10-801E-8E2318A223EA}"/>
               </a:ext>
             </a:extLst>
           </p:cNvPr>
@@ -5211,60 +6925,39 @@
           <a:p>
             <a:r>
               <a:rPr lang="ru-RU" sz="1400" dirty="0"/>
-              <a:t>Генерация протокольных последовательностей определяющих поведение пользователя</a:t>
+              <a:t>Был разработан протокол взаимодействия в сети с возможностью исправления стираний</a:t>
             </a:r>
           </a:p>
           <a:p>
             <a:r>
-              <a:rPr lang="ru-RU" sz="1400"/>
-              <a:t>Построение симуляции</a:t>
+              <a:rPr lang="ru-RU" sz="1400" dirty="0"/>
+              <a:t>Даны оценки на вероятность потери пакетов в зависимости числа пользователей</a:t>
             </a:r>
+          </a:p>
+          <a:p>
+            <a:r>
+              <a:rPr lang="ru-RU" sz="1400" dirty="0"/>
+              <a:t>Проведено моделирование</a:t>
+            </a:r>
+          </a:p>
+          <a:p>
+            <a:endParaRPr lang="ru-RU" sz="1400" dirty="0"/>
+          </a:p>
+          <a:p>
+            <a:endParaRPr lang="ru-RU" sz="1400" dirty="0"/>
           </a:p>
           <a:p>
             <a:pPr marL="88900" indent="0">
               <a:buNone/>
             </a:pPr>
-            <a:endParaRPr lang="ru-RU" sz="1400" dirty="0"/>
-          </a:p>
-        </p:txBody>
-      </p:sp>
-      <p:sp>
-        <p:nvSpPr>
-          <p:cNvPr id="5" name="Заголовок 2">
-            <a:extLst>
-              <a:ext uri="{FF2B5EF4-FFF2-40B4-BE49-F238E27FC236}">
-                <a16:creationId xmlns:a16="http://schemas.microsoft.com/office/drawing/2014/main" id="{0CE9580C-746B-4F94-BAF5-887B6D7C1884}"/>
-              </a:ext>
-            </a:extLst>
-          </p:cNvPr>
-          <p:cNvSpPr>
-            <a:spLocks noGrp="1"/>
-          </p:cNvSpPr>
-          <p:nvPr>
-            <p:ph type="title"/>
-          </p:nvPr>
-        </p:nvSpPr>
-        <p:spPr>
-          <a:xfrm>
-            <a:off x="297295" y="553498"/>
-            <a:ext cx="8536179" cy="620483"/>
-          </a:xfrm>
-        </p:spPr>
-        <p:txBody>
-          <a:bodyPr/>
-          <a:lstStyle/>
-          <a:p>
-            <a:r>
-              <a:rPr lang="ru-RU" dirty="0"/>
-              <a:t>Следующие шаги</a:t>
-            </a:r>
+            <a:endParaRPr lang="ru-RU" dirty="0"/>
           </a:p>
         </p:txBody>
       </p:sp>
     </p:spTree>
     <p:extLst>
       <p:ext uri="{BB962C8B-B14F-4D97-AF65-F5344CB8AC3E}">
-        <p14:creationId xmlns:p14="http://schemas.microsoft.com/office/powerpoint/2010/main" val="652196779"/>
+        <p14:creationId xmlns:p14="http://schemas.microsoft.com/office/powerpoint/2010/main" val="56749900"/>
       </p:ext>
     </p:extLst>
   </p:cSld>
@@ -5279,7 +6972,7 @@
   <p:cSld>
     <p:spTree>
       <p:nvGrpSpPr>
-        <p:cNvPr id="1" name="Shape 29"/>
+        <p:cNvPr id="1" name="Shape 28"/>
         <p:cNvGrpSpPr/>
         <p:nvPr/>
       </p:nvGrpSpPr>
@@ -5293,13 +6986,7 @@
       </p:grpSpPr>
       <p:sp>
         <p:nvSpPr>
-          <p:cNvPr id="5" name="Google Shape;30;p5">
-            <a:extLst>
-              <a:ext uri="{FF2B5EF4-FFF2-40B4-BE49-F238E27FC236}">
-                <a16:creationId xmlns:a16="http://schemas.microsoft.com/office/drawing/2014/main" id="{79E6A75E-05D0-485B-B7F2-229B1316B7FF}"/>
-              </a:ext>
-            </a:extLst>
-          </p:cNvPr>
+          <p:cNvPr id="29" name="Google Shape;29;p5"/>
           <p:cNvSpPr txBox="1">
             <a:spLocks noGrp="1"/>
           </p:cNvSpPr>
@@ -5322,15 +7009,7 @@
           </a:bodyPr>
           <a:lstStyle/>
           <a:p>
-            <a:pPr marL="0" lvl="0" indent="0" algn="l" rtl="0">
-              <a:spcBef>
-                <a:spcPts val="0"/>
-              </a:spcBef>
-              <a:spcAft>
-                <a:spcPts val="0"/>
-              </a:spcAft>
-              <a:buNone/>
-            </a:pPr>
+            <a:pPr lvl="0"/>
             <a:r>
               <a:rPr lang="ru-RU" dirty="0"/>
               <a:t>Объект исследования</a:t>
@@ -5341,10 +7020,10 @@
       </p:sp>
       <p:grpSp>
         <p:nvGrpSpPr>
-          <p:cNvPr id="6" name="Группа 5">
+          <p:cNvPr id="4" name="Группа 3">
             <a:extLst>
               <a:ext uri="{FF2B5EF4-FFF2-40B4-BE49-F238E27FC236}">
-                <a16:creationId xmlns:a16="http://schemas.microsoft.com/office/drawing/2014/main" id="{7F87DAA5-2263-4C4A-B41D-99F3C6C6863F}"/>
+                <a16:creationId xmlns:a16="http://schemas.microsoft.com/office/drawing/2014/main" id="{D5A5C8C2-1F6D-4384-9003-EBC334B20C51}"/>
               </a:ext>
             </a:extLst>
           </p:cNvPr>
@@ -5361,10 +7040,10 @@
         </p:grpSpPr>
         <p:pic>
           <p:nvPicPr>
-            <p:cNvPr id="7" name="Рисунок 6">
+            <p:cNvPr id="5" name="Рисунок 4">
               <a:extLst>
                 <a:ext uri="{FF2B5EF4-FFF2-40B4-BE49-F238E27FC236}">
-                  <a16:creationId xmlns:a16="http://schemas.microsoft.com/office/drawing/2014/main" id="{0267B941-120E-42D1-A17B-F7CDB3FCD2FF}"/>
+                  <a16:creationId xmlns:a16="http://schemas.microsoft.com/office/drawing/2014/main" id="{A8B8E274-1B31-436C-B05F-C57181261B2C}"/>
                 </a:ext>
               </a:extLst>
             </p:cNvPr>
@@ -5391,10 +7070,10 @@
         </p:pic>
         <p:sp>
           <p:nvSpPr>
-            <p:cNvPr id="8" name="TextBox 7">
+            <p:cNvPr id="6" name="TextBox 5">
               <a:extLst>
                 <a:ext uri="{FF2B5EF4-FFF2-40B4-BE49-F238E27FC236}">
-                  <a16:creationId xmlns:a16="http://schemas.microsoft.com/office/drawing/2014/main" id="{F0527410-567A-4C7E-BCBD-67C8BE557F14}"/>
+                  <a16:creationId xmlns:a16="http://schemas.microsoft.com/office/drawing/2014/main" id="{1D6D5B04-F7E4-4B35-9220-C6D4E9A5C2B4}"/>
                 </a:ext>
               </a:extLst>
             </p:cNvPr>
@@ -5463,10 +7142,38 @@
       </p:grpSpPr>
       <p:sp>
         <p:nvSpPr>
-          <p:cNvPr id="6" name="Текст 1">
+          <p:cNvPr id="3" name="Заголовок 2">
             <a:extLst>
               <a:ext uri="{FF2B5EF4-FFF2-40B4-BE49-F238E27FC236}">
-                <a16:creationId xmlns:a16="http://schemas.microsoft.com/office/drawing/2014/main" id="{3B63EC78-E92F-4BE3-8670-947FF4BC5A55}"/>
+                <a16:creationId xmlns:a16="http://schemas.microsoft.com/office/drawing/2014/main" id="{F2DE4FB7-9BEA-4D91-8297-C52A246CD501}"/>
+              </a:ext>
+            </a:extLst>
+          </p:cNvPr>
+          <p:cNvSpPr>
+            <a:spLocks noGrp="1"/>
+          </p:cNvSpPr>
+          <p:nvPr>
+            <p:ph type="title"/>
+          </p:nvPr>
+        </p:nvSpPr>
+        <p:spPr/>
+        <p:txBody>
+          <a:bodyPr/>
+          <a:lstStyle/>
+          <a:p>
+            <a:r>
+              <a:rPr lang="ru-RU" dirty="0"/>
+              <a:t>Формулировка проблемы</a:t>
+            </a:r>
+          </a:p>
+        </p:txBody>
+      </p:sp>
+      <p:sp>
+        <p:nvSpPr>
+          <p:cNvPr id="4" name="Текст 1">
+            <a:extLst>
+              <a:ext uri="{FF2B5EF4-FFF2-40B4-BE49-F238E27FC236}">
+                <a16:creationId xmlns:a16="http://schemas.microsoft.com/office/drawing/2014/main" id="{9CBC2749-2C76-4350-955D-031C3F13D2D3}"/>
               </a:ext>
             </a:extLst>
           </p:cNvPr>
@@ -5513,43 +7220,10 @@
           </a:p>
         </p:txBody>
       </p:sp>
-      <p:sp>
-        <p:nvSpPr>
-          <p:cNvPr id="7" name="Заголовок 2">
-            <a:extLst>
-              <a:ext uri="{FF2B5EF4-FFF2-40B4-BE49-F238E27FC236}">
-                <a16:creationId xmlns:a16="http://schemas.microsoft.com/office/drawing/2014/main" id="{6987A96F-EC4F-4B2C-999B-41A9A1877F46}"/>
-              </a:ext>
-            </a:extLst>
-          </p:cNvPr>
-          <p:cNvSpPr>
-            <a:spLocks noGrp="1"/>
-          </p:cNvSpPr>
-          <p:nvPr>
-            <p:ph type="title"/>
-          </p:nvPr>
-        </p:nvSpPr>
-        <p:spPr>
-          <a:xfrm>
-            <a:off x="297295" y="553498"/>
-            <a:ext cx="8536179" cy="620483"/>
-          </a:xfrm>
-        </p:spPr>
-        <p:txBody>
-          <a:bodyPr/>
-          <a:lstStyle/>
-          <a:p>
-            <a:r>
-              <a:rPr lang="ru-RU" dirty="0"/>
-              <a:t>Формулировка проблемы</a:t>
-            </a:r>
-          </a:p>
-        </p:txBody>
-      </p:sp>
     </p:spTree>
     <p:extLst>
       <p:ext uri="{BB962C8B-B14F-4D97-AF65-F5344CB8AC3E}">
-        <p14:creationId xmlns:p14="http://schemas.microsoft.com/office/powerpoint/2010/main" val="1762395578"/>
+        <p14:creationId xmlns:p14="http://schemas.microsoft.com/office/powerpoint/2010/main" val="860329617"/>
       </p:ext>
     </p:extLst>
   </p:cSld>
@@ -5578,10 +7252,38 @@
       </p:grpSpPr>
       <p:sp>
         <p:nvSpPr>
-          <p:cNvPr id="6" name="Текст 1">
+          <p:cNvPr id="3" name="Заголовок 2">
             <a:extLst>
               <a:ext uri="{FF2B5EF4-FFF2-40B4-BE49-F238E27FC236}">
-                <a16:creationId xmlns:a16="http://schemas.microsoft.com/office/drawing/2014/main" id="{2B4F86BF-0890-4294-8D2D-BB4BFC60B2CA}"/>
+                <a16:creationId xmlns:a16="http://schemas.microsoft.com/office/drawing/2014/main" id="{3B2AFBF8-EB11-4951-8D0C-6946BD121C9E}"/>
+              </a:ext>
+            </a:extLst>
+          </p:cNvPr>
+          <p:cNvSpPr>
+            <a:spLocks noGrp="1"/>
+          </p:cNvSpPr>
+          <p:nvPr>
+            <p:ph type="title"/>
+          </p:nvPr>
+        </p:nvSpPr>
+        <p:spPr/>
+        <p:txBody>
+          <a:bodyPr/>
+          <a:lstStyle/>
+          <a:p>
+            <a:r>
+              <a:rPr lang="ru-RU" dirty="0"/>
+              <a:t>Актуальность работы</a:t>
+            </a:r>
+          </a:p>
+        </p:txBody>
+      </p:sp>
+      <p:sp>
+        <p:nvSpPr>
+          <p:cNvPr id="4" name="Текст 1">
+            <a:extLst>
+              <a:ext uri="{FF2B5EF4-FFF2-40B4-BE49-F238E27FC236}">
+                <a16:creationId xmlns:a16="http://schemas.microsoft.com/office/drawing/2014/main" id="{2392D68F-1584-4862-92DD-A23072009525}"/>
               </a:ext>
             </a:extLst>
           </p:cNvPr>
@@ -5607,48 +7309,7 @@
             </a:pPr>
             <a:r>
               <a:rPr lang="ru-RU" sz="1400" dirty="0"/>
-              <a:t>С развитием сетей </a:t>
-            </a:r>
-            <a:r>
-              <a:rPr lang="en-US" sz="1400" dirty="0"/>
-              <a:t>VANET </a:t>
-            </a:r>
-            <a:r>
-              <a:rPr lang="ru-RU" sz="1400" dirty="0"/>
-              <a:t>в сценариях высоконагруженных шоссе, важно иметь маленькие задержки при передачи, а также минимизировать число потерянных данных.</a:t>
-            </a:r>
-          </a:p>
-        </p:txBody>
-      </p:sp>
-      <p:sp>
-        <p:nvSpPr>
-          <p:cNvPr id="7" name="Заголовок 2">
-            <a:extLst>
-              <a:ext uri="{FF2B5EF4-FFF2-40B4-BE49-F238E27FC236}">
-                <a16:creationId xmlns:a16="http://schemas.microsoft.com/office/drawing/2014/main" id="{AC977F7B-C938-4FCD-8D18-F4376CD418B5}"/>
-              </a:ext>
-            </a:extLst>
-          </p:cNvPr>
-          <p:cNvSpPr>
-            <a:spLocks noGrp="1"/>
-          </p:cNvSpPr>
-          <p:nvPr>
-            <p:ph type="title"/>
-          </p:nvPr>
-        </p:nvSpPr>
-        <p:spPr>
-          <a:xfrm>
-            <a:off x="297295" y="553498"/>
-            <a:ext cx="8536179" cy="620483"/>
-          </a:xfrm>
-        </p:spPr>
-        <p:txBody>
-          <a:bodyPr/>
-          <a:lstStyle/>
-          <a:p>
-            <a:r>
-              <a:rPr lang="ru-RU" dirty="0"/>
-              <a:t>Актуальность работы</a:t>
+              <a:t>В данный момент существующие стандарты не предоставляют подходящих решений для V2V взаимодействия в сетях VANET. От протоколов требуется маленькая задержка при передаче, а также высокая надежность. Проводятся разные исследования в этой области и одно из направления это применение кодов для реализации протокола.</a:t>
             </a:r>
           </a:p>
         </p:txBody>
@@ -5656,7 +7317,7 @@
     </p:spTree>
     <p:extLst>
       <p:ext uri="{BB962C8B-B14F-4D97-AF65-F5344CB8AC3E}">
-        <p14:creationId xmlns:p14="http://schemas.microsoft.com/office/powerpoint/2010/main" val="3897829083"/>
+        <p14:creationId xmlns:p14="http://schemas.microsoft.com/office/powerpoint/2010/main" val="2797608605"/>
       </p:ext>
     </p:extLst>
   </p:cSld>
@@ -5685,10 +7346,38 @@
       </p:grpSpPr>
       <p:sp>
         <p:nvSpPr>
+          <p:cNvPr id="3" name="Заголовок 2">
+            <a:extLst>
+              <a:ext uri="{FF2B5EF4-FFF2-40B4-BE49-F238E27FC236}">
+                <a16:creationId xmlns:a16="http://schemas.microsoft.com/office/drawing/2014/main" id="{6C7D9A53-81B4-4E38-B9BF-C27391F41BBD}"/>
+              </a:ext>
+            </a:extLst>
+          </p:cNvPr>
+          <p:cNvSpPr>
+            <a:spLocks noGrp="1"/>
+          </p:cNvSpPr>
+          <p:nvPr>
+            <p:ph type="title"/>
+          </p:nvPr>
+        </p:nvSpPr>
+        <p:spPr/>
+        <p:txBody>
+          <a:bodyPr/>
+          <a:lstStyle/>
+          <a:p>
+            <a:r>
+              <a:rPr lang="ru-RU" dirty="0"/>
+              <a:t>Задачи</a:t>
+            </a:r>
+          </a:p>
+        </p:txBody>
+      </p:sp>
+      <p:sp>
+        <p:nvSpPr>
           <p:cNvPr id="4" name="Текст 1">
             <a:extLst>
               <a:ext uri="{FF2B5EF4-FFF2-40B4-BE49-F238E27FC236}">
-                <a16:creationId xmlns:a16="http://schemas.microsoft.com/office/drawing/2014/main" id="{E20FD960-21D0-4CED-BBA0-4E9AA2C8DBFA}"/>
+                <a16:creationId xmlns:a16="http://schemas.microsoft.com/office/drawing/2014/main" id="{3ECAF6E7-5C1A-49B5-9C4F-0AD8AE0B91CC}"/>
               </a:ext>
             </a:extLst>
           </p:cNvPr>
@@ -5743,8 +7432,26 @@
             </a:pPr>
             <a:r>
               <a:rPr lang="ru-RU" sz="1400" dirty="0"/>
-              <a:t>Построение симуляции и анализ результатов.</a:t>
+              <a:t>Оценка вероятности потери пакета с заданным набором протокольных последовательностей.</a:t>
             </a:r>
+          </a:p>
+          <a:p>
+            <a:pPr marL="546100" indent="-457200">
+              <a:buSzPct val="100000"/>
+              <a:buFont typeface="Open Sans"/>
+              <a:buAutoNum type="arabicPeriod"/>
+            </a:pPr>
+            <a:r>
+              <a:rPr lang="ru-RU" sz="1400" dirty="0"/>
+              <a:t>Моделирование доступа в канал и анализ результатов.</a:t>
+            </a:r>
+          </a:p>
+          <a:p>
+            <a:pPr marL="546100" indent="-457200">
+              <a:buSzPct val="100000"/>
+              <a:buAutoNum type="arabicPeriod"/>
+            </a:pPr>
+            <a:endParaRPr lang="ru-RU" sz="1400" dirty="0"/>
           </a:p>
           <a:p>
             <a:pPr marL="546100" indent="-457200">
@@ -5761,43 +7468,10 @@
           </a:p>
         </p:txBody>
       </p:sp>
-      <p:sp>
-        <p:nvSpPr>
-          <p:cNvPr id="5" name="Заголовок 2">
-            <a:extLst>
-              <a:ext uri="{FF2B5EF4-FFF2-40B4-BE49-F238E27FC236}">
-                <a16:creationId xmlns:a16="http://schemas.microsoft.com/office/drawing/2014/main" id="{EA273886-30EF-4878-AB3D-C378ED82FC1A}"/>
-              </a:ext>
-            </a:extLst>
-          </p:cNvPr>
-          <p:cNvSpPr>
-            <a:spLocks noGrp="1"/>
-          </p:cNvSpPr>
-          <p:nvPr>
-            <p:ph type="title"/>
-          </p:nvPr>
-        </p:nvSpPr>
-        <p:spPr>
-          <a:xfrm>
-            <a:off x="297295" y="553498"/>
-            <a:ext cx="8536179" cy="620483"/>
-          </a:xfrm>
-        </p:spPr>
-        <p:txBody>
-          <a:bodyPr/>
-          <a:lstStyle/>
-          <a:p>
-            <a:r>
-              <a:rPr lang="ru-RU" dirty="0"/>
-              <a:t>Задачи</a:t>
-            </a:r>
-          </a:p>
-        </p:txBody>
-      </p:sp>
     </p:spTree>
     <p:extLst>
       <p:ext uri="{BB962C8B-B14F-4D97-AF65-F5344CB8AC3E}">
-        <p14:creationId xmlns:p14="http://schemas.microsoft.com/office/powerpoint/2010/main" val="34021689"/>
+        <p14:creationId xmlns:p14="http://schemas.microsoft.com/office/powerpoint/2010/main" val="4266115458"/>
       </p:ext>
     </p:extLst>
   </p:cSld>
@@ -5826,10 +7500,38 @@
       </p:grpSpPr>
       <p:sp>
         <p:nvSpPr>
-          <p:cNvPr id="6" name="Текст 1">
+          <p:cNvPr id="3" name="Заголовок 2">
             <a:extLst>
               <a:ext uri="{FF2B5EF4-FFF2-40B4-BE49-F238E27FC236}">
-                <a16:creationId xmlns:a16="http://schemas.microsoft.com/office/drawing/2014/main" id="{3B22BF12-A355-443A-A45B-44BAC94D5314}"/>
+                <a16:creationId xmlns:a16="http://schemas.microsoft.com/office/drawing/2014/main" id="{B5BB6D02-E0EF-47EC-A670-AEB1363E8AC1}"/>
+              </a:ext>
+            </a:extLst>
+          </p:cNvPr>
+          <p:cNvSpPr>
+            <a:spLocks noGrp="1"/>
+          </p:cNvSpPr>
+          <p:nvPr>
+            <p:ph type="title"/>
+          </p:nvPr>
+        </p:nvSpPr>
+        <p:spPr/>
+        <p:txBody>
+          <a:bodyPr/>
+          <a:lstStyle/>
+          <a:p>
+            <a:r>
+              <a:rPr lang="ru-RU" dirty="0"/>
+              <a:t>Исправление стираний</a:t>
+            </a:r>
+          </a:p>
+        </p:txBody>
+      </p:sp>
+      <p:sp>
+        <p:nvSpPr>
+          <p:cNvPr id="5" name="Текст 1">
+            <a:extLst>
+              <a:ext uri="{FF2B5EF4-FFF2-40B4-BE49-F238E27FC236}">
+                <a16:creationId xmlns:a16="http://schemas.microsoft.com/office/drawing/2014/main" id="{1DE754C2-1A28-4066-992E-82F358630BB0}"/>
               </a:ext>
             </a:extLst>
           </p:cNvPr>
@@ -5893,43 +7595,10 @@
           </a:p>
         </p:txBody>
       </p:sp>
-      <p:sp>
-        <p:nvSpPr>
-          <p:cNvPr id="7" name="Заголовок 2">
-            <a:extLst>
-              <a:ext uri="{FF2B5EF4-FFF2-40B4-BE49-F238E27FC236}">
-                <a16:creationId xmlns:a16="http://schemas.microsoft.com/office/drawing/2014/main" id="{7242ED8A-E61B-414E-8FD6-AD557409C575}"/>
-              </a:ext>
-            </a:extLst>
-          </p:cNvPr>
-          <p:cNvSpPr>
-            <a:spLocks noGrp="1"/>
-          </p:cNvSpPr>
-          <p:nvPr>
-            <p:ph type="title"/>
-          </p:nvPr>
-        </p:nvSpPr>
-        <p:spPr>
-          <a:xfrm>
-            <a:off x="297295" y="553498"/>
-            <a:ext cx="8536179" cy="620483"/>
-          </a:xfrm>
-        </p:spPr>
-        <p:txBody>
-          <a:bodyPr/>
-          <a:lstStyle/>
-          <a:p>
-            <a:r>
-              <a:rPr lang="ru-RU" dirty="0"/>
-              <a:t>Исправление стираний</a:t>
-            </a:r>
-          </a:p>
-        </p:txBody>
-      </p:sp>
     </p:spTree>
     <p:extLst>
       <p:ext uri="{BB962C8B-B14F-4D97-AF65-F5344CB8AC3E}">
-        <p14:creationId xmlns:p14="http://schemas.microsoft.com/office/powerpoint/2010/main" val="4274940129"/>
+        <p14:creationId xmlns:p14="http://schemas.microsoft.com/office/powerpoint/2010/main" val="3485103081"/>
       </p:ext>
     </p:extLst>
   </p:cSld>
@@ -5956,14 +7625,42 @@
           <a:chExt cx="0" cy="0"/>
         </a:xfrm>
       </p:grpSpPr>
+      <p:sp>
+        <p:nvSpPr>
+          <p:cNvPr id="3" name="Заголовок 2">
+            <a:extLst>
+              <a:ext uri="{FF2B5EF4-FFF2-40B4-BE49-F238E27FC236}">
+                <a16:creationId xmlns:a16="http://schemas.microsoft.com/office/drawing/2014/main" id="{44258BED-0822-453F-9FAC-730E59589E89}"/>
+              </a:ext>
+            </a:extLst>
+          </p:cNvPr>
+          <p:cNvSpPr>
+            <a:spLocks noGrp="1"/>
+          </p:cNvSpPr>
+          <p:nvPr>
+            <p:ph type="title"/>
+          </p:nvPr>
+        </p:nvSpPr>
+        <p:spPr/>
+        <p:txBody>
+          <a:bodyPr/>
+          <a:lstStyle/>
+          <a:p>
+            <a:r>
+              <a:rPr lang="ru-RU" dirty="0"/>
+              <a:t>Выбор кода</a:t>
+            </a:r>
+          </a:p>
+        </p:txBody>
+      </p:sp>
       <mc:AlternateContent xmlns:mc="http://schemas.openxmlformats.org/markup-compatibility/2006">
         <mc:Choice xmlns:a14="http://schemas.microsoft.com/office/drawing/2010/main" Requires="a14">
           <p:sp>
             <p:nvSpPr>
-              <p:cNvPr id="4" name="Текст 1">
+              <p:cNvPr id="5" name="Текст 1">
                 <a:extLst>
                   <a:ext uri="{FF2B5EF4-FFF2-40B4-BE49-F238E27FC236}">
-                    <a16:creationId xmlns:a16="http://schemas.microsoft.com/office/drawing/2014/main" id="{6FC01B30-65A4-4C60-84F8-7997FF08059E}"/>
+                    <a16:creationId xmlns:a16="http://schemas.microsoft.com/office/drawing/2014/main" id="{C5D16340-A6DD-4714-9F44-2851749916FC}"/>
                   </a:ext>
                 </a:extLst>
               </p:cNvPr>
@@ -5989,7 +7686,72 @@
                 </a:pPr>
                 <a:r>
                   <a:rPr lang="ru-RU" sz="1400" dirty="0"/>
-                  <a:t>Первым делом при выполнение работы необходимо было выбрать код, который будет использоваться для исправления стираний. Проанализировав работы из смежных областей, выбор пал на код, с порождающей матрицей</a:t>
+                  <a:t>Первым делом при выполнение работы необходимо было выбрать код, который будет использоваться для исправления стираний. Был рассмотрен класс кодов </a:t>
+                </a:r>
+                <a:r>
+                  <a:rPr lang="en-US" sz="1400" dirty="0"/>
+                  <a:t>c </a:t>
+                </a:r>
+                <a14:m>
+                  <m:oMath xmlns:m="http://schemas.openxmlformats.org/officeDocument/2006/math">
+                    <m:r>
+                      <a:rPr lang="en-US" sz="1400" b="0" i="1" smtClean="0">
+                        <a:latin typeface="Cambria Math" panose="02040503050406030204" pitchFamily="18" charset="0"/>
+                      </a:rPr>
+                      <m:t>𝑅</m:t>
+                    </m:r>
+                    <m:r>
+                      <a:rPr lang="en-US" sz="1400" b="0" i="1" smtClean="0">
+                        <a:latin typeface="Cambria Math" panose="02040503050406030204" pitchFamily="18" charset="0"/>
+                      </a:rPr>
+                      <m:t>=</m:t>
+                    </m:r>
+                    <m:f>
+                      <m:fPr>
+                        <m:ctrlPr>
+                          <a:rPr lang="en-US" sz="1400" b="0" i="1" smtClean="0">
+                            <a:latin typeface="Cambria Math" panose="02040503050406030204" pitchFamily="18" charset="0"/>
+                          </a:rPr>
+                        </m:ctrlPr>
+                      </m:fPr>
+                      <m:num>
+                        <m:r>
+                          <a:rPr lang="en-US" sz="1400" b="0" i="1" smtClean="0">
+                            <a:latin typeface="Cambria Math" panose="02040503050406030204" pitchFamily="18" charset="0"/>
+                          </a:rPr>
+                          <m:t>(</m:t>
+                        </m:r>
+                        <m:r>
+                          <a:rPr lang="en-US" sz="1400" b="0" i="1" smtClean="0">
+                            <a:latin typeface="Cambria Math" panose="02040503050406030204" pitchFamily="18" charset="0"/>
+                          </a:rPr>
+                          <m:t>𝑛</m:t>
+                        </m:r>
+                        <m:r>
+                          <a:rPr lang="en-US" sz="1400" b="0" i="1" smtClean="0">
+                            <a:latin typeface="Cambria Math" panose="02040503050406030204" pitchFamily="18" charset="0"/>
+                          </a:rPr>
+                          <m:t>−1)</m:t>
+                        </m:r>
+                      </m:num>
+                      <m:den>
+                        <m:r>
+                          <a:rPr lang="en-US" sz="1400" b="0" i="1" smtClean="0">
+                            <a:latin typeface="Cambria Math" panose="02040503050406030204" pitchFamily="18" charset="0"/>
+                          </a:rPr>
+                          <m:t>𝑛</m:t>
+                        </m:r>
+                      </m:den>
+                    </m:f>
+                  </m:oMath>
+                </a14:m>
+                <a:r>
+                  <a:rPr lang="en-US" sz="1400" dirty="0"/>
+                  <a:t>. </a:t>
+                </a:r>
+                <a:r>
+                  <a:rPr lang="ru-RU" sz="1400" dirty="0"/>
+                  <a:t>Проанализировав работы из смежных областей, выбор пал на код, с порождающей матрицей</a:t>
                 </a:r>
                 <a:r>
                   <a:rPr lang="en-US" sz="1400" dirty="0"/>
@@ -6367,6 +8129,10 @@
                     </m:r>
                   </m:oMath>
                 </a14:m>
+                <a:r>
+                  <a:rPr lang="ru-RU" sz="1400" b="0" dirty="0"/>
+                  <a:t> На примере этого кода, покажем алгоритмы кодирования и декодирования.</a:t>
+                </a:r>
                 <a:endParaRPr lang="en-US" sz="1400" b="0" dirty="0"/>
               </a:p>
               <a:p>
@@ -6381,10 +8147,10 @@
         <mc:Fallback>
           <p:sp>
             <p:nvSpPr>
-              <p:cNvPr id="4" name="Текст 1">
+              <p:cNvPr id="5" name="Текст 1">
                 <a:extLst>
                   <a:ext uri="{FF2B5EF4-FFF2-40B4-BE49-F238E27FC236}">
-                    <a16:creationId xmlns:a16="http://schemas.microsoft.com/office/drawing/2014/main" id="{6FC01B30-65A4-4C60-84F8-7997FF08059E}"/>
+                    <a16:creationId xmlns:a16="http://schemas.microsoft.com/office/drawing/2014/main" id="{C5D16340-A6DD-4714-9F44-2851749916FC}"/>
                   </a:ext>
                 </a:extLst>
               </p:cNvPr>
@@ -6422,43 +8188,10 @@
           </p:sp>
         </mc:Fallback>
       </mc:AlternateContent>
-      <p:sp>
-        <p:nvSpPr>
-          <p:cNvPr id="5" name="Заголовок 2">
-            <a:extLst>
-              <a:ext uri="{FF2B5EF4-FFF2-40B4-BE49-F238E27FC236}">
-                <a16:creationId xmlns:a16="http://schemas.microsoft.com/office/drawing/2014/main" id="{FBA9CB23-2E83-4DF9-AB71-D367FCB49320}"/>
-              </a:ext>
-            </a:extLst>
-          </p:cNvPr>
-          <p:cNvSpPr>
-            <a:spLocks noGrp="1"/>
-          </p:cNvSpPr>
-          <p:nvPr>
-            <p:ph type="title"/>
-          </p:nvPr>
-        </p:nvSpPr>
-        <p:spPr>
-          <a:xfrm>
-            <a:off x="297295" y="553498"/>
-            <a:ext cx="8536179" cy="620483"/>
-          </a:xfrm>
-        </p:spPr>
-        <p:txBody>
-          <a:bodyPr/>
-          <a:lstStyle/>
-          <a:p>
-            <a:r>
-              <a:rPr lang="ru-RU" dirty="0"/>
-              <a:t>Выбор кода</a:t>
-            </a:r>
-          </a:p>
-        </p:txBody>
-      </p:sp>
     </p:spTree>
     <p:extLst>
       <p:ext uri="{BB962C8B-B14F-4D97-AF65-F5344CB8AC3E}">
-        <p14:creationId xmlns:p14="http://schemas.microsoft.com/office/powerpoint/2010/main" val="349387848"/>
+        <p14:creationId xmlns:p14="http://schemas.microsoft.com/office/powerpoint/2010/main" val="683683598"/>
       </p:ext>
     </p:extLst>
   </p:cSld>
@@ -6487,62 +8220,10 @@
       </p:grpSpPr>
       <p:sp>
         <p:nvSpPr>
-          <p:cNvPr id="4" name="Текст 1">
+          <p:cNvPr id="3" name="Заголовок 2">
             <a:extLst>
               <a:ext uri="{FF2B5EF4-FFF2-40B4-BE49-F238E27FC236}">
-                <a16:creationId xmlns:a16="http://schemas.microsoft.com/office/drawing/2014/main" id="{58D9E16F-AB92-489F-9F1B-636FEA91444A}"/>
-              </a:ext>
-            </a:extLst>
-          </p:cNvPr>
-          <p:cNvSpPr>
-            <a:spLocks noGrp="1"/>
-          </p:cNvSpPr>
-          <p:nvPr>
-            <p:ph type="body" idx="1"/>
-          </p:nvPr>
-        </p:nvSpPr>
-        <p:spPr>
-          <a:xfrm>
-            <a:off x="313058" y="1394786"/>
-            <a:ext cx="8520416" cy="3195216"/>
-          </a:xfrm>
-        </p:spPr>
-        <p:txBody>
-          <a:bodyPr/>
-          <a:lstStyle/>
-          <a:p>
-            <a:pPr marL="88900" indent="0">
-              <a:buNone/>
-            </a:pPr>
-            <a:r>
-              <a:rPr lang="ru-RU" sz="1400" dirty="0"/>
-              <a:t>Я использовал два подхода к кодированию, один стандартный</a:t>
-            </a:r>
-            <a:r>
-              <a:rPr lang="en-US" sz="1400" dirty="0"/>
-              <a:t>, </a:t>
-            </a:r>
-            <a:r>
-              <a:rPr lang="ru-RU" sz="1400" dirty="0"/>
-              <a:t>в котором, мы строим схему и второй  «</a:t>
-            </a:r>
-            <a:r>
-              <a:rPr lang="ru-RU" sz="1400" dirty="0" err="1"/>
-              <a:t>экспереминтальный</a:t>
-            </a:r>
-            <a:r>
-              <a:rPr lang="ru-RU" sz="1400" dirty="0"/>
-              <a:t>» применяемый для недвоичных кодов. Попробовав оба, я остановился на первом варианте, так как он оказался более стабильным и надежным.</a:t>
-            </a:r>
-          </a:p>
-        </p:txBody>
-      </p:sp>
-      <p:sp>
-        <p:nvSpPr>
-          <p:cNvPr id="5" name="Заголовок 2">
-            <a:extLst>
-              <a:ext uri="{FF2B5EF4-FFF2-40B4-BE49-F238E27FC236}">
-                <a16:creationId xmlns:a16="http://schemas.microsoft.com/office/drawing/2014/main" id="{1E8EF904-5C40-4D56-85FE-F9009A2B6139}"/>
+                <a16:creationId xmlns:a16="http://schemas.microsoft.com/office/drawing/2014/main" id="{370517AD-73B9-4EBF-A714-57D79CCE91E0}"/>
               </a:ext>
             </a:extLst>
           </p:cNvPr>
@@ -6553,59 +8234,24 @@
             <p:ph type="title"/>
           </p:nvPr>
         </p:nvSpPr>
-        <p:spPr>
-          <a:xfrm>
-            <a:off x="297295" y="553498"/>
-            <a:ext cx="8536179" cy="620483"/>
-          </a:xfrm>
-        </p:spPr>
+        <p:spPr/>
         <p:txBody>
           <a:bodyPr/>
           <a:lstStyle/>
           <a:p>
             <a:r>
               <a:rPr lang="ru-RU" dirty="0"/>
-              <a:t>Кодирование</a:t>
+              <a:t>Схема кодера</a:t>
             </a:r>
           </a:p>
         </p:txBody>
       </p:sp>
-    </p:spTree>
-    <p:extLst>
-      <p:ext uri="{BB962C8B-B14F-4D97-AF65-F5344CB8AC3E}">
-        <p14:creationId xmlns:p14="http://schemas.microsoft.com/office/powerpoint/2010/main" val="3089231520"/>
-      </p:ext>
-    </p:extLst>
-  </p:cSld>
-  <p:clrMapOvr>
-    <a:masterClrMapping/>
-  </p:clrMapOvr>
-</p:sld>
-</file>
-
-<file path=ppt/slides/slide9.xml><?xml version="1.0" encoding="utf-8"?>
-<p:sld xmlns:a="http://schemas.openxmlformats.org/drawingml/2006/main" xmlns:r="http://schemas.openxmlformats.org/officeDocument/2006/relationships" xmlns:p="http://schemas.openxmlformats.org/presentationml/2006/main">
-  <p:cSld>
-    <p:spTree>
-      <p:nvGrpSpPr>
-        <p:cNvPr id="1" name=""/>
-        <p:cNvGrpSpPr/>
-        <p:nvPr/>
-      </p:nvGrpSpPr>
-      <p:grpSpPr>
-        <a:xfrm>
-          <a:off x="0" y="0"/>
-          <a:ext cx="0" cy="0"/>
-          <a:chOff x="0" y="0"/>
-          <a:chExt cx="0" cy="0"/>
-        </a:xfrm>
-      </p:grpSpPr>
       <p:pic>
         <p:nvPicPr>
           <p:cNvPr id="4" name="Рисунок 3">
             <a:extLst>
               <a:ext uri="{FF2B5EF4-FFF2-40B4-BE49-F238E27FC236}">
-                <a16:creationId xmlns:a16="http://schemas.microsoft.com/office/drawing/2014/main" id="{D5669225-229C-4DC4-9FE2-B279171409C0}"/>
+                <a16:creationId xmlns:a16="http://schemas.microsoft.com/office/drawing/2014/main" id="{BDA2DE9F-B832-4BDB-80F0-F52715227BD3}"/>
               </a:ext>
             </a:extLst>
           </p:cNvPr>
@@ -6636,12 +8282,42 @@
           </a:prstGeom>
         </p:spPr>
       </p:pic>
+    </p:spTree>
+    <p:extLst>
+      <p:ext uri="{BB962C8B-B14F-4D97-AF65-F5344CB8AC3E}">
+        <p14:creationId xmlns:p14="http://schemas.microsoft.com/office/powerpoint/2010/main" val="3853906877"/>
+      </p:ext>
+    </p:extLst>
+  </p:cSld>
+  <p:clrMapOvr>
+    <a:masterClrMapping/>
+  </p:clrMapOvr>
+</p:sld>
+</file>
+
+<file path=ppt/slides/slide9.xml><?xml version="1.0" encoding="utf-8"?>
+<p:sld xmlns:a="http://schemas.openxmlformats.org/drawingml/2006/main" xmlns:r="http://schemas.openxmlformats.org/officeDocument/2006/relationships" xmlns:p="http://schemas.openxmlformats.org/presentationml/2006/main">
+  <p:cSld>
+    <p:spTree>
+      <p:nvGrpSpPr>
+        <p:cNvPr id="1" name=""/>
+        <p:cNvGrpSpPr/>
+        <p:nvPr/>
+      </p:nvGrpSpPr>
+      <p:grpSpPr>
+        <a:xfrm>
+          <a:off x="0" y="0"/>
+          <a:ext cx="0" cy="0"/>
+          <a:chOff x="0" y="0"/>
+          <a:chExt cx="0" cy="0"/>
+        </a:xfrm>
+      </p:grpSpPr>
       <p:sp>
         <p:nvSpPr>
-          <p:cNvPr id="5" name="Заголовок 2">
+          <p:cNvPr id="3" name="Заголовок 2">
             <a:extLst>
               <a:ext uri="{FF2B5EF4-FFF2-40B4-BE49-F238E27FC236}">
-                <a16:creationId xmlns:a16="http://schemas.microsoft.com/office/drawing/2014/main" id="{C0273B75-2C7E-4858-831C-4BE1CEB3C4B2}"/>
+                <a16:creationId xmlns:a16="http://schemas.microsoft.com/office/drawing/2014/main" id="{2EA2F471-E40C-44F2-BC0A-E5C9303433DD}"/>
               </a:ext>
             </a:extLst>
           </p:cNvPr>
@@ -6652,27 +8328,373 @@
             <p:ph type="title"/>
           </p:nvPr>
         </p:nvSpPr>
-        <p:spPr>
-          <a:xfrm>
-            <a:off x="297295" y="553498"/>
-            <a:ext cx="8536179" cy="620483"/>
-          </a:xfrm>
-        </p:spPr>
+        <p:spPr/>
         <p:txBody>
           <a:bodyPr/>
           <a:lstStyle/>
           <a:p>
             <a:r>
               <a:rPr lang="ru-RU" dirty="0"/>
-              <a:t>Схема кодера</a:t>
+              <a:t>Декодирование</a:t>
             </a:r>
           </a:p>
         </p:txBody>
       </p:sp>
+      <mc:AlternateContent xmlns:mc="http://schemas.openxmlformats.org/markup-compatibility/2006">
+        <mc:Choice xmlns:a14="http://schemas.microsoft.com/office/drawing/2010/main" Requires="a14">
+          <p:sp>
+            <p:nvSpPr>
+              <p:cNvPr id="6" name="Текст 1">
+                <a:extLst>
+                  <a:ext uri="{FF2B5EF4-FFF2-40B4-BE49-F238E27FC236}">
+                    <a16:creationId xmlns:a16="http://schemas.microsoft.com/office/drawing/2014/main" id="{9642E377-5160-4F47-9FE8-3CB3FE08838C}"/>
+                  </a:ext>
+                </a:extLst>
+              </p:cNvPr>
+              <p:cNvSpPr>
+                <a:spLocks noGrp="1"/>
+              </p:cNvSpPr>
+              <p:nvPr>
+                <p:ph type="body" idx="1"/>
+              </p:nvPr>
+            </p:nvSpPr>
+            <p:spPr>
+              <a:xfrm>
+                <a:off x="313058" y="1394786"/>
+                <a:ext cx="8520416" cy="3195216"/>
+              </a:xfrm>
+            </p:spPr>
+            <p:txBody>
+              <a:bodyPr/>
+              <a:lstStyle/>
+              <a:p>
+                <a:pPr marL="88900" indent="0">
+                  <a:buNone/>
+                </a:pPr>
+                <a:r>
+                  <a:rPr lang="ru-RU" sz="1400" dirty="0"/>
+                  <a:t>Декодирование в двоичном канале со стираниями сводится к решению системы линейных уравнений. В итоге мы получаем сложность алгоритма равную </a:t>
+                </a:r>
+                <a14:m>
+                  <m:oMath xmlns:m="http://schemas.openxmlformats.org/officeDocument/2006/math">
+                    <m:r>
+                      <a:rPr lang="en-US" sz="1400" b="0" i="1" smtClean="0">
+                        <a:latin typeface="Cambria Math" panose="02040503050406030204" pitchFamily="18" charset="0"/>
+                      </a:rPr>
+                      <m:t>𝑂</m:t>
+                    </m:r>
+                    <m:d>
+                      <m:dPr>
+                        <m:ctrlPr>
+                          <a:rPr lang="en-US" sz="1400" b="0" i="1" smtClean="0">
+                            <a:latin typeface="Cambria Math" panose="02040503050406030204" pitchFamily="18" charset="0"/>
+                          </a:rPr>
+                        </m:ctrlPr>
+                      </m:dPr>
+                      <m:e>
+                        <m:sSup>
+                          <m:sSupPr>
+                            <m:ctrlPr>
+                              <a:rPr lang="en-US" sz="1400" b="0" i="1" smtClean="0">
+                                <a:latin typeface="Cambria Math" panose="02040503050406030204" pitchFamily="18" charset="0"/>
+                              </a:rPr>
+                            </m:ctrlPr>
+                          </m:sSupPr>
+                          <m:e>
+                            <m:r>
+                              <a:rPr lang="en-US" sz="1400" b="0" i="1" smtClean="0">
+                                <a:latin typeface="Cambria Math" panose="02040503050406030204" pitchFamily="18" charset="0"/>
+                              </a:rPr>
+                              <m:t>𝑣</m:t>
+                            </m:r>
+                          </m:e>
+                          <m:sup>
+                            <m:r>
+                              <a:rPr lang="en-US" sz="1400" b="0" i="1" smtClean="0">
+                                <a:latin typeface="Cambria Math" panose="02040503050406030204" pitchFamily="18" charset="0"/>
+                              </a:rPr>
+                              <m:t>3</m:t>
+                            </m:r>
+                          </m:sup>
+                        </m:sSup>
+                      </m:e>
+                    </m:d>
+                  </m:oMath>
+                </a14:m>
+                <a:r>
+                  <a:rPr lang="en-US" sz="1400" dirty="0"/>
+                  <a:t>, </a:t>
+                </a:r>
+                <a:r>
+                  <a:rPr lang="ru-RU" sz="1400" dirty="0"/>
+                  <a:t>что значительно лучше алгоритма </a:t>
+                </a:r>
+                <a:r>
+                  <a:rPr lang="ru-RU" sz="1400" dirty="0" err="1"/>
+                  <a:t>Витерби</a:t>
+                </a:r>
+                <a:r>
+                  <a:rPr lang="ru-RU" sz="1400" dirty="0"/>
+                  <a:t> для </a:t>
+                </a:r>
+                <a:r>
+                  <a:rPr lang="ru-RU" sz="1400" dirty="0" err="1"/>
+                  <a:t>сверточных</a:t>
+                </a:r>
+                <a:r>
+                  <a:rPr lang="ru-RU" sz="1400" dirty="0"/>
+                  <a:t> кодов. Для декодирования будет использоваться проверочная матрица .</a:t>
+                </a:r>
+              </a:p>
+              <a:p>
+                <a:pPr marL="88900" indent="0">
+                  <a:buNone/>
+                </a:pPr>
+                <a:endParaRPr lang="ru-RU" sz="1400" dirty="0"/>
+              </a:p>
+              <a:p>
+                <a:pPr marL="88900" indent="0">
+                  <a:buNone/>
+                </a:pPr>
+                <a14:m>
+                  <m:oMathPara xmlns:m="http://schemas.openxmlformats.org/officeDocument/2006/math">
+                    <m:oMathParaPr>
+                      <m:jc m:val="centerGroup"/>
+                    </m:oMathParaPr>
+                    <m:oMath xmlns:m="http://schemas.openxmlformats.org/officeDocument/2006/math">
+                      <m:r>
+                        <a:rPr lang="en-US" sz="1400" b="0" i="1" smtClean="0">
+                          <a:latin typeface="Cambria Math" panose="02040503050406030204" pitchFamily="18" charset="0"/>
+                        </a:rPr>
+                        <m:t>𝐻</m:t>
+                      </m:r>
+                      <m:r>
+                        <a:rPr lang="en-US" sz="1400" b="0" i="1" smtClean="0">
+                          <a:latin typeface="Cambria Math" panose="02040503050406030204" pitchFamily="18" charset="0"/>
+                        </a:rPr>
+                        <m:t>= </m:t>
+                      </m:r>
+                      <m:d>
+                        <m:dPr>
+                          <m:ctrlPr>
+                            <a:rPr lang="en-US" sz="1400" b="0" i="1" smtClean="0">
+                              <a:latin typeface="Cambria Math" panose="02040503050406030204" pitchFamily="18" charset="0"/>
+                            </a:rPr>
+                          </m:ctrlPr>
+                        </m:dPr>
+                        <m:e>
+                          <m:m>
+                            <m:mPr>
+                              <m:mcs>
+                                <m:mc>
+                                  <m:mcPr>
+                                    <m:count m:val="4"/>
+                                    <m:mcJc m:val="center"/>
+                                  </m:mcPr>
+                                </m:mc>
+                              </m:mcs>
+                              <m:ctrlPr>
+                                <a:rPr lang="en-US" sz="1400" b="0" i="1" smtClean="0">
+                                  <a:latin typeface="Cambria Math" panose="02040503050406030204" pitchFamily="18" charset="0"/>
+                                </a:rPr>
+                              </m:ctrlPr>
+                            </m:mPr>
+                            <m:mr>
+                              <m:e>
+                                <m:r>
+                                  <m:rPr>
+                                    <m:brk m:alnAt="7"/>
+                                  </m:rPr>
+                                  <a:rPr lang="en-US" sz="1400" b="0" i="1" smtClean="0">
+                                    <a:latin typeface="Cambria Math" panose="02040503050406030204" pitchFamily="18" charset="0"/>
+                                  </a:rPr>
+                                  <m:t>1</m:t>
+                                </m:r>
+                                <m:r>
+                                  <a:rPr lang="en-US" sz="1400" b="0" i="1" smtClean="0">
+                                    <a:latin typeface="Cambria Math" panose="02040503050406030204" pitchFamily="18" charset="0"/>
+                                  </a:rPr>
+                                  <m:t>+</m:t>
+                                </m:r>
+                                <m:r>
+                                  <a:rPr lang="en-US" sz="1400" b="0" i="1" smtClean="0">
+                                    <a:latin typeface="Cambria Math" panose="02040503050406030204" pitchFamily="18" charset="0"/>
+                                  </a:rPr>
+                                  <m:t>𝐷</m:t>
+                                </m:r>
+                                <m:r>
+                                  <a:rPr lang="en-US" sz="1400" b="0" i="1" smtClean="0">
+                                    <a:latin typeface="Cambria Math" panose="02040503050406030204" pitchFamily="18" charset="0"/>
+                                  </a:rPr>
+                                  <m:t>+</m:t>
+                                </m:r>
+                                <m:sSup>
+                                  <m:sSupPr>
+                                    <m:ctrlPr>
+                                      <a:rPr lang="en-US" sz="1400" b="0" i="1" smtClean="0">
+                                        <a:latin typeface="Cambria Math" panose="02040503050406030204" pitchFamily="18" charset="0"/>
+                                      </a:rPr>
+                                    </m:ctrlPr>
+                                  </m:sSupPr>
+                                  <m:e>
+                                    <m:r>
+                                      <a:rPr lang="en-US" sz="1400" b="0" i="1" smtClean="0">
+                                        <a:latin typeface="Cambria Math" panose="02040503050406030204" pitchFamily="18" charset="0"/>
+                                      </a:rPr>
+                                      <m:t>𝐷</m:t>
+                                    </m:r>
+                                  </m:e>
+                                  <m:sup>
+                                    <m:r>
+                                      <a:rPr lang="en-US" sz="1400" b="0" i="1" smtClean="0">
+                                        <a:latin typeface="Cambria Math" panose="02040503050406030204" pitchFamily="18" charset="0"/>
+                                      </a:rPr>
+                                      <m:t>2</m:t>
+                                    </m:r>
+                                  </m:sup>
+                                </m:sSup>
+                              </m:e>
+                              <m:e>
+                                <m:r>
+                                  <a:rPr lang="en-US" sz="1400" b="0" i="1" smtClean="0">
+                                    <a:latin typeface="Cambria Math" panose="02040503050406030204" pitchFamily="18" charset="0"/>
+                                  </a:rPr>
+                                  <m:t>1+</m:t>
+                                </m:r>
+                                <m:sSup>
+                                  <m:sSupPr>
+                                    <m:ctrlPr>
+                                      <a:rPr lang="en-US" sz="1400" b="0" i="1" smtClean="0">
+                                        <a:latin typeface="Cambria Math" panose="02040503050406030204" pitchFamily="18" charset="0"/>
+                                      </a:rPr>
+                                    </m:ctrlPr>
+                                  </m:sSupPr>
+                                  <m:e>
+                                    <m:r>
+                                      <a:rPr lang="en-US" sz="1400" b="0" i="1" smtClean="0">
+                                        <a:latin typeface="Cambria Math" panose="02040503050406030204" pitchFamily="18" charset="0"/>
+                                      </a:rPr>
+                                      <m:t>𝐷</m:t>
+                                    </m:r>
+                                  </m:e>
+                                  <m:sup>
+                                    <m:r>
+                                      <a:rPr lang="en-US" sz="1400" b="0" i="1" smtClean="0">
+                                        <a:latin typeface="Cambria Math" panose="02040503050406030204" pitchFamily="18" charset="0"/>
+                                      </a:rPr>
+                                      <m:t>2</m:t>
+                                    </m:r>
+                                  </m:sup>
+                                </m:sSup>
+                              </m:e>
+                              <m:e>
+                                <m:r>
+                                  <a:rPr lang="en-US" sz="1400" b="0" i="1" smtClean="0">
+                                    <a:latin typeface="Cambria Math" panose="02040503050406030204" pitchFamily="18" charset="0"/>
+                                  </a:rPr>
+                                  <m:t>1+</m:t>
+                                </m:r>
+                                <m:r>
+                                  <a:rPr lang="en-US" sz="1400" b="0" i="1" smtClean="0">
+                                    <a:latin typeface="Cambria Math" panose="02040503050406030204" pitchFamily="18" charset="0"/>
+                                  </a:rPr>
+                                  <m:t>𝐷</m:t>
+                                </m:r>
+                              </m:e>
+                              <m:e>
+                                <m:r>
+                                  <a:rPr lang="en-US" sz="1400" b="0" i="1" smtClean="0">
+                                    <a:latin typeface="Cambria Math" panose="02040503050406030204" pitchFamily="18" charset="0"/>
+                                  </a:rPr>
+                                  <m:t>1</m:t>
+                                </m:r>
+                              </m:e>
+                            </m:mr>
+                          </m:m>
+                        </m:e>
+                      </m:d>
+                    </m:oMath>
+                  </m:oMathPara>
+                </a14:m>
+                <a:endParaRPr lang="en-US" sz="1400" dirty="0"/>
+              </a:p>
+              <a:p>
+                <a:pPr marL="88900" indent="0">
+                  <a:buNone/>
+                </a:pPr>
+                <a:r>
+                  <a:rPr lang="ru-RU" sz="1400" dirty="0"/>
+                  <a:t>Разложив эту матрицу по степеням </a:t>
+                </a:r>
+                <a:r>
+                  <a:rPr lang="en-US" sz="1400" dirty="0"/>
+                  <a:t>D, </a:t>
+                </a:r>
+                <a:r>
+                  <a:rPr lang="ru-RU" sz="1400" dirty="0"/>
+                  <a:t>получим </a:t>
+                </a:r>
+                <a:r>
+                  <a:rPr lang="ru-RU" sz="1400" dirty="0" err="1"/>
+                  <a:t>получбесконечную</a:t>
+                </a:r>
+                <a:r>
+                  <a:rPr lang="ru-RU" sz="1400" dirty="0"/>
+                  <a:t> матрицу, из которой мы возьмем только определенную подматрицу, использующуюся в процессе декодирования.</a:t>
+                </a:r>
+                <a:endParaRPr lang="en-US" sz="1400" dirty="0"/>
+              </a:p>
+            </p:txBody>
+          </p:sp>
+        </mc:Choice>
+        <mc:Fallback>
+          <p:sp>
+            <p:nvSpPr>
+              <p:cNvPr id="6" name="Текст 1">
+                <a:extLst>
+                  <a:ext uri="{FF2B5EF4-FFF2-40B4-BE49-F238E27FC236}">
+                    <a16:creationId xmlns:a16="http://schemas.microsoft.com/office/drawing/2014/main" id="{9642E377-5160-4F47-9FE8-3CB3FE08838C}"/>
+                  </a:ext>
+                </a:extLst>
+              </p:cNvPr>
+              <p:cNvSpPr>
+                <a:spLocks noGrp="1" noRot="1" noChangeAspect="1" noMove="1" noResize="1" noEditPoints="1" noAdjustHandles="1" noChangeArrowheads="1" noChangeShapeType="1" noTextEdit="1"/>
+              </p:cNvSpPr>
+              <p:nvPr>
+                <p:ph type="body" idx="1"/>
+              </p:nvPr>
+            </p:nvSpPr>
+            <p:spPr>
+              <a:xfrm>
+                <a:off x="313058" y="1394786"/>
+                <a:ext cx="8520416" cy="3195216"/>
+              </a:xfrm>
+              <a:blipFill>
+                <a:blip r:embed="rId2"/>
+                <a:stretch>
+                  <a:fillRect r="-143"/>
+                </a:stretch>
+              </a:blipFill>
+            </p:spPr>
+            <p:txBody>
+              <a:bodyPr/>
+              <a:lstStyle/>
+              <a:p>
+                <a:r>
+                  <a:rPr lang="ru-RU">
+                    <a:noFill/>
+                  </a:rPr>
+                  <a:t> </a:t>
+                </a:r>
+              </a:p>
+            </p:txBody>
+          </p:sp>
+        </mc:Fallback>
+      </mc:AlternateContent>
     </p:spTree>
     <p:extLst>
       <p:ext uri="{BB962C8B-B14F-4D97-AF65-F5344CB8AC3E}">
-        <p14:creationId xmlns:p14="http://schemas.microsoft.com/office/powerpoint/2010/main" val="3984448312"/>
+        <p14:creationId xmlns:p14="http://schemas.microsoft.com/office/powerpoint/2010/main" val="2792312960"/>
       </p:ext>
     </p:extLst>
   </p:cSld>

</xml_diff>

<commit_message>
Add defense presentation and defense scenario
</commit_message>
<xml_diff>
--- a/docs/presentation.pptx
+++ b/docs/presentation.pptx
@@ -5,48 +5,56 @@
     <p:sldMasterId id="2147483650" r:id="rId1"/>
   </p:sldMasterIdLst>
   <p:notesMasterIdLst>
-    <p:notesMasterId r:id="rId20"/>
+    <p:notesMasterId r:id="rId28"/>
   </p:notesMasterIdLst>
   <p:sldIdLst>
     <p:sldId id="256" r:id="rId2"/>
     <p:sldId id="257" r:id="rId3"/>
     <p:sldId id="258" r:id="rId4"/>
     <p:sldId id="259" r:id="rId5"/>
-    <p:sldId id="260" r:id="rId6"/>
-    <p:sldId id="261" r:id="rId7"/>
-    <p:sldId id="262" r:id="rId8"/>
-    <p:sldId id="264" r:id="rId9"/>
-    <p:sldId id="265" r:id="rId10"/>
-    <p:sldId id="266" r:id="rId11"/>
-    <p:sldId id="270" r:id="rId12"/>
-    <p:sldId id="274" r:id="rId13"/>
-    <p:sldId id="271" r:id="rId14"/>
-    <p:sldId id="272" r:id="rId15"/>
-    <p:sldId id="273" r:id="rId16"/>
-    <p:sldId id="268" r:id="rId17"/>
-    <p:sldId id="275" r:id="rId18"/>
-    <p:sldId id="276" r:id="rId19"/>
+    <p:sldId id="277" r:id="rId6"/>
+    <p:sldId id="260" r:id="rId7"/>
+    <p:sldId id="261" r:id="rId8"/>
+    <p:sldId id="262" r:id="rId9"/>
+    <p:sldId id="264" r:id="rId10"/>
+    <p:sldId id="265" r:id="rId11"/>
+    <p:sldId id="266" r:id="rId12"/>
+    <p:sldId id="284" r:id="rId13"/>
+    <p:sldId id="270" r:id="rId14"/>
+    <p:sldId id="274" r:id="rId15"/>
+    <p:sldId id="271" r:id="rId16"/>
+    <p:sldId id="272" r:id="rId17"/>
+    <p:sldId id="273" r:id="rId18"/>
+    <p:sldId id="268" r:id="rId19"/>
+    <p:sldId id="278" r:id="rId20"/>
+    <p:sldId id="275" r:id="rId21"/>
+    <p:sldId id="279" r:id="rId22"/>
+    <p:sldId id="280" r:id="rId23"/>
+    <p:sldId id="281" r:id="rId24"/>
+    <p:sldId id="282" r:id="rId25"/>
+    <p:sldId id="276" r:id="rId26"/>
+    <p:sldId id="283" r:id="rId27"/>
   </p:sldIdLst>
   <p:sldSz cx="9144000" cy="5143500" type="screen16x9"/>
   <p:notesSz cx="6858000" cy="9144000"/>
   <p:embeddedFontLst>
     <p:embeddedFont>
       <p:font typeface="Calibri" panose="020F0502020204030204" pitchFamily="34" charset="0"/>
-      <p:regular r:id="rId21"/>
-      <p:bold r:id="rId22"/>
-      <p:italic r:id="rId23"/>
-      <p:boldItalic r:id="rId24"/>
+      <p:regular r:id="rId29"/>
+      <p:bold r:id="rId30"/>
+      <p:italic r:id="rId31"/>
+      <p:boldItalic r:id="rId32"/>
     </p:embeddedFont>
     <p:embeddedFont>
       <p:font typeface="Cambria Math" panose="02040503050406030204" pitchFamily="18" charset="0"/>
-      <p:regular r:id="rId25"/>
+      <p:regular r:id="rId33"/>
     </p:embeddedFont>
     <p:embeddedFont>
       <p:font typeface="Open Sans" panose="020B0604020202020204" charset="0"/>
-      <p:regular r:id="rId26"/>
-      <p:bold r:id="rId27"/>
-      <p:italic r:id="rId28"/>
-      <p:boldItalic r:id="rId29"/>
+      <p:regular r:id="rId34"/>
+      <p:bold r:id="rId35"/>
+      <p:italic r:id="rId36"/>
+      <p:boldItalic r:id="rId37"/>
     </p:embeddedFont>
   </p:embeddedFontLst>
   <p:defaultTextStyle>
@@ -2088,7 +2096,7 @@
             </a:lvl9pPr>
           </a:lstStyle>
           <a:p>
-            <a:endParaRPr/>
+            <a:endParaRPr dirty="0"/>
           </a:p>
         </p:txBody>
       </p:sp>
@@ -2303,7 +2311,7 @@
                 <a:cs typeface="Open Sans"/>
                 <a:sym typeface="Open Sans"/>
               </a:rPr>
-              <a:t> 1</a:t>
+              <a:t> </a:t>
             </a:r>
             <a:r>
               <a:rPr lang="en-US" dirty="0">
@@ -2312,7 +2320,16 @@
                 <a:cs typeface="Open Sans"/>
                 <a:sym typeface="Open Sans"/>
               </a:rPr>
-              <a:t>8</a:t>
+              <a:t>2</a:t>
+            </a:r>
+            <a:r>
+              <a:rPr lang="ru-RU" dirty="0">
+                <a:latin typeface="Open Sans"/>
+                <a:ea typeface="Open Sans"/>
+                <a:cs typeface="Open Sans"/>
+                <a:sym typeface="Open Sans"/>
+              </a:rPr>
+              <a:t>6</a:t>
             </a:r>
             <a:endParaRPr dirty="0">
               <a:latin typeface="Open Sans"/>
@@ -4276,6 +4293,413 @@
           <p:cNvPr id="3" name="Заголовок 2">
             <a:extLst>
               <a:ext uri="{FF2B5EF4-FFF2-40B4-BE49-F238E27FC236}">
+                <a16:creationId xmlns:a16="http://schemas.microsoft.com/office/drawing/2014/main" id="{2EA2F471-E40C-44F2-BC0A-E5C9303433DD}"/>
+              </a:ext>
+            </a:extLst>
+          </p:cNvPr>
+          <p:cNvSpPr>
+            <a:spLocks noGrp="1"/>
+          </p:cNvSpPr>
+          <p:nvPr>
+            <p:ph type="title"/>
+          </p:nvPr>
+        </p:nvSpPr>
+        <p:spPr/>
+        <p:txBody>
+          <a:bodyPr/>
+          <a:lstStyle/>
+          <a:p>
+            <a:r>
+              <a:rPr lang="ru-RU" dirty="0"/>
+              <a:t>Декодирование</a:t>
+            </a:r>
+          </a:p>
+        </p:txBody>
+      </p:sp>
+      <mc:AlternateContent xmlns:mc="http://schemas.openxmlformats.org/markup-compatibility/2006" xmlns:a14="http://schemas.microsoft.com/office/drawing/2010/main">
+        <mc:Choice Requires="a14">
+          <p:sp>
+            <p:nvSpPr>
+              <p:cNvPr id="6" name="Текст 1">
+                <a:extLst>
+                  <a:ext uri="{FF2B5EF4-FFF2-40B4-BE49-F238E27FC236}">
+                    <a16:creationId xmlns:a16="http://schemas.microsoft.com/office/drawing/2014/main" id="{9642E377-5160-4F47-9FE8-3CB3FE08838C}"/>
+                  </a:ext>
+                </a:extLst>
+              </p:cNvPr>
+              <p:cNvSpPr>
+                <a:spLocks noGrp="1"/>
+              </p:cNvSpPr>
+              <p:nvPr>
+                <p:ph type="body" idx="1"/>
+              </p:nvPr>
+            </p:nvSpPr>
+            <p:spPr>
+              <a:xfrm>
+                <a:off x="313058" y="1394786"/>
+                <a:ext cx="8520416" cy="3195216"/>
+              </a:xfrm>
+            </p:spPr>
+            <p:txBody>
+              <a:bodyPr/>
+              <a:lstStyle/>
+              <a:p>
+                <a:pPr marL="88900" indent="0" algn="just">
+                  <a:buNone/>
+                </a:pPr>
+                <a:r>
+                  <a:rPr lang="ru-RU" sz="1400" dirty="0"/>
+                  <a:t>Декодирование в двоичном канале со стираниями сводится к решению системы линейных уравнений. Используя оконное декодирование, мы получаем сложность алгоритма линейную по длине последовательности, так как сложность декодирования в окне равна  </a:t>
+                </a:r>
+                <a14:m>
+                  <m:oMath xmlns:m="http://schemas.openxmlformats.org/officeDocument/2006/math">
+                    <m:r>
+                      <a:rPr lang="en-US" sz="1400" i="1">
+                        <a:latin typeface="Cambria Math" panose="02040503050406030204" pitchFamily="18" charset="0"/>
+                      </a:rPr>
+                      <m:t>𝑂</m:t>
+                    </m:r>
+                    <m:d>
+                      <m:dPr>
+                        <m:ctrlPr>
+                          <a:rPr lang="ru-RU" sz="1400" i="1">
+                            <a:latin typeface="Cambria Math" panose="02040503050406030204" pitchFamily="18" charset="0"/>
+                          </a:rPr>
+                        </m:ctrlPr>
+                      </m:dPr>
+                      <m:e>
+                        <m:sSup>
+                          <m:sSupPr>
+                            <m:ctrlPr>
+                              <a:rPr lang="ru-RU" sz="1400" i="1">
+                                <a:latin typeface="Cambria Math" panose="02040503050406030204" pitchFamily="18" charset="0"/>
+                              </a:rPr>
+                            </m:ctrlPr>
+                          </m:sSupPr>
+                          <m:e>
+                            <m:r>
+                              <a:rPr lang="en-US" sz="1400" i="1">
+                                <a:latin typeface="Cambria Math" panose="02040503050406030204" pitchFamily="18" charset="0"/>
+                              </a:rPr>
+                              <m:t>𝑣</m:t>
+                            </m:r>
+                          </m:e>
+                          <m:sup>
+                            <m:r>
+                              <a:rPr lang="ru-RU" sz="1400" i="1">
+                                <a:latin typeface="Cambria Math" panose="02040503050406030204" pitchFamily="18" charset="0"/>
+                              </a:rPr>
+                              <m:t>3</m:t>
+                            </m:r>
+                          </m:sup>
+                        </m:sSup>
+                      </m:e>
+                    </m:d>
+                  </m:oMath>
+                </a14:m>
+                <a:r>
+                  <a:rPr lang="ru-RU" sz="1400" dirty="0"/>
+                  <a:t>, где </a:t>
+                </a:r>
+                <a14:m>
+                  <m:oMath xmlns:m="http://schemas.openxmlformats.org/officeDocument/2006/math">
+                    <m:r>
+                      <a:rPr lang="en-US" sz="1400" i="1">
+                        <a:latin typeface="Cambria Math" panose="02040503050406030204" pitchFamily="18" charset="0"/>
+                      </a:rPr>
+                      <m:t>𝑣</m:t>
+                    </m:r>
+                  </m:oMath>
+                </a14:m>
+                <a:r>
+                  <a:rPr lang="en-US" sz="1400" dirty="0"/>
+                  <a:t> </a:t>
+                </a:r>
+                <a:r>
+                  <a:rPr lang="ru-RU" sz="1400" dirty="0"/>
+                  <a:t>– число стираний в окне, т.е. константе по длине кода. Для декодирования будет использоваться проверочная матрица.</a:t>
+                </a:r>
+              </a:p>
+              <a:p>
+                <a:pPr marL="88900" indent="0">
+                  <a:buNone/>
+                </a:pPr>
+                <a:endParaRPr lang="ru-RU" sz="1400" dirty="0"/>
+              </a:p>
+              <a:p>
+                <a:pPr marL="88900" indent="0">
+                  <a:buNone/>
+                </a:pPr>
+                <a14:m>
+                  <m:oMathPara xmlns:m="http://schemas.openxmlformats.org/officeDocument/2006/math">
+                    <m:oMathParaPr>
+                      <m:jc m:val="centerGroup"/>
+                    </m:oMathParaPr>
+                    <m:oMath xmlns:m="http://schemas.openxmlformats.org/officeDocument/2006/math">
+                      <m:r>
+                        <a:rPr lang="en-US" sz="1400" b="0" i="1" smtClean="0">
+                          <a:latin typeface="Cambria Math" panose="02040503050406030204" pitchFamily="18" charset="0"/>
+                        </a:rPr>
+                        <m:t>𝐻</m:t>
+                      </m:r>
+                      <m:r>
+                        <a:rPr lang="en-US" sz="1400" b="0" i="1" smtClean="0">
+                          <a:latin typeface="Cambria Math" panose="02040503050406030204" pitchFamily="18" charset="0"/>
+                        </a:rPr>
+                        <m:t>= </m:t>
+                      </m:r>
+                      <m:d>
+                        <m:dPr>
+                          <m:ctrlPr>
+                            <a:rPr lang="en-US" sz="1400" b="0" i="1" smtClean="0">
+                              <a:latin typeface="Cambria Math" panose="02040503050406030204" pitchFamily="18" charset="0"/>
+                            </a:rPr>
+                          </m:ctrlPr>
+                        </m:dPr>
+                        <m:e>
+                          <m:m>
+                            <m:mPr>
+                              <m:mcs>
+                                <m:mc>
+                                  <m:mcPr>
+                                    <m:count m:val="4"/>
+                                    <m:mcJc m:val="center"/>
+                                  </m:mcPr>
+                                </m:mc>
+                              </m:mcs>
+                              <m:ctrlPr>
+                                <a:rPr lang="en-US" sz="1400" b="0" i="1" smtClean="0">
+                                  <a:latin typeface="Cambria Math" panose="02040503050406030204" pitchFamily="18" charset="0"/>
+                                </a:rPr>
+                              </m:ctrlPr>
+                            </m:mPr>
+                            <m:mr>
+                              <m:e>
+                                <m:r>
+                                  <m:rPr>
+                                    <m:brk m:alnAt="7"/>
+                                  </m:rPr>
+                                  <a:rPr lang="en-US" sz="1400" b="0" i="1" smtClean="0">
+                                    <a:latin typeface="Cambria Math" panose="02040503050406030204" pitchFamily="18" charset="0"/>
+                                  </a:rPr>
+                                  <m:t>1</m:t>
+                                </m:r>
+                                <m:r>
+                                  <a:rPr lang="en-US" sz="1400" b="0" i="1" smtClean="0">
+                                    <a:latin typeface="Cambria Math" panose="02040503050406030204" pitchFamily="18" charset="0"/>
+                                  </a:rPr>
+                                  <m:t>+</m:t>
+                                </m:r>
+                                <m:r>
+                                  <a:rPr lang="en-US" sz="1400" b="0" i="1" smtClean="0">
+                                    <a:latin typeface="Cambria Math" panose="02040503050406030204" pitchFamily="18" charset="0"/>
+                                  </a:rPr>
+                                  <m:t>𝐷</m:t>
+                                </m:r>
+                                <m:r>
+                                  <a:rPr lang="en-US" sz="1400" b="0" i="1" smtClean="0">
+                                    <a:latin typeface="Cambria Math" panose="02040503050406030204" pitchFamily="18" charset="0"/>
+                                  </a:rPr>
+                                  <m:t>+</m:t>
+                                </m:r>
+                                <m:sSup>
+                                  <m:sSupPr>
+                                    <m:ctrlPr>
+                                      <a:rPr lang="en-US" sz="1400" b="0" i="1" smtClean="0">
+                                        <a:latin typeface="Cambria Math" panose="02040503050406030204" pitchFamily="18" charset="0"/>
+                                      </a:rPr>
+                                    </m:ctrlPr>
+                                  </m:sSupPr>
+                                  <m:e>
+                                    <m:r>
+                                      <a:rPr lang="en-US" sz="1400" b="0" i="1" smtClean="0">
+                                        <a:latin typeface="Cambria Math" panose="02040503050406030204" pitchFamily="18" charset="0"/>
+                                      </a:rPr>
+                                      <m:t>𝐷</m:t>
+                                    </m:r>
+                                  </m:e>
+                                  <m:sup>
+                                    <m:r>
+                                      <a:rPr lang="en-US" sz="1400" b="0" i="1" smtClean="0">
+                                        <a:latin typeface="Cambria Math" panose="02040503050406030204" pitchFamily="18" charset="0"/>
+                                      </a:rPr>
+                                      <m:t>2</m:t>
+                                    </m:r>
+                                  </m:sup>
+                                </m:sSup>
+                              </m:e>
+                              <m:e>
+                                <m:r>
+                                  <a:rPr lang="en-US" sz="1400" b="0" i="1" smtClean="0">
+                                    <a:latin typeface="Cambria Math" panose="02040503050406030204" pitchFamily="18" charset="0"/>
+                                  </a:rPr>
+                                  <m:t>1+</m:t>
+                                </m:r>
+                                <m:sSup>
+                                  <m:sSupPr>
+                                    <m:ctrlPr>
+                                      <a:rPr lang="en-US" sz="1400" b="0" i="1" smtClean="0">
+                                        <a:latin typeface="Cambria Math" panose="02040503050406030204" pitchFamily="18" charset="0"/>
+                                      </a:rPr>
+                                    </m:ctrlPr>
+                                  </m:sSupPr>
+                                  <m:e>
+                                    <m:r>
+                                      <a:rPr lang="en-US" sz="1400" b="0" i="1" smtClean="0">
+                                        <a:latin typeface="Cambria Math" panose="02040503050406030204" pitchFamily="18" charset="0"/>
+                                      </a:rPr>
+                                      <m:t>𝐷</m:t>
+                                    </m:r>
+                                  </m:e>
+                                  <m:sup>
+                                    <m:r>
+                                      <a:rPr lang="en-US" sz="1400" b="0" i="1" smtClean="0">
+                                        <a:latin typeface="Cambria Math" panose="02040503050406030204" pitchFamily="18" charset="0"/>
+                                      </a:rPr>
+                                      <m:t>2</m:t>
+                                    </m:r>
+                                  </m:sup>
+                                </m:sSup>
+                              </m:e>
+                              <m:e>
+                                <m:r>
+                                  <a:rPr lang="en-US" sz="1400" b="0" i="1" smtClean="0">
+                                    <a:latin typeface="Cambria Math" panose="02040503050406030204" pitchFamily="18" charset="0"/>
+                                  </a:rPr>
+                                  <m:t>1+</m:t>
+                                </m:r>
+                                <m:r>
+                                  <a:rPr lang="en-US" sz="1400" b="0" i="1" smtClean="0">
+                                    <a:latin typeface="Cambria Math" panose="02040503050406030204" pitchFamily="18" charset="0"/>
+                                  </a:rPr>
+                                  <m:t>𝐷</m:t>
+                                </m:r>
+                              </m:e>
+                              <m:e>
+                                <m:r>
+                                  <a:rPr lang="en-US" sz="1400" b="0" i="1" smtClean="0">
+                                    <a:latin typeface="Cambria Math" panose="02040503050406030204" pitchFamily="18" charset="0"/>
+                                  </a:rPr>
+                                  <m:t>1</m:t>
+                                </m:r>
+                              </m:e>
+                            </m:mr>
+                          </m:m>
+                        </m:e>
+                      </m:d>
+                    </m:oMath>
+                  </m:oMathPara>
+                </a14:m>
+                <a:endParaRPr lang="en-US" sz="1400" dirty="0"/>
+              </a:p>
+              <a:p>
+                <a:pPr marL="88900" indent="0" algn="just">
+                  <a:buNone/>
+                </a:pPr>
+                <a:r>
+                  <a:rPr lang="ru-RU" sz="1400" dirty="0"/>
+                  <a:t>Разложив эту матрицу по степеням </a:t>
+                </a:r>
+                <a:r>
+                  <a:rPr lang="en-US" sz="1400" dirty="0"/>
+                  <a:t>D, </a:t>
+                </a:r>
+                <a:r>
+                  <a:rPr lang="ru-RU" sz="1400" dirty="0"/>
+                  <a:t>получим </a:t>
+                </a:r>
+                <a:r>
+                  <a:rPr lang="ru-RU" sz="1400" dirty="0" err="1"/>
+                  <a:t>полубесконечную</a:t>
+                </a:r>
+                <a:r>
+                  <a:rPr lang="ru-RU" sz="1400" dirty="0"/>
+                  <a:t> матрицу, из которой мы возьмем только определенную подматрицу, использующуюся в процессе декодирования.</a:t>
+                </a:r>
+                <a:endParaRPr lang="en-US" sz="1400" dirty="0"/>
+              </a:p>
+            </p:txBody>
+          </p:sp>
+        </mc:Choice>
+        <mc:Fallback xmlns="">
+          <p:sp>
+            <p:nvSpPr>
+              <p:cNvPr id="6" name="Текст 1">
+                <a:extLst>
+                  <a:ext uri="{FF2B5EF4-FFF2-40B4-BE49-F238E27FC236}">
+                    <a16:creationId xmlns:a16="http://schemas.microsoft.com/office/drawing/2014/main" id="{9642E377-5160-4F47-9FE8-3CB3FE08838C}"/>
+                  </a:ext>
+                </a:extLst>
+              </p:cNvPr>
+              <p:cNvSpPr>
+                <a:spLocks noGrp="1" noRot="1" noChangeAspect="1" noMove="1" noResize="1" noEditPoints="1" noAdjustHandles="1" noChangeArrowheads="1" noChangeShapeType="1" noTextEdit="1"/>
+              </p:cNvSpPr>
+              <p:nvPr>
+                <p:ph type="body" idx="1"/>
+              </p:nvPr>
+            </p:nvSpPr>
+            <p:spPr>
+              <a:xfrm>
+                <a:off x="313058" y="1394786"/>
+                <a:ext cx="8520416" cy="3195216"/>
+              </a:xfrm>
+              <a:blipFill>
+                <a:blip r:embed="rId2"/>
+                <a:stretch>
+                  <a:fillRect r="-215"/>
+                </a:stretch>
+              </a:blipFill>
+            </p:spPr>
+            <p:txBody>
+              <a:bodyPr/>
+              <a:lstStyle/>
+              <a:p>
+                <a:r>
+                  <a:rPr lang="ru-RU">
+                    <a:noFill/>
+                  </a:rPr>
+                  <a:t> </a:t>
+                </a:r>
+              </a:p>
+            </p:txBody>
+          </p:sp>
+        </mc:Fallback>
+      </mc:AlternateContent>
+    </p:spTree>
+    <p:extLst>
+      <p:ext uri="{BB962C8B-B14F-4D97-AF65-F5344CB8AC3E}">
+        <p14:creationId xmlns:p14="http://schemas.microsoft.com/office/powerpoint/2010/main" val="2792312960"/>
+      </p:ext>
+    </p:extLst>
+  </p:cSld>
+  <p:clrMapOvr>
+    <a:masterClrMapping/>
+  </p:clrMapOvr>
+</p:sld>
+</file>
+
+<file path=ppt/slides/slide11.xml><?xml version="1.0" encoding="utf-8"?>
+<p:sld xmlns:a="http://schemas.openxmlformats.org/drawingml/2006/main" xmlns:r="http://schemas.openxmlformats.org/officeDocument/2006/relationships" xmlns:p="http://schemas.openxmlformats.org/presentationml/2006/main">
+  <p:cSld>
+    <p:spTree>
+      <p:nvGrpSpPr>
+        <p:cNvPr id="1" name=""/>
+        <p:cNvGrpSpPr/>
+        <p:nvPr/>
+      </p:nvGrpSpPr>
+      <p:grpSpPr>
+        <a:xfrm>
+          <a:off x="0" y="0"/>
+          <a:ext cx="0" cy="0"/>
+          <a:chOff x="0" y="0"/>
+          <a:chExt cx="0" cy="0"/>
+        </a:xfrm>
+      </p:grpSpPr>
+      <p:sp>
+        <p:nvSpPr>
+          <p:cNvPr id="3" name="Заголовок 2">
+            <a:extLst>
+              <a:ext uri="{FF2B5EF4-FFF2-40B4-BE49-F238E27FC236}">
                 <a16:creationId xmlns:a16="http://schemas.microsoft.com/office/drawing/2014/main" id="{1FF63A0E-AF68-42AB-A1F4-F992DB0FB6BF}"/>
               </a:ext>
             </a:extLst>
@@ -4327,7 +4751,7 @@
               <a:bodyPr/>
               <a:lstStyle/>
               <a:p>
-                <a:pPr marL="88900" indent="0">
+                <a:pPr marL="88900" indent="0" algn="just">
                   <a:buNone/>
                 </a:pPr>
                 <a:r>
@@ -4516,7 +4940,7 @@
                 <a:endParaRPr lang="en-US" sz="1400" dirty="0"/>
               </a:p>
               <a:p>
-                <a:pPr marL="88900" indent="0">
+                <a:pPr marL="88900" indent="0" algn="just">
                   <a:buNone/>
                 </a:pPr>
                 <a:r>
@@ -4590,6 +5014,44 @@
                 </a14:m>
                 <a:endParaRPr lang="ru-RU" sz="1400" dirty="0"/>
               </a:p>
+              <a:p>
+                <a:pPr marL="88900" indent="0" algn="just">
+                  <a:buNone/>
+                </a:pPr>
+                <a14:m>
+                  <m:oMath xmlns:m="http://schemas.openxmlformats.org/officeDocument/2006/math">
+                    <m:r>
+                      <a:rPr lang="en-US" sz="1400" b="0" i="1" smtClean="0">
+                        <a:latin typeface="Cambria Math" panose="02040503050406030204" pitchFamily="18" charset="0"/>
+                      </a:rPr>
+                      <m:t>𝐿</m:t>
+                    </m:r>
+                  </m:oMath>
+                </a14:m>
+                <a:r>
+                  <a:rPr lang="en-US" sz="1400" dirty="0"/>
+                  <a:t> – </a:t>
+                </a:r>
+                <a:r>
+                  <a:rPr lang="ru-RU" sz="1400" dirty="0"/>
+                  <a:t>параметр окна. В нашем примере </a:t>
+                </a:r>
+                <a14:m>
+                  <m:oMath xmlns:m="http://schemas.openxmlformats.org/officeDocument/2006/math">
+                    <m:r>
+                      <a:rPr lang="en-US" sz="1400" i="1">
+                        <a:latin typeface="Cambria Math" panose="02040503050406030204" pitchFamily="18" charset="0"/>
+                      </a:rPr>
+                      <m:t>𝐿</m:t>
+                    </m:r>
+                  </m:oMath>
+                </a14:m>
+                <a:r>
+                  <a:rPr lang="en-US" sz="1400" dirty="0"/>
+                  <a:t> = 2.</a:t>
+                </a:r>
+                <a:endParaRPr lang="ru-RU" sz="1400" dirty="0"/>
+              </a:p>
             </p:txBody>
           </p:sp>
         </mc:Choice>
@@ -4618,7 +5080,7 @@
               <a:blipFill>
                 <a:blip r:embed="rId2"/>
                 <a:stretch>
-                  <a:fillRect/>
+                  <a:fillRect r="-215"/>
                 </a:stretch>
               </a:blipFill>
             </p:spPr>
@@ -4650,7 +5112,135 @@
 </p:sld>
 </file>
 
-<file path=ppt/slides/slide11.xml><?xml version="1.0" encoding="utf-8"?>
+<file path=ppt/slides/slide12.xml><?xml version="1.0" encoding="utf-8"?>
+<p:sld xmlns:a="http://schemas.openxmlformats.org/drawingml/2006/main" xmlns:r="http://schemas.openxmlformats.org/officeDocument/2006/relationships" xmlns:p="http://schemas.openxmlformats.org/presentationml/2006/main">
+  <p:cSld>
+    <p:spTree>
+      <p:nvGrpSpPr>
+        <p:cNvPr id="1" name=""/>
+        <p:cNvGrpSpPr/>
+        <p:nvPr/>
+      </p:nvGrpSpPr>
+      <p:grpSpPr>
+        <a:xfrm>
+          <a:off x="0" y="0"/>
+          <a:ext cx="0" cy="0"/>
+          <a:chOff x="0" y="0"/>
+          <a:chExt cx="0" cy="0"/>
+        </a:xfrm>
+      </p:grpSpPr>
+      <p:sp>
+        <p:nvSpPr>
+          <p:cNvPr id="3" name="Заголовок 2">
+            <a:extLst>
+              <a:ext uri="{FF2B5EF4-FFF2-40B4-BE49-F238E27FC236}">
+                <a16:creationId xmlns:a16="http://schemas.microsoft.com/office/drawing/2014/main" id="{82B978F3-9095-49C4-BDB0-AFFCF82E99C7}"/>
+              </a:ext>
+            </a:extLst>
+          </p:cNvPr>
+          <p:cNvSpPr>
+            <a:spLocks noGrp="1"/>
+          </p:cNvSpPr>
+          <p:nvPr>
+            <p:ph type="title"/>
+          </p:nvPr>
+        </p:nvSpPr>
+        <p:spPr/>
+        <p:txBody>
+          <a:bodyPr/>
+          <a:lstStyle/>
+          <a:p>
+            <a:r>
+              <a:rPr lang="ru-RU" dirty="0"/>
+              <a:t>Декодирование</a:t>
+            </a:r>
+          </a:p>
+        </p:txBody>
+      </p:sp>
+      <p:sp>
+        <p:nvSpPr>
+          <p:cNvPr id="11" name="TextBox 10">
+            <a:extLst>
+              <a:ext uri="{FF2B5EF4-FFF2-40B4-BE49-F238E27FC236}">
+                <a16:creationId xmlns:a16="http://schemas.microsoft.com/office/drawing/2014/main" id="{8BFEAD45-BCD9-4474-87BE-1358C3DE1ADF}"/>
+              </a:ext>
+            </a:extLst>
+          </p:cNvPr>
+          <p:cNvSpPr txBox="1"/>
+          <p:nvPr/>
+        </p:nvSpPr>
+        <p:spPr>
+          <a:xfrm>
+            <a:off x="2801119" y="3386050"/>
+            <a:ext cx="3457998" cy="307777"/>
+          </a:xfrm>
+          <a:prstGeom prst="rect">
+            <a:avLst/>
+          </a:prstGeom>
+          <a:noFill/>
+        </p:spPr>
+        <p:txBody>
+          <a:bodyPr wrap="none" rtlCol="0">
+            <a:spAutoFit/>
+          </a:bodyPr>
+          <a:lstStyle/>
+          <a:p>
+            <a:r>
+              <a:rPr lang="ru-RU" dirty="0"/>
+              <a:t>Пример оконного декодирования</a:t>
+            </a:r>
+            <a:r>
+              <a:rPr lang="en-US" dirty="0"/>
+              <a:t>, L = 2</a:t>
+            </a:r>
+            <a:endParaRPr lang="ru-RU" dirty="0"/>
+          </a:p>
+        </p:txBody>
+      </p:sp>
+      <p:pic>
+        <p:nvPicPr>
+          <p:cNvPr id="13" name="Рисунок 12">
+            <a:extLst>
+              <a:ext uri="{FF2B5EF4-FFF2-40B4-BE49-F238E27FC236}">
+                <a16:creationId xmlns:a16="http://schemas.microsoft.com/office/drawing/2014/main" id="{D24A638F-9B93-4D4B-B806-ED8FD86A4E4C}"/>
+              </a:ext>
+            </a:extLst>
+          </p:cNvPr>
+          <p:cNvPicPr>
+            <a:picLocks noChangeAspect="1"/>
+          </p:cNvPicPr>
+          <p:nvPr/>
+        </p:nvPicPr>
+        <p:blipFill>
+          <a:blip r:embed="rId2"/>
+          <a:stretch>
+            <a:fillRect/>
+          </a:stretch>
+        </p:blipFill>
+        <p:spPr>
+          <a:xfrm>
+            <a:off x="1240818" y="1782850"/>
+            <a:ext cx="6578600" cy="1495138"/>
+          </a:xfrm>
+          <a:prstGeom prst="rect">
+            <a:avLst/>
+          </a:prstGeom>
+        </p:spPr>
+      </p:pic>
+    </p:spTree>
+    <p:extLst>
+      <p:ext uri="{BB962C8B-B14F-4D97-AF65-F5344CB8AC3E}">
+        <p14:creationId xmlns:p14="http://schemas.microsoft.com/office/powerpoint/2010/main" val="528915084"/>
+      </p:ext>
+    </p:extLst>
+  </p:cSld>
+  <p:clrMapOvr>
+    <a:masterClrMapping/>
+  </p:clrMapOvr>
+</p:sld>
+</file>
+
+<file path=ppt/slides/slide13.xml><?xml version="1.0" encoding="utf-8"?>
 <p:sld xmlns:a="http://schemas.openxmlformats.org/drawingml/2006/main" xmlns:r="http://schemas.openxmlformats.org/officeDocument/2006/relationships" xmlns:p="http://schemas.openxmlformats.org/presentationml/2006/main">
   <p:cSld>
     <p:spTree>
@@ -4695,36 +5285,6 @@
           </a:p>
         </p:txBody>
       </p:sp>
-      <p:pic>
-        <p:nvPicPr>
-          <p:cNvPr id="5" name="Рисунок 4">
-            <a:extLst>
-              <a:ext uri="{FF2B5EF4-FFF2-40B4-BE49-F238E27FC236}">
-                <a16:creationId xmlns:a16="http://schemas.microsoft.com/office/drawing/2014/main" id="{C14CA6E3-1D44-4625-9EB3-6FA8B6010E30}"/>
-              </a:ext>
-            </a:extLst>
-          </p:cNvPr>
-          <p:cNvPicPr>
-            <a:picLocks noChangeAspect="1"/>
-          </p:cNvPicPr>
-          <p:nvPr/>
-        </p:nvPicPr>
-        <p:blipFill>
-          <a:blip r:embed="rId2"/>
-          <a:stretch>
-            <a:fillRect/>
-          </a:stretch>
-        </p:blipFill>
-        <p:spPr>
-          <a:xfrm>
-            <a:off x="927099" y="1409697"/>
-            <a:ext cx="3098802" cy="2324102"/>
-          </a:xfrm>
-          <a:prstGeom prst="rect">
-            <a:avLst/>
-          </a:prstGeom>
-        </p:spPr>
-      </p:pic>
       <mc:AlternateContent xmlns:mc="http://schemas.openxmlformats.org/markup-compatibility/2006" xmlns:a14="http://schemas.microsoft.com/office/drawing/2010/main">
         <mc:Choice Requires="a14">
           <p:sp>
@@ -5015,10 +5575,10 @@
       </mc:AlternateContent>
       <p:pic>
         <p:nvPicPr>
-          <p:cNvPr id="11" name="Рисунок 10">
+          <p:cNvPr id="4" name="Рисунок 3">
             <a:extLst>
               <a:ext uri="{FF2B5EF4-FFF2-40B4-BE49-F238E27FC236}">
-                <a16:creationId xmlns:a16="http://schemas.microsoft.com/office/drawing/2014/main" id="{88B5E171-E084-4119-A8E4-CE59F873D183}"/>
+                <a16:creationId xmlns:a16="http://schemas.microsoft.com/office/drawing/2014/main" id="{B777D739-DB38-4140-B2CD-53EC842F3494}"/>
               </a:ext>
             </a:extLst>
           </p:cNvPr>
@@ -5035,8 +5595,38 @@
         </p:blipFill>
         <p:spPr>
           <a:xfrm>
-            <a:off x="5118100" y="1409697"/>
+            <a:off x="927101" y="1409697"/>
             <a:ext cx="3098801" cy="2324101"/>
+          </a:xfrm>
+          <a:prstGeom prst="rect">
+            <a:avLst/>
+          </a:prstGeom>
+        </p:spPr>
+      </p:pic>
+      <p:pic>
+        <p:nvPicPr>
+          <p:cNvPr id="7" name="Рисунок 6">
+            <a:extLst>
+              <a:ext uri="{FF2B5EF4-FFF2-40B4-BE49-F238E27FC236}">
+                <a16:creationId xmlns:a16="http://schemas.microsoft.com/office/drawing/2014/main" id="{A3765AFC-833C-4271-8369-D1086684C4BF}"/>
+              </a:ext>
+            </a:extLst>
+          </p:cNvPr>
+          <p:cNvPicPr>
+            <a:picLocks noChangeAspect="1"/>
+          </p:cNvPicPr>
+          <p:nvPr/>
+        </p:nvPicPr>
+        <p:blipFill>
+          <a:blip r:embed="rId6"/>
+          <a:stretch>
+            <a:fillRect/>
+          </a:stretch>
+        </p:blipFill>
+        <p:spPr>
+          <a:xfrm>
+            <a:off x="5118099" y="1409697"/>
+            <a:ext cx="3098800" cy="2324100"/>
           </a:xfrm>
           <a:prstGeom prst="rect">
             <a:avLst/>
@@ -5056,7 +5646,7 @@
 </p:sld>
 </file>
 
-<file path=ppt/slides/slide12.xml><?xml version="1.0" encoding="utf-8"?>
+<file path=ppt/slides/slide14.xml><?xml version="1.0" encoding="utf-8"?>
 <p:sld xmlns:a="http://schemas.openxmlformats.org/drawingml/2006/main" xmlns:r="http://schemas.openxmlformats.org/officeDocument/2006/relationships" xmlns:p="http://schemas.openxmlformats.org/presentationml/2006/main">
   <p:cSld>
     <p:spTree>
@@ -5179,7 +5769,7 @@
 </p:sld>
 </file>
 
-<file path=ppt/slides/slide13.xml><?xml version="1.0" encoding="utf-8"?>
+<file path=ppt/slides/slide15.xml><?xml version="1.0" encoding="utf-8"?>
 <p:sld xmlns:a="http://schemas.openxmlformats.org/drawingml/2006/main" xmlns:r="http://schemas.openxmlformats.org/officeDocument/2006/relationships" xmlns:p="http://schemas.openxmlformats.org/presentationml/2006/main">
   <p:cSld>
     <p:spTree>
@@ -5217,7 +5807,7 @@
           <a:bodyPr/>
           <a:lstStyle/>
           <a:p>
-            <a:pPr marL="88900" indent="0">
+            <a:pPr marL="88900" indent="0" algn="just">
               <a:buNone/>
             </a:pPr>
             <a:r>
@@ -5234,20 +5824,17 @@
             </a:r>
             <a:r>
               <a:rPr lang="ru-RU" sz="1400" dirty="0" err="1"/>
-              <a:t>Графовым</a:t>
+              <a:t>Графовый</a:t>
             </a:r>
             <a:r>
               <a:rPr lang="ru-RU" sz="1400" dirty="0"/>
-              <a:t> он называется, потому что этот класс кодов, удобно представлять в виде графа </a:t>
+              <a:t> код так называется потому, что его проверочная матрица – это матрица инцидентности некоторого графа. Его особенность в том, что каждый столбец проверочной матрицы содержит только 2 единицы. Его также можно представить с помощью графа </a:t>
             </a:r>
             <a:r>
               <a:rPr lang="ru-RU" sz="1400" dirty="0" err="1"/>
               <a:t>Таннера</a:t>
             </a:r>
-            <a:r>
-              <a:rPr lang="ru-RU" sz="1400" dirty="0"/>
-              <a:t>. </a:t>
-            </a:r>
+            <a:endParaRPr lang="ru-RU" sz="1400" dirty="0"/>
           </a:p>
           <a:p>
             <a:pPr marL="88900" indent="0">
@@ -5307,7 +5894,7 @@
         </p:blipFill>
         <p:spPr>
           <a:xfrm>
-            <a:off x="2722296" y="2455862"/>
+            <a:off x="2722296" y="2656427"/>
             <a:ext cx="3686175" cy="1933575"/>
           </a:xfrm>
           <a:prstGeom prst="rect">
@@ -5329,7 +5916,7 @@
         </p:nvSpPr>
         <p:spPr>
           <a:xfrm>
-            <a:off x="3495423" y="4282225"/>
+            <a:off x="3488806" y="4436113"/>
             <a:ext cx="2153154" cy="307777"/>
           </a:xfrm>
           <a:prstGeom prst="rect">
@@ -5368,7 +5955,7 @@
 </p:sld>
 </file>
 
-<file path=ppt/slides/slide14.xml><?xml version="1.0" encoding="utf-8"?>
+<file path=ppt/slides/slide16.xml><?xml version="1.0" encoding="utf-8"?>
 <p:sld xmlns:a="http://schemas.openxmlformats.org/drawingml/2006/main" xmlns:r="http://schemas.openxmlformats.org/officeDocument/2006/relationships" xmlns:p="http://schemas.openxmlformats.org/presentationml/2006/main">
   <p:cSld>
     <p:spTree>
@@ -5408,7 +5995,7 @@
               <a:bodyPr/>
               <a:lstStyle/>
               <a:p>
-                <a:pPr marL="88900" indent="0">
+                <a:pPr marL="88900" indent="0" algn="just">
                   <a:buNone/>
                 </a:pPr>
                 <a:r>
@@ -5695,7 +6282,7 @@
                 <a:endParaRPr lang="ru-RU" sz="1400" dirty="0"/>
               </a:p>
               <a:p>
-                <a:pPr marL="88900" indent="0">
+                <a:pPr marL="88900" indent="0" algn="just">
                   <a:buNone/>
                 </a:pPr>
                 <a:r>
@@ -5727,7 +6314,7 @@
               <a:blipFill>
                 <a:blip r:embed="rId2"/>
                 <a:stretch>
-                  <a:fillRect/>
+                  <a:fillRect r="-215"/>
                 </a:stretch>
               </a:blipFill>
             </p:spPr>
@@ -5787,7 +6374,7 @@
 </p:sld>
 </file>
 
-<file path=ppt/slides/slide15.xml><?xml version="1.0" encoding="utf-8"?>
+<file path=ppt/slides/slide17.xml><?xml version="1.0" encoding="utf-8"?>
 <p:sld xmlns:a="http://schemas.openxmlformats.org/drawingml/2006/main" xmlns:r="http://schemas.openxmlformats.org/officeDocument/2006/relationships" xmlns:p="http://schemas.openxmlformats.org/presentationml/2006/main">
   <p:cSld>
     <p:spTree>
@@ -5832,66 +6419,6 @@
           </a:p>
         </p:txBody>
       </p:sp>
-      <p:pic>
-        <p:nvPicPr>
-          <p:cNvPr id="5" name="Рисунок 4">
-            <a:extLst>
-              <a:ext uri="{FF2B5EF4-FFF2-40B4-BE49-F238E27FC236}">
-                <a16:creationId xmlns:a16="http://schemas.microsoft.com/office/drawing/2014/main" id="{2BC4788C-13D9-422A-B756-3D7ECD31C411}"/>
-              </a:ext>
-            </a:extLst>
-          </p:cNvPr>
-          <p:cNvPicPr>
-            <a:picLocks noChangeAspect="1"/>
-          </p:cNvPicPr>
-          <p:nvPr/>
-        </p:nvPicPr>
-        <p:blipFill>
-          <a:blip r:embed="rId2"/>
-          <a:stretch>
-            <a:fillRect/>
-          </a:stretch>
-        </p:blipFill>
-        <p:spPr>
-          <a:xfrm>
-            <a:off x="571500" y="1716044"/>
-            <a:ext cx="3403600" cy="2552700"/>
-          </a:xfrm>
-          <a:prstGeom prst="rect">
-            <a:avLst/>
-          </a:prstGeom>
-        </p:spPr>
-      </p:pic>
-      <p:pic>
-        <p:nvPicPr>
-          <p:cNvPr id="7" name="Рисунок 6">
-            <a:extLst>
-              <a:ext uri="{FF2B5EF4-FFF2-40B4-BE49-F238E27FC236}">
-                <a16:creationId xmlns:a16="http://schemas.microsoft.com/office/drawing/2014/main" id="{9EF9CCC2-2A0C-4995-A590-5329A49D7906}"/>
-              </a:ext>
-            </a:extLst>
-          </p:cNvPr>
-          <p:cNvPicPr>
-            <a:picLocks noChangeAspect="1"/>
-          </p:cNvPicPr>
-          <p:nvPr/>
-        </p:nvPicPr>
-        <p:blipFill>
-          <a:blip r:embed="rId3"/>
-          <a:stretch>
-            <a:fillRect/>
-          </a:stretch>
-        </p:blipFill>
-        <p:spPr>
-          <a:xfrm>
-            <a:off x="5016499" y="1716044"/>
-            <a:ext cx="3403601" cy="2552700"/>
-          </a:xfrm>
-          <a:prstGeom prst="rect">
-            <a:avLst/>
-          </a:prstGeom>
-        </p:spPr>
-      </p:pic>
       <p:sp>
         <p:nvSpPr>
           <p:cNvPr id="8" name="TextBox 7">
@@ -5946,7 +6473,7 @@
         </p:nvSpPr>
         <p:spPr>
           <a:xfrm>
-            <a:off x="5175248" y="4161022"/>
+            <a:off x="5327651" y="4161022"/>
             <a:ext cx="3086101" cy="523220"/>
           </a:xfrm>
           <a:prstGeom prst="rect">
@@ -5983,6 +6510,66 @@
           </a:p>
         </p:txBody>
       </p:sp>
+      <p:pic>
+        <p:nvPicPr>
+          <p:cNvPr id="4" name="Рисунок 3">
+            <a:extLst>
+              <a:ext uri="{FF2B5EF4-FFF2-40B4-BE49-F238E27FC236}">
+                <a16:creationId xmlns:a16="http://schemas.microsoft.com/office/drawing/2014/main" id="{D3F69271-2E59-42D0-8CDE-18DC53FE36D0}"/>
+              </a:ext>
+            </a:extLst>
+          </p:cNvPr>
+          <p:cNvPicPr>
+            <a:picLocks noChangeAspect="1"/>
+          </p:cNvPicPr>
+          <p:nvPr/>
+        </p:nvPicPr>
+        <p:blipFill>
+          <a:blip r:embed="rId2"/>
+          <a:stretch>
+            <a:fillRect/>
+          </a:stretch>
+        </p:blipFill>
+        <p:spPr>
+          <a:xfrm>
+            <a:off x="650874" y="1716044"/>
+            <a:ext cx="3244852" cy="2552699"/>
+          </a:xfrm>
+          <a:prstGeom prst="rect">
+            <a:avLst/>
+          </a:prstGeom>
+        </p:spPr>
+      </p:pic>
+      <p:pic>
+        <p:nvPicPr>
+          <p:cNvPr id="10" name="Рисунок 9">
+            <a:extLst>
+              <a:ext uri="{FF2B5EF4-FFF2-40B4-BE49-F238E27FC236}">
+                <a16:creationId xmlns:a16="http://schemas.microsoft.com/office/drawing/2014/main" id="{9165B085-A2B6-4479-9270-54801F4B263A}"/>
+              </a:ext>
+            </a:extLst>
+          </p:cNvPr>
+          <p:cNvPicPr>
+            <a:picLocks noChangeAspect="1"/>
+          </p:cNvPicPr>
+          <p:nvPr/>
+        </p:nvPicPr>
+        <p:blipFill>
+          <a:blip r:embed="rId3"/>
+          <a:stretch>
+            <a:fillRect/>
+          </a:stretch>
+        </p:blipFill>
+        <p:spPr>
+          <a:xfrm>
+            <a:off x="5248276" y="1716044"/>
+            <a:ext cx="3244852" cy="2552699"/>
+          </a:xfrm>
+          <a:prstGeom prst="rect">
+            <a:avLst/>
+          </a:prstGeom>
+        </p:spPr>
+      </p:pic>
     </p:spTree>
     <p:extLst>
       <p:ext uri="{BB962C8B-B14F-4D97-AF65-F5344CB8AC3E}">
@@ -5996,7 +6583,7 @@
 </p:sld>
 </file>
 
-<file path=ppt/slides/slide16.xml><?xml version="1.0" encoding="utf-8"?>
+<file path=ppt/slides/slide18.xml><?xml version="1.0" encoding="utf-8"?>
 <p:sld xmlns:a="http://schemas.openxmlformats.org/drawingml/2006/main" xmlns:r="http://schemas.openxmlformats.org/officeDocument/2006/relationships" xmlns:p="http://schemas.openxmlformats.org/presentationml/2006/main">
   <p:cSld>
     <p:spTree>
@@ -6041,8 +6628,8 @@
           </a:p>
         </p:txBody>
       </p:sp>
-      <mc:AlternateContent xmlns:mc="http://schemas.openxmlformats.org/markup-compatibility/2006">
-        <mc:Choice xmlns:a14="http://schemas.microsoft.com/office/drawing/2010/main" Requires="a14">
+      <mc:AlternateContent xmlns:mc="http://schemas.openxmlformats.org/markup-compatibility/2006" xmlns:a14="http://schemas.microsoft.com/office/drawing/2010/main">
+        <mc:Choice Requires="a14">
           <p:sp>
             <p:nvSpPr>
               <p:cNvPr id="4" name="Текст 1">
@@ -6579,7 +7166,7 @@
                 </a:endParaRPr>
               </a:p>
               <a:p>
-                <a:pPr marL="88900" indent="0">
+                <a:pPr marL="88900" indent="0" algn="just">
                   <a:buNone/>
                 </a:pPr>
                 <a14:m>
@@ -6652,10 +7239,41 @@
                   <a:rPr lang="ru-RU" sz="1400" dirty="0"/>
                   <a:t>пользователей одновременно выйдут в канал.</a:t>
                 </a:r>
+              </a:p>
+              <a:p>
+                <a:pPr marL="88900" indent="0" algn="just">
+                  <a:buNone/>
+                </a:pPr>
+                <a14:m>
+                  <m:oMath xmlns:m="http://schemas.openxmlformats.org/officeDocument/2006/math">
+                    <m:r>
+                      <a:rPr lang="en-US" sz="1400" i="1">
+                        <a:latin typeface="Cambria Math" panose="02040503050406030204" pitchFamily="18" charset="0"/>
+                      </a:rPr>
+                      <m:t>𝑀</m:t>
+                    </m:r>
+                  </m:oMath>
+                </a14:m>
+                <a:r>
+                  <a:rPr lang="en-US" sz="1400" i="1" dirty="0"/>
+                  <a:t> </a:t>
+                </a:r>
+                <a:r>
+                  <a:rPr lang="ru-RU" sz="1400" dirty="0"/>
+                  <a:t>—</a:t>
+                </a:r>
+                <a:r>
+                  <a:rPr lang="en-US" sz="1400" dirty="0"/>
+                  <a:t> </a:t>
+                </a:r>
+                <a:r>
+                  <a:rPr lang="ru-RU" sz="1400" dirty="0"/>
+                  <a:t>число протокольных последовательностей.</a:t>
+                </a:r>
                 <a:endParaRPr lang="en-US" sz="1400" dirty="0"/>
               </a:p>
               <a:p>
-                <a:pPr marL="88900" indent="0">
+                <a:pPr marL="88900" indent="0" algn="just">
                   <a:buNone/>
                 </a:pPr>
                 <a14:m>
@@ -6682,11 +7300,12 @@
                 </a:r>
                 <a:r>
                   <a:rPr lang="ru-RU" sz="1400" dirty="0"/>
-                  <a:t>это вес одного кадра.</a:t>
+                  <a:t>длина протокольной последовательности.</a:t>
                 </a:r>
+                <a:endParaRPr lang="en-US" sz="1400" dirty="0"/>
               </a:p>
               <a:p>
-                <a:pPr marL="88900" indent="0">
+                <a:pPr marL="88900" indent="0" algn="just">
                   <a:buNone/>
                 </a:pPr>
                 <a14:m>
@@ -6735,7 +7354,7 @@
             </p:txBody>
           </p:sp>
         </mc:Choice>
-        <mc:Fallback>
+        <mc:Fallback xmlns="">
           <p:sp>
             <p:nvSpPr>
               <p:cNvPr id="4" name="Текст 1">
@@ -6792,7 +7411,7 @@
 </p:sld>
 </file>
 
-<file path=ppt/slides/slide17.xml><?xml version="1.0" encoding="utf-8"?>
+<file path=ppt/slides/slide19.xml><?xml version="1.0" encoding="utf-8"?>
 <p:sld xmlns:a="http://schemas.openxmlformats.org/drawingml/2006/main" xmlns:r="http://schemas.openxmlformats.org/officeDocument/2006/relationships" xmlns:p="http://schemas.openxmlformats.org/presentationml/2006/main">
   <p:cSld>
     <p:spTree>
@@ -6814,7 +7433,7 @@
           <p:cNvPr id="3" name="Заголовок 2">
             <a:extLst>
               <a:ext uri="{FF2B5EF4-FFF2-40B4-BE49-F238E27FC236}">
-                <a16:creationId xmlns:a16="http://schemas.microsoft.com/office/drawing/2014/main" id="{326B2F7C-4A6F-4901-8085-36FBCEBB22DC}"/>
+                <a16:creationId xmlns:a16="http://schemas.microsoft.com/office/drawing/2014/main" id="{B2C115B7-6422-4B77-8E4E-18BC6184AA61}"/>
               </a:ext>
             </a:extLst>
           </p:cNvPr>
@@ -6832,7 +7451,7 @@
           <a:p>
             <a:r>
               <a:rPr lang="ru-RU" dirty="0"/>
-              <a:t>Моделирование</a:t>
+              <a:t>Математическая оценка вероятности потери пакета</a:t>
             </a:r>
           </a:p>
         </p:txBody>
@@ -6842,7 +7461,7 @@
           <p:cNvPr id="5" name="Рисунок 4">
             <a:extLst>
               <a:ext uri="{FF2B5EF4-FFF2-40B4-BE49-F238E27FC236}">
-                <a16:creationId xmlns:a16="http://schemas.microsoft.com/office/drawing/2014/main" id="{8D157D3A-0A92-45AB-A831-7DC220C9A103}"/>
+                <a16:creationId xmlns:a16="http://schemas.microsoft.com/office/drawing/2014/main" id="{E3E5629D-F9CD-4FA4-9C31-B06F5E1AA4B7}"/>
               </a:ext>
             </a:extLst>
           </p:cNvPr>
@@ -6859,141 +7478,68 @@
         </p:blipFill>
         <p:spPr>
           <a:xfrm>
-            <a:off x="2253718" y="1320601"/>
-            <a:ext cx="4623332" cy="3467498"/>
+            <a:off x="2667000" y="1408901"/>
+            <a:ext cx="3810000" cy="2857502"/>
           </a:xfrm>
           <a:prstGeom prst="rect">
             <a:avLst/>
           </a:prstGeom>
         </p:spPr>
       </p:pic>
-    </p:spTree>
-    <p:extLst>
-      <p:ext uri="{BB962C8B-B14F-4D97-AF65-F5344CB8AC3E}">
-        <p14:creationId xmlns:p14="http://schemas.microsoft.com/office/powerpoint/2010/main" val="3601928344"/>
-      </p:ext>
-    </p:extLst>
-  </p:cSld>
-  <p:clrMapOvr>
-    <a:masterClrMapping/>
-  </p:clrMapOvr>
-</p:sld>
-</file>
-
-<file path=ppt/slides/slide18.xml><?xml version="1.0" encoding="utf-8"?>
-<p:sld xmlns:a="http://schemas.openxmlformats.org/drawingml/2006/main" xmlns:r="http://schemas.openxmlformats.org/officeDocument/2006/relationships" xmlns:p="http://schemas.openxmlformats.org/presentationml/2006/main">
-  <p:cSld>
-    <p:spTree>
-      <p:nvGrpSpPr>
-        <p:cNvPr id="1" name=""/>
-        <p:cNvGrpSpPr/>
-        <p:nvPr/>
-      </p:nvGrpSpPr>
-      <p:grpSpPr>
-        <a:xfrm>
-          <a:off x="0" y="0"/>
-          <a:ext cx="0" cy="0"/>
-          <a:chOff x="0" y="0"/>
-          <a:chExt cx="0" cy="0"/>
-        </a:xfrm>
-      </p:grpSpPr>
       <p:sp>
         <p:nvSpPr>
-          <p:cNvPr id="3" name="Заголовок 2">
+          <p:cNvPr id="6" name="TextBox 5">
             <a:extLst>
               <a:ext uri="{FF2B5EF4-FFF2-40B4-BE49-F238E27FC236}">
-                <a16:creationId xmlns:a16="http://schemas.microsoft.com/office/drawing/2014/main" id="{C194D3E0-A377-4839-A55A-81F5FF83EF8E}"/>
+                <a16:creationId xmlns:a16="http://schemas.microsoft.com/office/drawing/2014/main" id="{6D07D678-5664-464A-8014-8A57E9E5A96C}"/>
               </a:ext>
             </a:extLst>
           </p:cNvPr>
-          <p:cNvSpPr>
-            <a:spLocks noGrp="1"/>
-          </p:cNvSpPr>
-          <p:nvPr>
-            <p:ph type="title"/>
-          </p:nvPr>
-        </p:nvSpPr>
-        <p:spPr/>
-        <p:txBody>
-          <a:bodyPr/>
-          <a:lstStyle/>
-          <a:p>
-            <a:r>
-              <a:rPr lang="ru-RU" dirty="0"/>
-              <a:t>Результаты</a:t>
-            </a:r>
-          </a:p>
-        </p:txBody>
-      </p:sp>
-      <p:sp>
-        <p:nvSpPr>
-          <p:cNvPr id="9" name="Текст 1">
-            <a:extLst>
-              <a:ext uri="{FF2B5EF4-FFF2-40B4-BE49-F238E27FC236}">
-                <a16:creationId xmlns:a16="http://schemas.microsoft.com/office/drawing/2014/main" id="{EAC0BB8B-1661-4D10-801E-8E2318A223EA}"/>
-              </a:ext>
-            </a:extLst>
-          </p:cNvPr>
-          <p:cNvSpPr>
-            <a:spLocks noGrp="1"/>
-          </p:cNvSpPr>
-          <p:nvPr>
-            <p:ph type="body" idx="1"/>
-          </p:nvPr>
+          <p:cNvSpPr txBox="1"/>
+          <p:nvPr/>
         </p:nvSpPr>
         <p:spPr>
           <a:xfrm>
-            <a:off x="313058" y="1394786"/>
-            <a:ext cx="8520416" cy="3195216"/>
+            <a:off x="2773270" y="4220670"/>
+            <a:ext cx="3597459" cy="738664"/>
           </a:xfrm>
+          <a:prstGeom prst="rect">
+            <a:avLst/>
+          </a:prstGeom>
+          <a:noFill/>
         </p:spPr>
         <p:txBody>
-          <a:bodyPr/>
+          <a:bodyPr wrap="none" rtlCol="0">
+            <a:spAutoFit/>
+          </a:bodyPr>
           <a:lstStyle/>
           <a:p>
+            <a:pPr algn="ctr"/>
             <a:r>
-              <a:rPr lang="ru-RU" sz="1400" dirty="0"/>
-              <a:t>Был разработан протокол взаимодействия в сети с возможностью исправления стираний</a:t>
+              <a:rPr lang="ru-RU" dirty="0"/>
+              <a:t>Зависимость вероятности потери пакета</a:t>
             </a:r>
           </a:p>
           <a:p>
+            <a:pPr algn="ctr"/>
             <a:r>
-              <a:rPr lang="ru-RU" sz="1400" dirty="0"/>
-              <a:t>Даны оценки на вероятность потери пакетов в зависимости</a:t>
-            </a:r>
-            <a:r>
-              <a:rPr lang="en-US" sz="1400" dirty="0"/>
-              <a:t> </a:t>
-            </a:r>
-            <a:r>
-              <a:rPr lang="ru-RU" sz="1400" dirty="0"/>
-              <a:t>от числа пользователей</a:t>
+              <a:rPr lang="ru-RU" dirty="0"/>
+              <a:t> от числа активных пользователей.</a:t>
             </a:r>
           </a:p>
           <a:p>
+            <a:pPr algn="ctr"/>
             <a:r>
-              <a:rPr lang="ru-RU" sz="1400" dirty="0"/>
-              <a:t>Проведено моделирование</a:t>
+              <a:rPr lang="ru-RU" dirty="0"/>
+              <a:t> (2, 3)-регулярный МППЧ-код.</a:t>
             </a:r>
-          </a:p>
-          <a:p>
-            <a:endParaRPr lang="ru-RU" sz="1400" dirty="0"/>
-          </a:p>
-          <a:p>
-            <a:endParaRPr lang="ru-RU" sz="1400" dirty="0"/>
-          </a:p>
-          <a:p>
-            <a:pPr marL="88900" indent="0">
-              <a:buNone/>
-            </a:pPr>
-            <a:endParaRPr lang="ru-RU" dirty="0"/>
           </a:p>
         </p:txBody>
       </p:sp>
     </p:spTree>
     <p:extLst>
       <p:ext uri="{BB962C8B-B14F-4D97-AF65-F5344CB8AC3E}">
-        <p14:creationId xmlns:p14="http://schemas.microsoft.com/office/powerpoint/2010/main" val="56749900"/>
+        <p14:creationId xmlns:p14="http://schemas.microsoft.com/office/powerpoint/2010/main" val="3128140977"/>
       </p:ext>
     </p:extLst>
   </p:cSld>
@@ -7159,6 +7705,1457 @@
 </p:sld>
 </file>
 
+<file path=ppt/slides/slide20.xml><?xml version="1.0" encoding="utf-8"?>
+<p:sld xmlns:a="http://schemas.openxmlformats.org/drawingml/2006/main" xmlns:r="http://schemas.openxmlformats.org/officeDocument/2006/relationships" xmlns:p="http://schemas.openxmlformats.org/presentationml/2006/main">
+  <p:cSld>
+    <p:spTree>
+      <p:nvGrpSpPr>
+        <p:cNvPr id="1" name=""/>
+        <p:cNvGrpSpPr/>
+        <p:nvPr/>
+      </p:nvGrpSpPr>
+      <p:grpSpPr>
+        <a:xfrm>
+          <a:off x="0" y="0"/>
+          <a:ext cx="0" cy="0"/>
+          <a:chOff x="0" y="0"/>
+          <a:chExt cx="0" cy="0"/>
+        </a:xfrm>
+      </p:grpSpPr>
+      <p:sp>
+        <p:nvSpPr>
+          <p:cNvPr id="3" name="Заголовок 2">
+            <a:extLst>
+              <a:ext uri="{FF2B5EF4-FFF2-40B4-BE49-F238E27FC236}">
+                <a16:creationId xmlns:a16="http://schemas.microsoft.com/office/drawing/2014/main" id="{326B2F7C-4A6F-4901-8085-36FBCEBB22DC}"/>
+              </a:ext>
+            </a:extLst>
+          </p:cNvPr>
+          <p:cNvSpPr>
+            <a:spLocks noGrp="1"/>
+          </p:cNvSpPr>
+          <p:nvPr>
+            <p:ph type="title"/>
+          </p:nvPr>
+        </p:nvSpPr>
+        <p:spPr/>
+        <p:txBody>
+          <a:bodyPr/>
+          <a:lstStyle/>
+          <a:p>
+            <a:r>
+              <a:rPr lang="ru-RU" dirty="0"/>
+              <a:t>Моделирование</a:t>
+            </a:r>
+          </a:p>
+        </p:txBody>
+      </p:sp>
+      <p:pic>
+        <p:nvPicPr>
+          <p:cNvPr id="7" name="Рисунок 6">
+            <a:extLst>
+              <a:ext uri="{FF2B5EF4-FFF2-40B4-BE49-F238E27FC236}">
+                <a16:creationId xmlns:a16="http://schemas.microsoft.com/office/drawing/2014/main" id="{697300EC-85CD-4FA5-B104-BD978AA381D2}"/>
+              </a:ext>
+            </a:extLst>
+          </p:cNvPr>
+          <p:cNvPicPr>
+            <a:picLocks noChangeAspect="1"/>
+          </p:cNvPicPr>
+          <p:nvPr/>
+        </p:nvPicPr>
+        <p:blipFill>
+          <a:blip r:embed="rId2"/>
+          <a:stretch>
+            <a:fillRect/>
+          </a:stretch>
+        </p:blipFill>
+        <p:spPr>
+          <a:xfrm>
+            <a:off x="2711183" y="1263649"/>
+            <a:ext cx="3708402" cy="2781302"/>
+          </a:xfrm>
+          <a:prstGeom prst="rect">
+            <a:avLst/>
+          </a:prstGeom>
+        </p:spPr>
+      </p:pic>
+      <p:sp>
+        <p:nvSpPr>
+          <p:cNvPr id="9" name="Прямоугольник 8">
+            <a:extLst>
+              <a:ext uri="{FF2B5EF4-FFF2-40B4-BE49-F238E27FC236}">
+                <a16:creationId xmlns:a16="http://schemas.microsoft.com/office/drawing/2014/main" id="{C94F2979-BA23-4099-BA81-0C5BE31B9EDF}"/>
+              </a:ext>
+            </a:extLst>
+          </p:cNvPr>
+          <p:cNvSpPr/>
+          <p:nvPr/>
+        </p:nvSpPr>
+        <p:spPr>
+          <a:xfrm>
+            <a:off x="2462885" y="4134619"/>
+            <a:ext cx="4254691" cy="738664"/>
+          </a:xfrm>
+          <a:prstGeom prst="rect">
+            <a:avLst/>
+          </a:prstGeom>
+        </p:spPr>
+        <p:txBody>
+          <a:bodyPr wrap="none">
+            <a:spAutoFit/>
+          </a:bodyPr>
+          <a:lstStyle/>
+          <a:p>
+            <a:pPr algn="ctr"/>
+            <a:r>
+              <a:rPr lang="ru-RU" dirty="0"/>
+              <a:t>Вероятность потери пакета при моделировании</a:t>
+            </a:r>
+            <a:r>
+              <a:rPr lang="en-US" dirty="0"/>
+              <a:t>.</a:t>
+            </a:r>
+          </a:p>
+          <a:p>
+            <a:pPr algn="ctr"/>
+            <a:r>
+              <a:rPr lang="en-US" dirty="0"/>
+              <a:t>(</a:t>
+            </a:r>
+            <a:r>
+              <a:rPr lang="ru-RU" dirty="0"/>
+              <a:t>2</a:t>
+            </a:r>
+            <a:r>
+              <a:rPr lang="en-US" dirty="0"/>
+              <a:t>, 4)-</a:t>
+            </a:r>
+            <a:r>
+              <a:rPr lang="ru-RU" dirty="0"/>
+              <a:t>регулярный МППЧ-код.</a:t>
+            </a:r>
+            <a:br>
+              <a:rPr lang="en-US" dirty="0"/>
+            </a:br>
+            <a:endParaRPr lang="ru-RU" dirty="0"/>
+          </a:p>
+        </p:txBody>
+      </p:sp>
+    </p:spTree>
+    <p:extLst>
+      <p:ext uri="{BB962C8B-B14F-4D97-AF65-F5344CB8AC3E}">
+        <p14:creationId xmlns:p14="http://schemas.microsoft.com/office/powerpoint/2010/main" val="3601928344"/>
+      </p:ext>
+    </p:extLst>
+  </p:cSld>
+  <p:clrMapOvr>
+    <a:masterClrMapping/>
+  </p:clrMapOvr>
+</p:sld>
+</file>
+
+<file path=ppt/slides/slide21.xml><?xml version="1.0" encoding="utf-8"?>
+<p:sld xmlns:a="http://schemas.openxmlformats.org/drawingml/2006/main" xmlns:r="http://schemas.openxmlformats.org/officeDocument/2006/relationships" xmlns:p="http://schemas.openxmlformats.org/presentationml/2006/main">
+  <p:cSld>
+    <p:spTree>
+      <p:nvGrpSpPr>
+        <p:cNvPr id="1" name=""/>
+        <p:cNvGrpSpPr/>
+        <p:nvPr/>
+      </p:nvGrpSpPr>
+      <p:grpSpPr>
+        <a:xfrm>
+          <a:off x="0" y="0"/>
+          <a:ext cx="0" cy="0"/>
+          <a:chOff x="0" y="0"/>
+          <a:chExt cx="0" cy="0"/>
+        </a:xfrm>
+      </p:grpSpPr>
+      <mc:AlternateContent xmlns:mc="http://schemas.openxmlformats.org/markup-compatibility/2006" xmlns:a14="http://schemas.microsoft.com/office/drawing/2010/main">
+        <mc:Choice Requires="a14">
+          <p:sp>
+            <p:nvSpPr>
+              <p:cNvPr id="2" name="Текст 1">
+                <a:extLst>
+                  <a:ext uri="{FF2B5EF4-FFF2-40B4-BE49-F238E27FC236}">
+                    <a16:creationId xmlns:a16="http://schemas.microsoft.com/office/drawing/2014/main" id="{F46603BC-EEF1-46A4-8482-2AF571162087}"/>
+                  </a:ext>
+                </a:extLst>
+              </p:cNvPr>
+              <p:cNvSpPr>
+                <a:spLocks noGrp="1"/>
+              </p:cNvSpPr>
+              <p:nvPr>
+                <p:ph type="body" idx="1"/>
+              </p:nvPr>
+            </p:nvSpPr>
+            <p:spPr/>
+            <p:txBody>
+              <a:bodyPr/>
+              <a:lstStyle/>
+              <a:p>
+                <a:pPr marL="88900" indent="0" algn="just">
+                  <a:buNone/>
+                </a:pPr>
+                <a:r>
+                  <a:rPr lang="ru-RU" sz="1400" dirty="0"/>
+                  <a:t>Без потери общности, мы считаем, что алгоритмы, использующие разделение по времени, эквивалентны использованию ортогональных протокольных последовательностей. Проведем сравнение на максимальном рассматриваемом нами при моделировании числе пользователей. В таком случае вероятность потери пакета равняется </a:t>
+                </a:r>
+                <a14:m>
+                  <m:oMath xmlns:m="http://schemas.openxmlformats.org/officeDocument/2006/math">
+                    <m:sSup>
+                      <m:sSupPr>
+                        <m:ctrlPr>
+                          <a:rPr lang="en-US" sz="1400" b="0" i="1" smtClean="0">
+                            <a:latin typeface="Cambria Math" panose="02040503050406030204" pitchFamily="18" charset="0"/>
+                          </a:rPr>
+                        </m:ctrlPr>
+                      </m:sSupPr>
+                      <m:e>
+                        <m:r>
+                          <a:rPr lang="ru-RU" sz="1400" b="0" i="1" smtClean="0">
+                            <a:latin typeface="Cambria Math" panose="02040503050406030204" pitchFamily="18" charset="0"/>
+                          </a:rPr>
+                          <m:t>10</m:t>
+                        </m:r>
+                      </m:e>
+                      <m:sup>
+                        <m:r>
+                          <a:rPr lang="en-US" sz="1400" b="0" i="1" smtClean="0">
+                            <a:latin typeface="Cambria Math" panose="02040503050406030204" pitchFamily="18" charset="0"/>
+                          </a:rPr>
+                          <m:t>−1</m:t>
+                        </m:r>
+                      </m:sup>
+                    </m:sSup>
+                    <m:r>
+                      <a:rPr lang="en-US" sz="1400" b="0" i="1" smtClean="0">
+                        <a:latin typeface="Cambria Math" panose="02040503050406030204" pitchFamily="18" charset="0"/>
+                      </a:rPr>
+                      <m:t>.</m:t>
+                    </m:r>
+                  </m:oMath>
+                </a14:m>
+                <a:endParaRPr lang="en-US" sz="1400" b="0" dirty="0"/>
+              </a:p>
+              <a:p>
+                <a:pPr marL="88900" indent="0" algn="just">
+                  <a:buNone/>
+                </a:pPr>
+                <a:r>
+                  <a:rPr lang="ru-RU" sz="1400" dirty="0"/>
+                  <a:t>Пусть</a:t>
+                </a:r>
+                <a:r>
+                  <a:rPr lang="en-US" sz="1400" dirty="0"/>
+                  <a:t> </a:t>
+                </a:r>
+                <a14:m>
+                  <m:oMath xmlns:m="http://schemas.openxmlformats.org/officeDocument/2006/math">
+                    <m:r>
+                      <a:rPr lang="en-US" sz="1400" b="0" i="1" smtClean="0">
+                        <a:latin typeface="Cambria Math" panose="02040503050406030204" pitchFamily="18" charset="0"/>
+                      </a:rPr>
+                      <m:t>𝑋</m:t>
+                    </m:r>
+                  </m:oMath>
+                </a14:m>
+                <a:r>
+                  <a:rPr lang="en-US" sz="1400" dirty="0"/>
+                  <a:t> </a:t>
+                </a:r>
+                <a:r>
+                  <a:rPr lang="ru-RU" sz="1400" dirty="0"/>
+                  <a:t>—</a:t>
+                </a:r>
+                <a:r>
+                  <a:rPr lang="en-US" sz="1400" dirty="0"/>
+                  <a:t> </a:t>
+                </a:r>
+                <a:r>
+                  <a:rPr lang="ru-RU" sz="1400" dirty="0"/>
+                  <a:t>число кадров в течение которых мы передаем данные.  Тогда число пакетов, которые мы можем передать, используя ортогональные последовательности равняется:</a:t>
+                </a:r>
+              </a:p>
+              <a:p>
+                <a:pPr marL="88900" indent="0" algn="just">
+                  <a:buNone/>
+                </a:pPr>
+                <a14:m>
+                  <m:oMathPara xmlns:m="http://schemas.openxmlformats.org/officeDocument/2006/math">
+                    <m:oMathParaPr>
+                      <m:jc m:val="centerGroup"/>
+                    </m:oMathParaPr>
+                    <m:oMath xmlns:m="http://schemas.openxmlformats.org/officeDocument/2006/math">
+                      <m:r>
+                        <a:rPr lang="en-US" sz="1400" b="0" i="1" smtClean="0">
+                          <a:latin typeface="Cambria Math" panose="02040503050406030204" pitchFamily="18" charset="0"/>
+                        </a:rPr>
+                        <m:t>2</m:t>
+                      </m:r>
+                      <m:r>
+                        <a:rPr lang="en-US" sz="1400" b="0" i="1" smtClean="0">
+                          <a:latin typeface="Cambria Math" panose="02040503050406030204" pitchFamily="18" charset="0"/>
+                        </a:rPr>
+                        <m:t>𝑋</m:t>
+                      </m:r>
+                    </m:oMath>
+                  </m:oMathPara>
+                </a14:m>
+                <a:endParaRPr lang="en-US" sz="1400" dirty="0"/>
+              </a:p>
+              <a:p>
+                <a:pPr marL="88900" indent="0" algn="just">
+                  <a:buNone/>
+                </a:pPr>
+                <a:r>
+                  <a:rPr lang="ru-RU" sz="1400" dirty="0"/>
+                  <a:t>Число же пакетов, которые мы можем передать, используя наш протокол, равняется:</a:t>
+                </a:r>
+              </a:p>
+              <a:p>
+                <a:pPr marL="88900" indent="0" algn="just">
+                  <a:buNone/>
+                </a:pPr>
+                <a14:m>
+                  <m:oMathPara xmlns:m="http://schemas.openxmlformats.org/officeDocument/2006/math">
+                    <m:oMathParaPr>
+                      <m:jc m:val="centerGroup"/>
+                    </m:oMathParaPr>
+                    <m:oMath xmlns:m="http://schemas.openxmlformats.org/officeDocument/2006/math">
+                      <m:r>
+                        <a:rPr lang="en-US" sz="1400" b="0" i="1" smtClean="0">
+                          <a:latin typeface="Cambria Math" panose="02040503050406030204" pitchFamily="18" charset="0"/>
+                        </a:rPr>
+                        <m:t>𝐽</m:t>
+                      </m:r>
+                      <m:r>
+                        <a:rPr lang="en-US" sz="1400" i="1">
+                          <a:latin typeface="Cambria Math" panose="02040503050406030204" pitchFamily="18" charset="0"/>
+                        </a:rPr>
+                        <m:t>𝑋</m:t>
+                      </m:r>
+                      <m:r>
+                        <a:rPr lang="en-US" sz="1400" b="0" i="1" smtClean="0">
+                          <a:latin typeface="Cambria Math" panose="02040503050406030204" pitchFamily="18" charset="0"/>
+                        </a:rPr>
+                        <m:t>=4</m:t>
+                      </m:r>
+                      <m:r>
+                        <a:rPr lang="en-US" sz="1400" b="0" i="1" smtClean="0">
+                          <a:latin typeface="Cambria Math" panose="02040503050406030204" pitchFamily="18" charset="0"/>
+                        </a:rPr>
+                        <m:t>𝑋</m:t>
+                      </m:r>
+                    </m:oMath>
+                  </m:oMathPara>
+                </a14:m>
+                <a:endParaRPr lang="en-US" sz="1400" dirty="0"/>
+              </a:p>
+              <a:p>
+                <a:pPr marL="88900" indent="0" algn="just">
+                  <a:buNone/>
+                </a:pPr>
+                <a:endParaRPr lang="en-US" sz="1400" dirty="0"/>
+              </a:p>
+              <a:p>
+                <a:pPr marL="88900" indent="0" algn="just">
+                  <a:buNone/>
+                </a:pPr>
+                <a:endParaRPr lang="ru-RU" sz="1400" dirty="0"/>
+              </a:p>
+            </p:txBody>
+          </p:sp>
+        </mc:Choice>
+        <mc:Fallback xmlns="">
+          <p:sp>
+            <p:nvSpPr>
+              <p:cNvPr id="2" name="Текст 1">
+                <a:extLst>
+                  <a:ext uri="{FF2B5EF4-FFF2-40B4-BE49-F238E27FC236}">
+                    <a16:creationId xmlns:a16="http://schemas.microsoft.com/office/drawing/2014/main" id="{F46603BC-EEF1-46A4-8482-2AF571162087}"/>
+                  </a:ext>
+                </a:extLst>
+              </p:cNvPr>
+              <p:cNvSpPr>
+                <a:spLocks noGrp="1" noRot="1" noChangeAspect="1" noMove="1" noResize="1" noEditPoints="1" noAdjustHandles="1" noChangeArrowheads="1" noChangeShapeType="1" noTextEdit="1"/>
+              </p:cNvSpPr>
+              <p:nvPr>
+                <p:ph type="body" idx="1"/>
+              </p:nvPr>
+            </p:nvSpPr>
+            <p:spPr>
+              <a:blipFill>
+                <a:blip r:embed="rId2"/>
+                <a:stretch>
+                  <a:fillRect r="-215"/>
+                </a:stretch>
+              </a:blipFill>
+            </p:spPr>
+            <p:txBody>
+              <a:bodyPr/>
+              <a:lstStyle/>
+              <a:p>
+                <a:r>
+                  <a:rPr lang="ru-RU">
+                    <a:noFill/>
+                  </a:rPr>
+                  <a:t> </a:t>
+                </a:r>
+              </a:p>
+            </p:txBody>
+          </p:sp>
+        </mc:Fallback>
+      </mc:AlternateContent>
+      <p:sp>
+        <p:nvSpPr>
+          <p:cNvPr id="3" name="Заголовок 2">
+            <a:extLst>
+              <a:ext uri="{FF2B5EF4-FFF2-40B4-BE49-F238E27FC236}">
+                <a16:creationId xmlns:a16="http://schemas.microsoft.com/office/drawing/2014/main" id="{F2B6EB80-9F5E-4E47-9289-66D640E58975}"/>
+              </a:ext>
+            </a:extLst>
+          </p:cNvPr>
+          <p:cNvSpPr>
+            <a:spLocks noGrp="1"/>
+          </p:cNvSpPr>
+          <p:nvPr>
+            <p:ph type="title"/>
+          </p:nvPr>
+        </p:nvSpPr>
+        <p:spPr/>
+        <p:txBody>
+          <a:bodyPr/>
+          <a:lstStyle/>
+          <a:p>
+            <a:r>
+              <a:rPr lang="ru-RU" dirty="0"/>
+              <a:t>Сравнение</a:t>
+            </a:r>
+          </a:p>
+        </p:txBody>
+      </p:sp>
+    </p:spTree>
+    <p:extLst>
+      <p:ext uri="{BB962C8B-B14F-4D97-AF65-F5344CB8AC3E}">
+        <p14:creationId xmlns:p14="http://schemas.microsoft.com/office/powerpoint/2010/main" val="785976109"/>
+      </p:ext>
+    </p:extLst>
+  </p:cSld>
+  <p:clrMapOvr>
+    <a:masterClrMapping/>
+  </p:clrMapOvr>
+</p:sld>
+</file>
+
+<file path=ppt/slides/slide22.xml><?xml version="1.0" encoding="utf-8"?>
+<p:sld xmlns:a="http://schemas.openxmlformats.org/drawingml/2006/main" xmlns:r="http://schemas.openxmlformats.org/officeDocument/2006/relationships" xmlns:p="http://schemas.openxmlformats.org/presentationml/2006/main">
+  <p:cSld>
+    <p:spTree>
+      <p:nvGrpSpPr>
+        <p:cNvPr id="1" name=""/>
+        <p:cNvGrpSpPr/>
+        <p:nvPr/>
+      </p:nvGrpSpPr>
+      <p:grpSpPr>
+        <a:xfrm>
+          <a:off x="0" y="0"/>
+          <a:ext cx="0" cy="0"/>
+          <a:chOff x="0" y="0"/>
+          <a:chExt cx="0" cy="0"/>
+        </a:xfrm>
+      </p:grpSpPr>
+      <mc:AlternateContent xmlns:mc="http://schemas.openxmlformats.org/markup-compatibility/2006" xmlns:a14="http://schemas.microsoft.com/office/drawing/2010/main">
+        <mc:Choice Requires="a14">
+          <p:sp>
+            <p:nvSpPr>
+              <p:cNvPr id="2" name="Текст 1">
+                <a:extLst>
+                  <a:ext uri="{FF2B5EF4-FFF2-40B4-BE49-F238E27FC236}">
+                    <a16:creationId xmlns:a16="http://schemas.microsoft.com/office/drawing/2014/main" id="{D75E7166-60BE-47BD-97C6-14507EDFB114}"/>
+                  </a:ext>
+                </a:extLst>
+              </p:cNvPr>
+              <p:cNvSpPr>
+                <a:spLocks noGrp="1"/>
+              </p:cNvSpPr>
+              <p:nvPr>
+                <p:ph type="body" idx="1"/>
+              </p:nvPr>
+            </p:nvSpPr>
+            <p:spPr/>
+            <p:txBody>
+              <a:bodyPr/>
+              <a:lstStyle/>
+              <a:p>
+                <a:pPr marL="88900" indent="0" algn="just">
+                  <a:buNone/>
+                </a:pPr>
+                <a:r>
+                  <a:rPr lang="ru-RU" sz="1400" dirty="0"/>
+                  <a:t>В нашем протоколе мы передаем избыточные пакеты. Их число можно посчитать как.</a:t>
+                </a:r>
+              </a:p>
+              <a:p>
+                <a:pPr marL="88900" indent="0">
+                  <a:buNone/>
+                </a:pPr>
+                <a14:m>
+                  <m:oMathPara xmlns:m="http://schemas.openxmlformats.org/officeDocument/2006/math">
+                    <m:oMathParaPr>
+                      <m:jc m:val="centerGroup"/>
+                    </m:oMathParaPr>
+                    <m:oMath xmlns:m="http://schemas.openxmlformats.org/officeDocument/2006/math">
+                      <m:r>
+                        <a:rPr lang="en-US" sz="1400" b="0" i="1" smtClean="0">
+                          <a:latin typeface="Cambria Math" panose="02040503050406030204" pitchFamily="18" charset="0"/>
+                        </a:rPr>
+                        <m:t>𝑅𝑃</m:t>
+                      </m:r>
+                      <m:r>
+                        <a:rPr lang="en-US" sz="1400" b="0" i="1" smtClean="0">
+                          <a:latin typeface="Cambria Math" panose="02040503050406030204" pitchFamily="18" charset="0"/>
+                        </a:rPr>
+                        <m:t>=</m:t>
+                      </m:r>
+                      <m:r>
+                        <a:rPr lang="en-US" sz="1400" b="0" i="1" smtClean="0">
+                          <a:latin typeface="Cambria Math" panose="02040503050406030204" pitchFamily="18" charset="0"/>
+                        </a:rPr>
+                        <m:t>𝐹𝑁</m:t>
+                      </m:r>
+                      <m:r>
+                        <a:rPr lang="en-US" sz="1400" b="0" i="1" smtClean="0">
+                          <a:latin typeface="Cambria Math" panose="02040503050406030204" pitchFamily="18" charset="0"/>
+                        </a:rPr>
+                        <m:t>×</m:t>
+                      </m:r>
+                      <m:r>
+                        <a:rPr lang="en-US" sz="1400" b="0" i="1" smtClean="0">
+                          <a:latin typeface="Cambria Math" panose="02040503050406030204" pitchFamily="18" charset="0"/>
+                        </a:rPr>
+                        <m:t>𝑃𝑃𝐹</m:t>
+                      </m:r>
+                      <m:r>
+                        <a:rPr lang="en-US" sz="1400" b="0" i="1" smtClean="0">
+                          <a:latin typeface="Cambria Math" panose="02040503050406030204" pitchFamily="18" charset="0"/>
+                        </a:rPr>
+                        <m:t>×(1 −</m:t>
+                      </m:r>
+                      <m:r>
+                        <a:rPr lang="en-US" sz="1400" b="0" i="1" smtClean="0">
+                          <a:latin typeface="Cambria Math" panose="02040503050406030204" pitchFamily="18" charset="0"/>
+                        </a:rPr>
+                        <m:t>𝑅</m:t>
+                      </m:r>
+                      <m:r>
+                        <a:rPr lang="en-US" sz="1400" b="0" i="1" smtClean="0">
+                          <a:latin typeface="Cambria Math" panose="02040503050406030204" pitchFamily="18" charset="0"/>
+                        </a:rPr>
+                        <m:t>)</m:t>
+                      </m:r>
+                    </m:oMath>
+                  </m:oMathPara>
+                </a14:m>
+                <a:endParaRPr lang="en-US" sz="1400" dirty="0"/>
+              </a:p>
+              <a:p>
+                <a:pPr marL="88900" indent="0" algn="just">
+                  <a:buNone/>
+                </a:pPr>
+                <a14:m>
+                  <m:oMath xmlns:m="http://schemas.openxmlformats.org/officeDocument/2006/math">
+                    <m:r>
+                      <a:rPr lang="en-US" sz="1400" b="0" i="1" smtClean="0">
+                        <a:latin typeface="Cambria Math" panose="02040503050406030204" pitchFamily="18" charset="0"/>
+                      </a:rPr>
+                      <m:t>𝐹𝑁</m:t>
+                    </m:r>
+                  </m:oMath>
+                </a14:m>
+                <a:r>
+                  <a:rPr lang="en-US" sz="1400" dirty="0"/>
+                  <a:t>   </a:t>
+                </a:r>
+                <a:r>
+                  <a:rPr lang="ru-RU" sz="1400" dirty="0"/>
+                  <a:t>—</a:t>
+                </a:r>
+                <a:r>
+                  <a:rPr lang="en-US" sz="1400" dirty="0"/>
+                  <a:t> </a:t>
+                </a:r>
+                <a:r>
+                  <a:rPr lang="ru-RU" sz="1400" dirty="0"/>
+                  <a:t>число кадров, на которых передавались данные</a:t>
+                </a:r>
+              </a:p>
+              <a:p>
+                <a:pPr marL="88900" indent="0" algn="just">
+                  <a:buNone/>
+                </a:pPr>
+                <a14:m>
+                  <m:oMath xmlns:m="http://schemas.openxmlformats.org/officeDocument/2006/math">
+                    <m:r>
+                      <a:rPr lang="en-US" sz="1400" b="0" i="1" smtClean="0">
+                        <a:latin typeface="Cambria Math" panose="02040503050406030204" pitchFamily="18" charset="0"/>
+                      </a:rPr>
+                      <m:t>𝑃𝑃𝐹</m:t>
+                    </m:r>
+                  </m:oMath>
+                </a14:m>
+                <a:r>
+                  <a:rPr lang="en-US" sz="1400" dirty="0"/>
+                  <a:t> </a:t>
+                </a:r>
+                <a:r>
+                  <a:rPr lang="ru-RU" sz="1400" dirty="0"/>
+                  <a:t>—</a:t>
+                </a:r>
+                <a:r>
+                  <a:rPr lang="en-US" sz="1400" dirty="0"/>
+                  <a:t> </a:t>
+                </a:r>
+                <a:r>
+                  <a:rPr lang="ru-RU" sz="1400" dirty="0"/>
+                  <a:t>число пакетов, которые можно передать за один кадр</a:t>
+                </a:r>
+                <a:endParaRPr lang="en-US" sz="1400" dirty="0"/>
+              </a:p>
+              <a:p>
+                <a:pPr marL="88900" indent="0" algn="just">
+                  <a:buNone/>
+                </a:pPr>
+                <a14:m>
+                  <m:oMath xmlns:m="http://schemas.openxmlformats.org/officeDocument/2006/math">
+                    <m:r>
+                      <a:rPr lang="en-US" sz="1400" b="0" i="1" smtClean="0">
+                        <a:latin typeface="Cambria Math" panose="02040503050406030204" pitchFamily="18" charset="0"/>
+                      </a:rPr>
+                      <m:t>𝑅</m:t>
+                    </m:r>
+                  </m:oMath>
+                </a14:m>
+                <a:r>
+                  <a:rPr lang="en-US" sz="1400" dirty="0"/>
+                  <a:t>      </a:t>
+                </a:r>
+                <a:r>
+                  <a:rPr lang="ru-RU" sz="1400" dirty="0"/>
+                  <a:t>— скорость кода</a:t>
+                </a:r>
+                <a:endParaRPr lang="en-US" sz="1400" dirty="0"/>
+              </a:p>
+              <a:p>
+                <a:pPr marL="88900" indent="0">
+                  <a:buNone/>
+                </a:pPr>
+                <a:endParaRPr lang="ru-RU" sz="1400" dirty="0"/>
+              </a:p>
+            </p:txBody>
+          </p:sp>
+        </mc:Choice>
+        <mc:Fallback xmlns="">
+          <p:sp>
+            <p:nvSpPr>
+              <p:cNvPr id="2" name="Текст 1">
+                <a:extLst>
+                  <a:ext uri="{FF2B5EF4-FFF2-40B4-BE49-F238E27FC236}">
+                    <a16:creationId xmlns:a16="http://schemas.microsoft.com/office/drawing/2014/main" id="{D75E7166-60BE-47BD-97C6-14507EDFB114}"/>
+                  </a:ext>
+                </a:extLst>
+              </p:cNvPr>
+              <p:cNvSpPr>
+                <a:spLocks noGrp="1" noRot="1" noChangeAspect="1" noMove="1" noResize="1" noEditPoints="1" noAdjustHandles="1" noChangeArrowheads="1" noChangeShapeType="1" noTextEdit="1"/>
+              </p:cNvSpPr>
+              <p:nvPr>
+                <p:ph type="body" idx="1"/>
+              </p:nvPr>
+            </p:nvSpPr>
+            <p:spPr>
+              <a:blipFill>
+                <a:blip r:embed="rId2"/>
+                <a:stretch>
+                  <a:fillRect/>
+                </a:stretch>
+              </a:blipFill>
+            </p:spPr>
+            <p:txBody>
+              <a:bodyPr/>
+              <a:lstStyle/>
+              <a:p>
+                <a:r>
+                  <a:rPr lang="ru-RU">
+                    <a:noFill/>
+                  </a:rPr>
+                  <a:t> </a:t>
+                </a:r>
+              </a:p>
+            </p:txBody>
+          </p:sp>
+        </mc:Fallback>
+      </mc:AlternateContent>
+      <p:sp>
+        <p:nvSpPr>
+          <p:cNvPr id="3" name="Заголовок 2">
+            <a:extLst>
+              <a:ext uri="{FF2B5EF4-FFF2-40B4-BE49-F238E27FC236}">
+                <a16:creationId xmlns:a16="http://schemas.microsoft.com/office/drawing/2014/main" id="{A24FC8CA-B6A5-4463-9A9B-10FB7AB1799F}"/>
+              </a:ext>
+            </a:extLst>
+          </p:cNvPr>
+          <p:cNvSpPr>
+            <a:spLocks noGrp="1"/>
+          </p:cNvSpPr>
+          <p:nvPr>
+            <p:ph type="title"/>
+          </p:nvPr>
+        </p:nvSpPr>
+        <p:spPr/>
+        <p:txBody>
+          <a:bodyPr/>
+          <a:lstStyle/>
+          <a:p>
+            <a:r>
+              <a:rPr lang="ru-RU" dirty="0"/>
+              <a:t>Сравнение</a:t>
+            </a:r>
+          </a:p>
+        </p:txBody>
+      </p:sp>
+    </p:spTree>
+    <p:extLst>
+      <p:ext uri="{BB962C8B-B14F-4D97-AF65-F5344CB8AC3E}">
+        <p14:creationId xmlns:p14="http://schemas.microsoft.com/office/powerpoint/2010/main" val="2288224570"/>
+      </p:ext>
+    </p:extLst>
+  </p:cSld>
+  <p:clrMapOvr>
+    <a:masterClrMapping/>
+  </p:clrMapOvr>
+</p:sld>
+</file>
+
+<file path=ppt/slides/slide23.xml><?xml version="1.0" encoding="utf-8"?>
+<p:sld xmlns:a="http://schemas.openxmlformats.org/drawingml/2006/main" xmlns:r="http://schemas.openxmlformats.org/officeDocument/2006/relationships" xmlns:p="http://schemas.openxmlformats.org/presentationml/2006/main">
+  <p:cSld>
+    <p:spTree>
+      <p:nvGrpSpPr>
+        <p:cNvPr id="1" name=""/>
+        <p:cNvGrpSpPr/>
+        <p:nvPr/>
+      </p:nvGrpSpPr>
+      <p:grpSpPr>
+        <a:xfrm>
+          <a:off x="0" y="0"/>
+          <a:ext cx="0" cy="0"/>
+          <a:chOff x="0" y="0"/>
+          <a:chExt cx="0" cy="0"/>
+        </a:xfrm>
+      </p:grpSpPr>
+      <mc:AlternateContent xmlns:mc="http://schemas.openxmlformats.org/markup-compatibility/2006" xmlns:a14="http://schemas.microsoft.com/office/drawing/2010/main">
+        <mc:Choice Requires="a14">
+          <p:sp>
+            <p:nvSpPr>
+              <p:cNvPr id="2" name="Текст 1">
+                <a:extLst>
+                  <a:ext uri="{FF2B5EF4-FFF2-40B4-BE49-F238E27FC236}">
+                    <a16:creationId xmlns:a16="http://schemas.microsoft.com/office/drawing/2014/main" id="{6BC93DBE-1928-4145-8158-A8DA052EFA6C}"/>
+                  </a:ext>
+                </a:extLst>
+              </p:cNvPr>
+              <p:cNvSpPr>
+                <a:spLocks noGrp="1"/>
+              </p:cNvSpPr>
+              <p:nvPr>
+                <p:ph type="body" idx="1"/>
+              </p:nvPr>
+            </p:nvSpPr>
+            <p:spPr/>
+            <p:txBody>
+              <a:bodyPr/>
+              <a:lstStyle/>
+              <a:p>
+                <a:pPr marL="88900" indent="0" algn="just">
+                  <a:buNone/>
+                </a:pPr>
+                <a:r>
+                  <a:rPr lang="ru-RU" sz="1400" dirty="0"/>
+                  <a:t>Посмотрим какой выигрыш мы в итоге получим:</a:t>
+                </a:r>
+              </a:p>
+              <a:p>
+                <a:pPr marL="88900" indent="0" algn="ctr">
+                  <a:buNone/>
+                </a:pPr>
+                <a14:m>
+                  <m:oMathPara xmlns:m="http://schemas.openxmlformats.org/officeDocument/2006/math">
+                    <m:oMathParaPr>
+                      <m:jc m:val="centerGroup"/>
+                    </m:oMathParaPr>
+                    <m:oMath xmlns:m="http://schemas.openxmlformats.org/officeDocument/2006/math">
+                      <m:f>
+                        <m:fPr>
+                          <m:ctrlPr>
+                            <a:rPr lang="ru-RU" sz="1400" b="0" i="1" smtClean="0">
+                              <a:latin typeface="Cambria Math" panose="02040503050406030204" pitchFamily="18" charset="0"/>
+                            </a:rPr>
+                          </m:ctrlPr>
+                        </m:fPr>
+                        <m:num>
+                          <m:r>
+                            <a:rPr lang="ru-RU" sz="1400" i="1">
+                              <a:latin typeface="Cambria Math" panose="02040503050406030204" pitchFamily="18" charset="0"/>
+                            </a:rPr>
+                            <m:t>4×</m:t>
+                          </m:r>
+                          <m:r>
+                            <a:rPr lang="en-US" sz="1400" i="1">
+                              <a:latin typeface="Cambria Math" panose="02040503050406030204" pitchFamily="18" charset="0"/>
+                            </a:rPr>
+                            <m:t>𝑋</m:t>
+                          </m:r>
+                          <m:r>
+                            <a:rPr lang="en-US" sz="1400" i="1">
+                              <a:latin typeface="Cambria Math" panose="02040503050406030204" pitchFamily="18" charset="0"/>
+                            </a:rPr>
+                            <m:t> −(</m:t>
+                          </m:r>
+                          <m:r>
+                            <a:rPr lang="en-US" sz="1400" i="1">
+                              <a:latin typeface="Cambria Math" panose="02040503050406030204" pitchFamily="18" charset="0"/>
+                            </a:rPr>
+                            <m:t>𝑋</m:t>
+                          </m:r>
+                          <m:r>
+                            <a:rPr lang="en-US" sz="1400" i="1">
+                              <a:latin typeface="Cambria Math" panose="02040503050406030204" pitchFamily="18" charset="0"/>
+                            </a:rPr>
+                            <m:t>×4×</m:t>
+                          </m:r>
+                          <m:d>
+                            <m:dPr>
+                              <m:ctrlPr>
+                                <a:rPr lang="en-US" sz="1400" i="1">
+                                  <a:latin typeface="Cambria Math" panose="02040503050406030204" pitchFamily="18" charset="0"/>
+                                </a:rPr>
+                              </m:ctrlPr>
+                            </m:dPr>
+                            <m:e>
+                              <m:r>
+                                <a:rPr lang="en-US" sz="1400" i="1">
+                                  <a:latin typeface="Cambria Math" panose="02040503050406030204" pitchFamily="18" charset="0"/>
+                                </a:rPr>
+                                <m:t>1 −</m:t>
+                              </m:r>
+                              <m:f>
+                                <m:fPr>
+                                  <m:ctrlPr>
+                                    <a:rPr lang="en-US" sz="1400" i="1">
+                                      <a:latin typeface="Cambria Math" panose="02040503050406030204" pitchFamily="18" charset="0"/>
+                                    </a:rPr>
+                                  </m:ctrlPr>
+                                </m:fPr>
+                                <m:num>
+                                  <m:r>
+                                    <a:rPr lang="en-US" sz="1400" i="1">
+                                      <a:latin typeface="Cambria Math" panose="02040503050406030204" pitchFamily="18" charset="0"/>
+                                    </a:rPr>
+                                    <m:t>3</m:t>
+                                  </m:r>
+                                </m:num>
+                                <m:den>
+                                  <m:r>
+                                    <a:rPr lang="en-US" sz="1400" i="1">
+                                      <a:latin typeface="Cambria Math" panose="02040503050406030204" pitchFamily="18" charset="0"/>
+                                    </a:rPr>
+                                    <m:t>4</m:t>
+                                  </m:r>
+                                </m:den>
+                              </m:f>
+                            </m:e>
+                          </m:d>
+                          <m:r>
+                            <a:rPr lang="en-US" sz="1400" i="1">
+                              <a:latin typeface="Cambria Math" panose="02040503050406030204" pitchFamily="18" charset="0"/>
+                            </a:rPr>
+                            <m:t>))×(1 −</m:t>
+                          </m:r>
+                          <m:sSup>
+                            <m:sSupPr>
+                              <m:ctrlPr>
+                                <a:rPr lang="en-US" sz="1400" i="1">
+                                  <a:latin typeface="Cambria Math" panose="02040503050406030204" pitchFamily="18" charset="0"/>
+                                </a:rPr>
+                              </m:ctrlPr>
+                            </m:sSupPr>
+                            <m:e>
+                              <m:r>
+                                <a:rPr lang="en-US" sz="1400" i="1">
+                                  <a:latin typeface="Cambria Math" panose="02040503050406030204" pitchFamily="18" charset="0"/>
+                                </a:rPr>
+                                <m:t>10</m:t>
+                              </m:r>
+                            </m:e>
+                            <m:sup>
+                              <m:r>
+                                <a:rPr lang="en-US" sz="1400" i="1">
+                                  <a:latin typeface="Cambria Math" panose="02040503050406030204" pitchFamily="18" charset="0"/>
+                                </a:rPr>
+                                <m:t>−1</m:t>
+                              </m:r>
+                            </m:sup>
+                          </m:sSup>
+                          <m:r>
+                            <a:rPr lang="en-US" sz="1400" i="1">
+                              <a:latin typeface="Cambria Math" panose="02040503050406030204" pitchFamily="18" charset="0"/>
+                            </a:rPr>
+                            <m:t>)</m:t>
+                          </m:r>
+                          <m:r>
+                            <m:rPr>
+                              <m:nor/>
+                            </m:rPr>
+                            <a:rPr lang="en-US" sz="1400" i="1" dirty="0">
+                              <a:latin typeface="Cambria Math" panose="02040503050406030204" pitchFamily="18" charset="0"/>
+                            </a:rPr>
+                            <m:t> </m:t>
+                          </m:r>
+                        </m:num>
+                        <m:den>
+                          <m:r>
+                            <a:rPr lang="en-US" sz="1400" b="0" i="1" smtClean="0">
+                              <a:latin typeface="Cambria Math" panose="02040503050406030204" pitchFamily="18" charset="0"/>
+                            </a:rPr>
+                            <m:t>2×</m:t>
+                          </m:r>
+                          <m:r>
+                            <a:rPr lang="en-US" sz="1400" b="0" i="1" smtClean="0">
+                              <a:latin typeface="Cambria Math" panose="02040503050406030204" pitchFamily="18" charset="0"/>
+                            </a:rPr>
+                            <m:t>𝑋</m:t>
+                          </m:r>
+                        </m:den>
+                      </m:f>
+                      <m:r>
+                        <a:rPr lang="en-US" sz="1400" b="0" i="1" smtClean="0">
+                          <a:latin typeface="Cambria Math" panose="02040503050406030204" pitchFamily="18" charset="0"/>
+                        </a:rPr>
+                        <m:t>=</m:t>
+                      </m:r>
+                      <m:f>
+                        <m:fPr>
+                          <m:ctrlPr>
+                            <a:rPr lang="en-US" sz="1400" b="0" i="1" smtClean="0">
+                              <a:latin typeface="Cambria Math" panose="02040503050406030204" pitchFamily="18" charset="0"/>
+                            </a:rPr>
+                          </m:ctrlPr>
+                        </m:fPr>
+                        <m:num>
+                          <m:r>
+                            <a:rPr lang="en-US" sz="1400" b="0" i="1" smtClean="0">
+                              <a:latin typeface="Cambria Math" panose="02040503050406030204" pitchFamily="18" charset="0"/>
+                            </a:rPr>
+                            <m:t>3×</m:t>
+                          </m:r>
+                          <m:r>
+                            <a:rPr lang="en-US" sz="1400" b="0" i="1" smtClean="0">
+                              <a:latin typeface="Cambria Math" panose="02040503050406030204" pitchFamily="18" charset="0"/>
+                            </a:rPr>
+                            <m:t>𝑋</m:t>
+                          </m:r>
+                          <m:r>
+                            <a:rPr lang="en-US" sz="1400" b="0" i="1" smtClean="0">
+                              <a:latin typeface="Cambria Math" panose="02040503050406030204" pitchFamily="18" charset="0"/>
+                            </a:rPr>
+                            <m:t>×0.9</m:t>
+                          </m:r>
+                        </m:num>
+                        <m:den>
+                          <m:r>
+                            <a:rPr lang="en-US" sz="1400" b="0" i="1" smtClean="0">
+                              <a:latin typeface="Cambria Math" panose="02040503050406030204" pitchFamily="18" charset="0"/>
+                            </a:rPr>
+                            <m:t>2×</m:t>
+                          </m:r>
+                          <m:r>
+                            <a:rPr lang="en-US" sz="1400" b="0" i="1" smtClean="0">
+                              <a:latin typeface="Cambria Math" panose="02040503050406030204" pitchFamily="18" charset="0"/>
+                            </a:rPr>
+                            <m:t>𝑋</m:t>
+                          </m:r>
+                        </m:den>
+                      </m:f>
+                      <m:r>
+                        <a:rPr lang="en-US" sz="1400" b="0" i="1" smtClean="0">
+                          <a:latin typeface="Cambria Math" panose="02040503050406030204" pitchFamily="18" charset="0"/>
+                        </a:rPr>
+                        <m:t>=1.35</m:t>
+                      </m:r>
+                    </m:oMath>
+                  </m:oMathPara>
+                </a14:m>
+                <a:endParaRPr lang="en-US" sz="1400" b="0" dirty="0"/>
+              </a:p>
+              <a:p>
+                <a:pPr marL="88900" indent="0" algn="ctr">
+                  <a:buNone/>
+                </a:pPr>
+                <a:endParaRPr lang="en-US" sz="1400" dirty="0"/>
+              </a:p>
+              <a:p>
+                <a:pPr marL="88900" indent="0" algn="ctr">
+                  <a:buNone/>
+                </a:pPr>
+                <a:r>
+                  <a:rPr lang="en-US" sz="1400" dirty="0"/>
+                  <a:t> </a:t>
+                </a:r>
+                <a:endParaRPr lang="ru-RU" sz="1400" dirty="0"/>
+              </a:p>
+            </p:txBody>
+          </p:sp>
+        </mc:Choice>
+        <mc:Fallback xmlns="">
+          <p:sp>
+            <p:nvSpPr>
+              <p:cNvPr id="2" name="Текст 1">
+                <a:extLst>
+                  <a:ext uri="{FF2B5EF4-FFF2-40B4-BE49-F238E27FC236}">
+                    <a16:creationId xmlns:a16="http://schemas.microsoft.com/office/drawing/2014/main" id="{6BC93DBE-1928-4145-8158-A8DA052EFA6C}"/>
+                  </a:ext>
+                </a:extLst>
+              </p:cNvPr>
+              <p:cNvSpPr>
+                <a:spLocks noGrp="1" noRot="1" noChangeAspect="1" noMove="1" noResize="1" noEditPoints="1" noAdjustHandles="1" noChangeArrowheads="1" noChangeShapeType="1" noTextEdit="1"/>
+              </p:cNvSpPr>
+              <p:nvPr>
+                <p:ph type="body" idx="1"/>
+              </p:nvPr>
+            </p:nvSpPr>
+            <p:spPr>
+              <a:blipFill>
+                <a:blip r:embed="rId2"/>
+                <a:stretch>
+                  <a:fillRect/>
+                </a:stretch>
+              </a:blipFill>
+            </p:spPr>
+            <p:txBody>
+              <a:bodyPr/>
+              <a:lstStyle/>
+              <a:p>
+                <a:r>
+                  <a:rPr lang="ru-RU">
+                    <a:noFill/>
+                  </a:rPr>
+                  <a:t> </a:t>
+                </a:r>
+              </a:p>
+            </p:txBody>
+          </p:sp>
+        </mc:Fallback>
+      </mc:AlternateContent>
+      <p:sp>
+        <p:nvSpPr>
+          <p:cNvPr id="3" name="Заголовок 2">
+            <a:extLst>
+              <a:ext uri="{FF2B5EF4-FFF2-40B4-BE49-F238E27FC236}">
+                <a16:creationId xmlns:a16="http://schemas.microsoft.com/office/drawing/2014/main" id="{427A2499-EA40-4B55-B911-23D7C0FF6732}"/>
+              </a:ext>
+            </a:extLst>
+          </p:cNvPr>
+          <p:cNvSpPr>
+            <a:spLocks noGrp="1"/>
+          </p:cNvSpPr>
+          <p:nvPr>
+            <p:ph type="title"/>
+          </p:nvPr>
+        </p:nvSpPr>
+        <p:spPr/>
+        <p:txBody>
+          <a:bodyPr/>
+          <a:lstStyle/>
+          <a:p>
+            <a:r>
+              <a:rPr lang="ru-RU" dirty="0"/>
+              <a:t>Сравнение</a:t>
+            </a:r>
+          </a:p>
+        </p:txBody>
+      </p:sp>
+    </p:spTree>
+    <p:extLst>
+      <p:ext uri="{BB962C8B-B14F-4D97-AF65-F5344CB8AC3E}">
+        <p14:creationId xmlns:p14="http://schemas.microsoft.com/office/powerpoint/2010/main" val="2812119428"/>
+      </p:ext>
+    </p:extLst>
+  </p:cSld>
+  <p:clrMapOvr>
+    <a:masterClrMapping/>
+  </p:clrMapOvr>
+</p:sld>
+</file>
+
+<file path=ppt/slides/slide24.xml><?xml version="1.0" encoding="utf-8"?>
+<p:sld xmlns:a="http://schemas.openxmlformats.org/drawingml/2006/main" xmlns:r="http://schemas.openxmlformats.org/officeDocument/2006/relationships" xmlns:p="http://schemas.openxmlformats.org/presentationml/2006/main">
+  <p:cSld>
+    <p:spTree>
+      <p:nvGrpSpPr>
+        <p:cNvPr id="1" name=""/>
+        <p:cNvGrpSpPr/>
+        <p:nvPr/>
+      </p:nvGrpSpPr>
+      <p:grpSpPr>
+        <a:xfrm>
+          <a:off x="0" y="0"/>
+          <a:ext cx="0" cy="0"/>
+          <a:chOff x="0" y="0"/>
+          <a:chExt cx="0" cy="0"/>
+        </a:xfrm>
+      </p:grpSpPr>
+      <p:sp>
+        <p:nvSpPr>
+          <p:cNvPr id="2" name="Текст 1">
+            <a:extLst>
+              <a:ext uri="{FF2B5EF4-FFF2-40B4-BE49-F238E27FC236}">
+                <a16:creationId xmlns:a16="http://schemas.microsoft.com/office/drawing/2014/main" id="{DC322151-B4E5-4E30-A68D-02A696E2D759}"/>
+              </a:ext>
+            </a:extLst>
+          </p:cNvPr>
+          <p:cNvSpPr>
+            <a:spLocks noGrp="1"/>
+          </p:cNvSpPr>
+          <p:nvPr>
+            <p:ph type="body" idx="1"/>
+          </p:nvPr>
+        </p:nvSpPr>
+        <p:spPr/>
+        <p:txBody>
+          <a:bodyPr/>
+          <a:lstStyle/>
+          <a:p>
+            <a:pPr marL="88900" indent="0" algn="just">
+              <a:buNone/>
+            </a:pPr>
+            <a:r>
+              <a:rPr lang="ru-RU" sz="1400" dirty="0"/>
+              <a:t>Наш метод является эффективным вплоть до вероятности потери пакета равной 0.3. Такая вероятность потери пакета превосходит значения типичные для практических сценариев связи</a:t>
+            </a:r>
+          </a:p>
+        </p:txBody>
+      </p:sp>
+      <p:sp>
+        <p:nvSpPr>
+          <p:cNvPr id="3" name="Заголовок 2">
+            <a:extLst>
+              <a:ext uri="{FF2B5EF4-FFF2-40B4-BE49-F238E27FC236}">
+                <a16:creationId xmlns:a16="http://schemas.microsoft.com/office/drawing/2014/main" id="{4BDB1223-F63C-40AC-B2AB-A887759EFF67}"/>
+              </a:ext>
+            </a:extLst>
+          </p:cNvPr>
+          <p:cNvSpPr>
+            <a:spLocks noGrp="1"/>
+          </p:cNvSpPr>
+          <p:nvPr>
+            <p:ph type="title"/>
+          </p:nvPr>
+        </p:nvSpPr>
+        <p:spPr/>
+        <p:txBody>
+          <a:bodyPr/>
+          <a:lstStyle/>
+          <a:p>
+            <a:r>
+              <a:rPr lang="ru-RU" dirty="0"/>
+              <a:t>Сравнение</a:t>
+            </a:r>
+          </a:p>
+        </p:txBody>
+      </p:sp>
+    </p:spTree>
+    <p:extLst>
+      <p:ext uri="{BB962C8B-B14F-4D97-AF65-F5344CB8AC3E}">
+        <p14:creationId xmlns:p14="http://schemas.microsoft.com/office/powerpoint/2010/main" val="2959518998"/>
+      </p:ext>
+    </p:extLst>
+  </p:cSld>
+  <p:clrMapOvr>
+    <a:masterClrMapping/>
+  </p:clrMapOvr>
+</p:sld>
+</file>
+
+<file path=ppt/slides/slide25.xml><?xml version="1.0" encoding="utf-8"?>
+<p:sld xmlns:a="http://schemas.openxmlformats.org/drawingml/2006/main" xmlns:r="http://schemas.openxmlformats.org/officeDocument/2006/relationships" xmlns:p="http://schemas.openxmlformats.org/presentationml/2006/main">
+  <p:cSld>
+    <p:spTree>
+      <p:nvGrpSpPr>
+        <p:cNvPr id="1" name=""/>
+        <p:cNvGrpSpPr/>
+        <p:nvPr/>
+      </p:nvGrpSpPr>
+      <p:grpSpPr>
+        <a:xfrm>
+          <a:off x="0" y="0"/>
+          <a:ext cx="0" cy="0"/>
+          <a:chOff x="0" y="0"/>
+          <a:chExt cx="0" cy="0"/>
+        </a:xfrm>
+      </p:grpSpPr>
+      <p:sp>
+        <p:nvSpPr>
+          <p:cNvPr id="3" name="Заголовок 2">
+            <a:extLst>
+              <a:ext uri="{FF2B5EF4-FFF2-40B4-BE49-F238E27FC236}">
+                <a16:creationId xmlns:a16="http://schemas.microsoft.com/office/drawing/2014/main" id="{C194D3E0-A377-4839-A55A-81F5FF83EF8E}"/>
+              </a:ext>
+            </a:extLst>
+          </p:cNvPr>
+          <p:cNvSpPr>
+            <a:spLocks noGrp="1"/>
+          </p:cNvSpPr>
+          <p:nvPr>
+            <p:ph type="title"/>
+          </p:nvPr>
+        </p:nvSpPr>
+        <p:spPr/>
+        <p:txBody>
+          <a:bodyPr/>
+          <a:lstStyle/>
+          <a:p>
+            <a:r>
+              <a:rPr lang="ru-RU" dirty="0"/>
+              <a:t>Результаты</a:t>
+            </a:r>
+          </a:p>
+        </p:txBody>
+      </p:sp>
+      <p:sp>
+        <p:nvSpPr>
+          <p:cNvPr id="9" name="Текст 1">
+            <a:extLst>
+              <a:ext uri="{FF2B5EF4-FFF2-40B4-BE49-F238E27FC236}">
+                <a16:creationId xmlns:a16="http://schemas.microsoft.com/office/drawing/2014/main" id="{EAC0BB8B-1661-4D10-801E-8E2318A223EA}"/>
+              </a:ext>
+            </a:extLst>
+          </p:cNvPr>
+          <p:cNvSpPr>
+            <a:spLocks noGrp="1"/>
+          </p:cNvSpPr>
+          <p:nvPr>
+            <p:ph type="body" idx="1"/>
+          </p:nvPr>
+        </p:nvSpPr>
+        <p:spPr>
+          <a:xfrm>
+            <a:off x="313058" y="1394786"/>
+            <a:ext cx="8520416" cy="3195216"/>
+          </a:xfrm>
+        </p:spPr>
+        <p:txBody>
+          <a:bodyPr/>
+          <a:lstStyle/>
+          <a:p>
+            <a:pPr algn="just"/>
+            <a:r>
+              <a:rPr lang="ru-RU" sz="1400" dirty="0"/>
+              <a:t>Был разработан протокол взаимодействия в сети с возможностью исправления стираний</a:t>
+            </a:r>
+            <a:r>
+              <a:rPr lang="en-US" sz="1400" dirty="0"/>
+              <a:t>.</a:t>
+            </a:r>
+            <a:endParaRPr lang="ru-RU" sz="1400" dirty="0"/>
+          </a:p>
+          <a:p>
+            <a:pPr algn="just"/>
+            <a:r>
+              <a:rPr lang="ru-RU" sz="1400" dirty="0"/>
+              <a:t>Даны оценки на вероятность потери пакетов в зависимости</a:t>
+            </a:r>
+            <a:r>
+              <a:rPr lang="en-US" sz="1400" dirty="0"/>
+              <a:t> </a:t>
+            </a:r>
+            <a:r>
+              <a:rPr lang="ru-RU" sz="1400" dirty="0"/>
+              <a:t>от числа пользователей</a:t>
+            </a:r>
+            <a:r>
+              <a:rPr lang="en-US" sz="1400" dirty="0"/>
+              <a:t>.</a:t>
+            </a:r>
+            <a:endParaRPr lang="ru-RU" sz="1400" dirty="0"/>
+          </a:p>
+          <a:p>
+            <a:pPr algn="just"/>
+            <a:r>
+              <a:rPr lang="ru-RU" sz="1400" dirty="0"/>
+              <a:t>Проведено моделирование и сравнение</a:t>
+            </a:r>
+            <a:r>
+              <a:rPr lang="en-US" sz="1400" dirty="0"/>
+              <a:t>.</a:t>
+            </a:r>
+            <a:endParaRPr lang="ru-RU" sz="1400" dirty="0"/>
+          </a:p>
+          <a:p>
+            <a:pPr marL="88900" indent="0">
+              <a:buNone/>
+            </a:pPr>
+            <a:endParaRPr lang="ru-RU" sz="1400" dirty="0"/>
+          </a:p>
+          <a:p>
+            <a:endParaRPr lang="ru-RU" sz="1400" dirty="0"/>
+          </a:p>
+          <a:p>
+            <a:pPr marL="88900" indent="0">
+              <a:buNone/>
+            </a:pPr>
+            <a:endParaRPr lang="ru-RU" dirty="0"/>
+          </a:p>
+        </p:txBody>
+      </p:sp>
+    </p:spTree>
+    <p:extLst>
+      <p:ext uri="{BB962C8B-B14F-4D97-AF65-F5344CB8AC3E}">
+        <p14:creationId xmlns:p14="http://schemas.microsoft.com/office/powerpoint/2010/main" val="56749900"/>
+      </p:ext>
+    </p:extLst>
+  </p:cSld>
+  <p:clrMapOvr>
+    <a:masterClrMapping/>
+  </p:clrMapOvr>
+</p:sld>
+</file>
+
+<file path=ppt/slides/slide26.xml><?xml version="1.0" encoding="utf-8"?>
+<p:sld xmlns:a="http://schemas.openxmlformats.org/drawingml/2006/main" xmlns:r="http://schemas.openxmlformats.org/officeDocument/2006/relationships" xmlns:p="http://schemas.openxmlformats.org/presentationml/2006/main">
+  <p:cSld>
+    <p:spTree>
+      <p:nvGrpSpPr>
+        <p:cNvPr id="1" name=""/>
+        <p:cNvGrpSpPr/>
+        <p:nvPr/>
+      </p:nvGrpSpPr>
+      <p:grpSpPr>
+        <a:xfrm>
+          <a:off x="0" y="0"/>
+          <a:ext cx="0" cy="0"/>
+          <a:chOff x="0" y="0"/>
+          <a:chExt cx="0" cy="0"/>
+        </a:xfrm>
+      </p:grpSpPr>
+      <p:sp>
+        <p:nvSpPr>
+          <p:cNvPr id="2" name="Текст 1">
+            <a:extLst>
+              <a:ext uri="{FF2B5EF4-FFF2-40B4-BE49-F238E27FC236}">
+                <a16:creationId xmlns:a16="http://schemas.microsoft.com/office/drawing/2014/main" id="{055A7D68-7262-41E9-9FEB-90CC7421CF72}"/>
+              </a:ext>
+            </a:extLst>
+          </p:cNvPr>
+          <p:cNvSpPr>
+            <a:spLocks noGrp="1"/>
+          </p:cNvSpPr>
+          <p:nvPr>
+            <p:ph type="body" idx="1"/>
+          </p:nvPr>
+        </p:nvSpPr>
+        <p:spPr/>
+        <p:txBody>
+          <a:bodyPr/>
+          <a:lstStyle/>
+          <a:p>
+            <a:pPr marL="88900" indent="0" algn="just">
+              <a:buNone/>
+            </a:pPr>
+            <a:r>
+              <a:rPr lang="en-US" sz="1400" dirty="0"/>
+              <a:t>1. </a:t>
+            </a:r>
+            <a:r>
+              <a:rPr lang="ru-RU" sz="1400" dirty="0"/>
+              <a:t>Рассмотрение для исправлений других классов кодов, например коды Рида-Соломона.</a:t>
+            </a:r>
+            <a:endParaRPr lang="en-US" sz="1400" dirty="0"/>
+          </a:p>
+          <a:p>
+            <a:pPr marL="88900" indent="0" algn="just">
+              <a:buNone/>
+            </a:pPr>
+            <a:r>
+              <a:rPr lang="en-US" sz="1400" dirty="0"/>
+              <a:t>2. </a:t>
+            </a:r>
+            <a:r>
+              <a:rPr lang="ru-RU" sz="1400" dirty="0"/>
+              <a:t>Учет потери пакетов на физическом уровне и их дальнейшее исправление</a:t>
+            </a:r>
+            <a:r>
+              <a:rPr lang="en-US" sz="1400" dirty="0"/>
+              <a:t>.</a:t>
+            </a:r>
+          </a:p>
+          <a:p>
+            <a:pPr marL="88900" indent="0" algn="just">
+              <a:buNone/>
+            </a:pPr>
+            <a:r>
+              <a:rPr lang="en-US" sz="1400" dirty="0"/>
+              <a:t>3. </a:t>
+            </a:r>
+            <a:r>
+              <a:rPr lang="ru-RU" sz="1400" dirty="0"/>
+              <a:t>Более детальное сравнение и возможное испытание в реальной среде.</a:t>
+            </a:r>
+            <a:endParaRPr lang="en-US" sz="1400" dirty="0"/>
+          </a:p>
+        </p:txBody>
+      </p:sp>
+      <p:sp>
+        <p:nvSpPr>
+          <p:cNvPr id="3" name="Заголовок 2">
+            <a:extLst>
+              <a:ext uri="{FF2B5EF4-FFF2-40B4-BE49-F238E27FC236}">
+                <a16:creationId xmlns:a16="http://schemas.microsoft.com/office/drawing/2014/main" id="{BABD8ED7-B17A-48E9-A226-BFB57DA2B9E0}"/>
+              </a:ext>
+            </a:extLst>
+          </p:cNvPr>
+          <p:cNvSpPr>
+            <a:spLocks noGrp="1"/>
+          </p:cNvSpPr>
+          <p:nvPr>
+            <p:ph type="title"/>
+          </p:nvPr>
+        </p:nvSpPr>
+        <p:spPr/>
+        <p:txBody>
+          <a:bodyPr/>
+          <a:lstStyle/>
+          <a:p>
+            <a:r>
+              <a:rPr lang="ru-RU" dirty="0"/>
+              <a:t>Направления дальнейшего исследования</a:t>
+            </a:r>
+          </a:p>
+        </p:txBody>
+      </p:sp>
+    </p:spTree>
+    <p:extLst>
+      <p:ext uri="{BB962C8B-B14F-4D97-AF65-F5344CB8AC3E}">
+        <p14:creationId xmlns:p14="http://schemas.microsoft.com/office/powerpoint/2010/main" val="1618740651"/>
+      </p:ext>
+    </p:extLst>
+  </p:cSld>
+  <p:clrMapOvr>
+    <a:masterClrMapping/>
+  </p:clrMapOvr>
+</p:sld>
+</file>
+
 <file path=ppt/slides/slide3.xml><?xml version="1.0" encoding="utf-8"?>
 <p:sld xmlns:a="http://schemas.openxmlformats.org/drawingml/2006/main" xmlns:r="http://schemas.openxmlformats.org/officeDocument/2006/relationships" xmlns:p="http://schemas.openxmlformats.org/presentationml/2006/main">
   <p:cSld>
@@ -7235,39 +9232,23 @@
             </a:pPr>
             <a:r>
               <a:rPr lang="ru-RU" sz="1400" dirty="0"/>
-              <a:t>В этой работе рассматривается  взаимодействие </a:t>
+              <a:t>Взаимодействие </a:t>
             </a:r>
             <a:r>
               <a:rPr lang="en-US" sz="1400" dirty="0"/>
-              <a:t>V2V. </a:t>
+              <a:t>V</a:t>
             </a:r>
             <a:r>
               <a:rPr lang="ru-RU" sz="1400" dirty="0"/>
-              <a:t>Такие сети очень чувствительны к задержке доставки пакетов, а также их потери. Мы не можем просто взять и использовать «просроченный» пакет, так как он способен спровоцировать на дороге аварийные ситуации. Также одной из проблем является появление коллизий в канале. Существующие основные алгоритмы пытаются их минимизировать, но восстановления пакетов не происходит. Цель моей работы заключается в применении </a:t>
+              <a:t>2</a:t>
             </a:r>
             <a:r>
-              <a:rPr lang="ru-RU" sz="1400" dirty="0" err="1"/>
-              <a:t>сверточных</a:t>
+              <a:rPr lang="en-US" sz="1400" dirty="0"/>
+              <a:t>V</a:t>
             </a:r>
             <a:r>
               <a:rPr lang="ru-RU" sz="1400" dirty="0"/>
-              <a:t> кодов, для восстановления стираний в канале связи, а также генерация протокольных последовательностей, минимизирующих число коллизий</a:t>
-            </a:r>
-            <a:r>
-              <a:rPr lang="en-US" sz="1400" dirty="0"/>
-              <a:t>, </a:t>
-            </a:r>
-            <a:r>
-              <a:rPr lang="ru-RU" sz="1400" dirty="0"/>
-              <a:t>на основе </a:t>
-            </a:r>
-            <a:r>
-              <a:rPr lang="ru-RU" sz="1400" dirty="0" err="1"/>
-              <a:t>графовых</a:t>
-            </a:r>
-            <a:r>
-              <a:rPr lang="ru-RU" sz="1400" dirty="0"/>
-              <a:t> кодов.</a:t>
+              <a:t> очень чувствительно к задержке доставки пакетов, а также их потере. Одной из главных проблем является появление коллизий в канале. Существующие алгоритмы пытаются минимизировать число коллизий и/или  используют обратную связь для их разрешения. Вопрос восстановления потерянных пакетов с использованием корректирующих кодов является предметом изучения данной работы.</a:t>
             </a:r>
           </a:p>
         </p:txBody>
@@ -7356,12 +9337,12 @@
           <a:bodyPr/>
           <a:lstStyle/>
           <a:p>
-            <a:pPr marL="88900" indent="0">
+            <a:pPr marL="88900" indent="0" algn="just">
               <a:buNone/>
             </a:pPr>
             <a:r>
               <a:rPr lang="ru-RU" sz="1400" dirty="0"/>
-              <a:t>В данный момент существующие стандарты не предоставляют подходящих решений для V2V взаимодействия в сетях VANET. От протоколов требуется маленькая задержка при передаче, а также высокая надежность. Проводятся разные исследования в этой области и одно из направления это применение кодов для реализации протокола.</a:t>
+              <a:t>В данный момент существующие стандарты не предоставляют подходящих решений для V2V взаимодействия в сетях VANET. От протоколов требуется маленькая задержка при передаче, а также высокая надежность. Проводятся разные исследования в этой области и одно из направлений исследования - это применение кодов для реализации протокола.</a:t>
             </a:r>
           </a:p>
         </p:txBody>
@@ -7380,6 +9361,103 @@
 </file>
 
 <file path=ppt/slides/slide5.xml><?xml version="1.0" encoding="utf-8"?>
+<p:sld xmlns:a="http://schemas.openxmlformats.org/drawingml/2006/main" xmlns:r="http://schemas.openxmlformats.org/officeDocument/2006/relationships" xmlns:p="http://schemas.openxmlformats.org/presentationml/2006/main">
+  <p:cSld>
+    <p:spTree>
+      <p:nvGrpSpPr>
+        <p:cNvPr id="1" name=""/>
+        <p:cNvGrpSpPr/>
+        <p:nvPr/>
+      </p:nvGrpSpPr>
+      <p:grpSpPr>
+        <a:xfrm>
+          <a:off x="0" y="0"/>
+          <a:ext cx="0" cy="0"/>
+          <a:chOff x="0" y="0"/>
+          <a:chExt cx="0" cy="0"/>
+        </a:xfrm>
+      </p:grpSpPr>
+      <p:sp>
+        <p:nvSpPr>
+          <p:cNvPr id="2" name="Текст 1">
+            <a:extLst>
+              <a:ext uri="{FF2B5EF4-FFF2-40B4-BE49-F238E27FC236}">
+                <a16:creationId xmlns:a16="http://schemas.microsoft.com/office/drawing/2014/main" id="{C9B691DE-4FDC-4E7E-AA8D-B059AF30C7BF}"/>
+              </a:ext>
+            </a:extLst>
+          </p:cNvPr>
+          <p:cNvSpPr>
+            <a:spLocks noGrp="1"/>
+          </p:cNvSpPr>
+          <p:nvPr>
+            <p:ph type="body" idx="1"/>
+          </p:nvPr>
+        </p:nvSpPr>
+        <p:spPr/>
+        <p:txBody>
+          <a:bodyPr/>
+          <a:lstStyle/>
+          <a:p>
+            <a:pPr marL="88900" indent="0" algn="just">
+              <a:buNone/>
+            </a:pPr>
+            <a:r>
+              <a:rPr lang="ru-RU" sz="1400" dirty="0"/>
+              <a:t>Разработка протокола множественного доступа для сетей V2V, использующего протокольные последовательности, построенные на основе </a:t>
+            </a:r>
+            <a:r>
+              <a:rPr lang="ru-RU" sz="1400" dirty="0" err="1"/>
+              <a:t>графовых</a:t>
+            </a:r>
+            <a:r>
+              <a:rPr lang="ru-RU" sz="1400" dirty="0"/>
+              <a:t> кодов. Разрешение коллизий с применением корректирующих кодов для исправления стираний. Оценка вероятности потери пакета, при использовании протокола.</a:t>
+            </a:r>
+          </a:p>
+        </p:txBody>
+      </p:sp>
+      <p:sp>
+        <p:nvSpPr>
+          <p:cNvPr id="3" name="Заголовок 2">
+            <a:extLst>
+              <a:ext uri="{FF2B5EF4-FFF2-40B4-BE49-F238E27FC236}">
+                <a16:creationId xmlns:a16="http://schemas.microsoft.com/office/drawing/2014/main" id="{DD7C8243-4825-45F4-84E9-DA551449A6C2}"/>
+              </a:ext>
+            </a:extLst>
+          </p:cNvPr>
+          <p:cNvSpPr>
+            <a:spLocks noGrp="1"/>
+          </p:cNvSpPr>
+          <p:nvPr>
+            <p:ph type="title"/>
+          </p:nvPr>
+        </p:nvSpPr>
+        <p:spPr/>
+        <p:txBody>
+          <a:bodyPr/>
+          <a:lstStyle/>
+          <a:p>
+            <a:r>
+              <a:rPr lang="ru-RU" dirty="0"/>
+              <a:t>Цель</a:t>
+            </a:r>
+          </a:p>
+        </p:txBody>
+      </p:sp>
+    </p:spTree>
+    <p:extLst>
+      <p:ext uri="{BB962C8B-B14F-4D97-AF65-F5344CB8AC3E}">
+        <p14:creationId xmlns:p14="http://schemas.microsoft.com/office/powerpoint/2010/main" val="4289028232"/>
+      </p:ext>
+    </p:extLst>
+  </p:cSld>
+  <p:clrMapOvr>
+    <a:masterClrMapping/>
+  </p:clrMapOvr>
+</p:sld>
+</file>
+
+<file path=ppt/slides/slide6.xml><?xml version="1.0" encoding="utf-8"?>
 <p:sld xmlns:a="http://schemas.openxmlformats.org/drawingml/2006/main" xmlns:r="http://schemas.openxmlformats.org/officeDocument/2006/relationships" xmlns:p="http://schemas.openxmlformats.org/presentationml/2006/main">
   <p:cSld>
     <p:spTree>
@@ -7450,7 +9528,7 @@
           <a:bodyPr/>
           <a:lstStyle/>
           <a:p>
-            <a:pPr marL="546100" indent="-457200">
+            <a:pPr marL="546100" indent="-457200" algn="just">
               <a:buSzPct val="100000"/>
               <a:buAutoNum type="arabicPeriod"/>
             </a:pPr>
@@ -7468,7 +9546,7 @@
             </a:r>
           </a:p>
           <a:p>
-            <a:pPr marL="546100" indent="-457200">
+            <a:pPr marL="546100" indent="-457200" algn="just">
               <a:buSzPct val="100000"/>
               <a:buAutoNum type="arabicPeriod"/>
             </a:pPr>
@@ -7478,7 +9556,7 @@
             </a:r>
           </a:p>
           <a:p>
-            <a:pPr marL="546100" indent="-457200">
+            <a:pPr marL="546100" indent="-457200" algn="just">
               <a:buSzPct val="100000"/>
               <a:buAutoNum type="arabicPeriod"/>
             </a:pPr>
@@ -7488,7 +9566,7 @@
             </a:r>
           </a:p>
           <a:p>
-            <a:pPr marL="546100" indent="-457200">
+            <a:pPr marL="546100" indent="-457200" algn="just">
               <a:buSzPct val="100000"/>
               <a:buFont typeface="Open Sans"/>
               <a:buAutoNum type="arabicPeriod"/>
@@ -7499,21 +9577,21 @@
             </a:r>
           </a:p>
           <a:p>
-            <a:pPr marL="546100" indent="-457200">
+            <a:pPr marL="546100" indent="-457200" algn="just">
               <a:buSzPct val="100000"/>
               <a:buAutoNum type="arabicPeriod"/>
             </a:pPr>
             <a:endParaRPr lang="ru-RU" sz="1400" dirty="0"/>
           </a:p>
           <a:p>
-            <a:pPr marL="546100" indent="-457200">
+            <a:pPr marL="546100" indent="-457200" algn="just">
               <a:buSzPct val="100000"/>
               <a:buAutoNum type="arabicPeriod"/>
             </a:pPr>
             <a:endParaRPr lang="ru-RU" sz="1400" dirty="0"/>
           </a:p>
           <a:p>
-            <a:pPr marL="88900" indent="0">
+            <a:pPr marL="88900" indent="0" algn="just">
               <a:buNone/>
             </a:pPr>
             <a:endParaRPr lang="ru-RU" sz="1400" dirty="0"/>
@@ -7533,7 +9611,7 @@
 </p:sld>
 </file>
 
-<file path=ppt/slides/slide6.xml><?xml version="1.0" encoding="utf-8"?>
+<file path=ppt/slides/slide7.xml><?xml version="1.0" encoding="utf-8"?>
 <p:sld xmlns:a="http://schemas.openxmlformats.org/drawingml/2006/main" xmlns:r="http://schemas.openxmlformats.org/officeDocument/2006/relationships" xmlns:p="http://schemas.openxmlformats.org/presentationml/2006/main">
   <p:cSld>
     <p:spTree>
@@ -7634,15 +9712,7 @@
             </a:r>
             <a:r>
               <a:rPr lang="ru-RU" sz="1400" dirty="0"/>
-              <a:t>но в большинстве своем они лишь пытаются предотвратить коллизии. Мы же будем рассматривать стирание при коллизии, как стирания в </a:t>
-            </a:r>
-            <a:r>
-              <a:rPr lang="en-US" sz="1400" dirty="0"/>
-              <a:t>BEC</a:t>
-            </a:r>
-            <a:r>
-              <a:rPr lang="ru-RU" sz="1400" dirty="0"/>
-              <a:t>. А в таком случае мы можем попытаться их восстановить.</a:t>
+              <a:t>но в большинстве своем они лишь пытаются предотвратить коллизии. Мы же будем рассматривать стирание при коллизии, как стирания в двоичном канале со стираниями. А в таком случае мы можем попытаться их восстановить.</a:t>
             </a:r>
           </a:p>
         </p:txBody>
@@ -7660,7 +9730,7 @@
 </p:sld>
 </file>
 
-<file path=ppt/slides/slide7.xml><?xml version="1.0" encoding="utf-8"?>
+<file path=ppt/slides/slide8.xml><?xml version="1.0" encoding="utf-8"?>
 <p:sld xmlns:a="http://schemas.openxmlformats.org/drawingml/2006/main" xmlns:r="http://schemas.openxmlformats.org/officeDocument/2006/relationships" xmlns:p="http://schemas.openxmlformats.org/presentationml/2006/main">
   <p:cSld>
     <p:spTree>
@@ -7738,7 +9808,7 @@
                 </a:pPr>
                 <a:r>
                   <a:rPr lang="ru-RU" sz="1400" dirty="0"/>
-                  <a:t>Первым делом при выполнение работы необходимо было выбрать код, который будет использоваться для исправления стираний. Был рассмотрен класс кодов </a:t>
+                  <a:t>Сначала выберем код для исправления стираний. Был рассмотрен класс кодов </a:t>
                 </a:r>
                 <a:r>
                   <a:rPr lang="en-US" sz="1400" dirty="0"/>
@@ -7799,11 +9869,11 @@
                 </a14:m>
                 <a:r>
                   <a:rPr lang="en-US" sz="1400" dirty="0"/>
-                  <a:t>. </a:t>
+                  <a:t>.</a:t>
                 </a:r>
                 <a:r>
                   <a:rPr lang="ru-RU" sz="1400" dirty="0"/>
-                  <a:t>Проанализировав работы из смежных областей, выбор пал на код, с порождающей матрицей</a:t>
+                  <a:t> С учетом высоких требований к задержке и сложности декодирования был выбран код с порождающей матрицей</a:t>
                 </a:r>
                 <a:r>
                   <a:rPr lang="en-US" sz="1400" dirty="0"/>
@@ -8048,7 +10118,7 @@
                 <a:endParaRPr lang="en-US" sz="1400" dirty="0"/>
               </a:p>
               <a:p>
-                <a:pPr marL="88900" indent="0">
+                <a:pPr marL="88900" indent="0" algn="just">
                   <a:buNone/>
                 </a:pPr>
                 <a:r>
@@ -8165,18 +10235,6 @@
                       <a:rPr lang="en-US" sz="1400" b="0" i="1" smtClean="0">
                         <a:latin typeface="Cambria Math" panose="02040503050406030204" pitchFamily="18" charset="0"/>
                       </a:rPr>
-                      <m:t>=2, </m:t>
-                    </m:r>
-                    <m:r>
-                      <a:rPr lang="en-US" sz="1400" b="0" i="1" smtClean="0">
-                        <a:latin typeface="Cambria Math" panose="02040503050406030204" pitchFamily="18" charset="0"/>
-                      </a:rPr>
-                      <m:t>𝐿</m:t>
-                    </m:r>
-                    <m:r>
-                      <a:rPr lang="en-US" sz="1400" b="0" i="1" smtClean="0">
-                        <a:latin typeface="Cambria Math" panose="02040503050406030204" pitchFamily="18" charset="0"/>
-                      </a:rPr>
                       <m:t>=2.</m:t>
                     </m:r>
                   </m:oMath>
@@ -8253,7 +10311,7 @@
 </p:sld>
 </file>
 
-<file path=ppt/slides/slide8.xml><?xml version="1.0" encoding="utf-8"?>
+<file path=ppt/slides/slide9.xml><?xml version="1.0" encoding="utf-8"?>
 <p:sld xmlns:a="http://schemas.openxmlformats.org/drawingml/2006/main" xmlns:r="http://schemas.openxmlformats.org/officeDocument/2006/relationships" xmlns:p="http://schemas.openxmlformats.org/presentationml/2006/main">
   <p:cSld>
     <p:spTree>
@@ -8338,415 +10396,6 @@
     <p:extLst>
       <p:ext uri="{BB962C8B-B14F-4D97-AF65-F5344CB8AC3E}">
         <p14:creationId xmlns:p14="http://schemas.microsoft.com/office/powerpoint/2010/main" val="3853906877"/>
-      </p:ext>
-    </p:extLst>
-  </p:cSld>
-  <p:clrMapOvr>
-    <a:masterClrMapping/>
-  </p:clrMapOvr>
-</p:sld>
-</file>
-
-<file path=ppt/slides/slide9.xml><?xml version="1.0" encoding="utf-8"?>
-<p:sld xmlns:a="http://schemas.openxmlformats.org/drawingml/2006/main" xmlns:r="http://schemas.openxmlformats.org/officeDocument/2006/relationships" xmlns:p="http://schemas.openxmlformats.org/presentationml/2006/main">
-  <p:cSld>
-    <p:spTree>
-      <p:nvGrpSpPr>
-        <p:cNvPr id="1" name=""/>
-        <p:cNvGrpSpPr/>
-        <p:nvPr/>
-      </p:nvGrpSpPr>
-      <p:grpSpPr>
-        <a:xfrm>
-          <a:off x="0" y="0"/>
-          <a:ext cx="0" cy="0"/>
-          <a:chOff x="0" y="0"/>
-          <a:chExt cx="0" cy="0"/>
-        </a:xfrm>
-      </p:grpSpPr>
-      <p:sp>
-        <p:nvSpPr>
-          <p:cNvPr id="3" name="Заголовок 2">
-            <a:extLst>
-              <a:ext uri="{FF2B5EF4-FFF2-40B4-BE49-F238E27FC236}">
-                <a16:creationId xmlns:a16="http://schemas.microsoft.com/office/drawing/2014/main" id="{2EA2F471-E40C-44F2-BC0A-E5C9303433DD}"/>
-              </a:ext>
-            </a:extLst>
-          </p:cNvPr>
-          <p:cNvSpPr>
-            <a:spLocks noGrp="1"/>
-          </p:cNvSpPr>
-          <p:nvPr>
-            <p:ph type="title"/>
-          </p:nvPr>
-        </p:nvSpPr>
-        <p:spPr/>
-        <p:txBody>
-          <a:bodyPr/>
-          <a:lstStyle/>
-          <a:p>
-            <a:r>
-              <a:rPr lang="ru-RU" dirty="0"/>
-              <a:t>Декодирование</a:t>
-            </a:r>
-          </a:p>
-        </p:txBody>
-      </p:sp>
-      <mc:AlternateContent xmlns:mc="http://schemas.openxmlformats.org/markup-compatibility/2006">
-        <mc:Choice xmlns:a14="http://schemas.microsoft.com/office/drawing/2010/main" Requires="a14">
-          <p:sp>
-            <p:nvSpPr>
-              <p:cNvPr id="6" name="Текст 1">
-                <a:extLst>
-                  <a:ext uri="{FF2B5EF4-FFF2-40B4-BE49-F238E27FC236}">
-                    <a16:creationId xmlns:a16="http://schemas.microsoft.com/office/drawing/2014/main" id="{9642E377-5160-4F47-9FE8-3CB3FE08838C}"/>
-                  </a:ext>
-                </a:extLst>
-              </p:cNvPr>
-              <p:cNvSpPr>
-                <a:spLocks noGrp="1"/>
-              </p:cNvSpPr>
-              <p:nvPr>
-                <p:ph type="body" idx="1"/>
-              </p:nvPr>
-            </p:nvSpPr>
-            <p:spPr>
-              <a:xfrm>
-                <a:off x="313058" y="1394786"/>
-                <a:ext cx="8520416" cy="3195216"/>
-              </a:xfrm>
-            </p:spPr>
-            <p:txBody>
-              <a:bodyPr/>
-              <a:lstStyle/>
-              <a:p>
-                <a:pPr marL="88900" indent="0">
-                  <a:buNone/>
-                </a:pPr>
-                <a:r>
-                  <a:rPr lang="ru-RU" sz="1400" dirty="0"/>
-                  <a:t>Декодирование в двоичном канале со стираниями сводится к решению системы линейных уравнений. В итоге мы получаем сложность алгоритма равную </a:t>
-                </a:r>
-                <a14:m>
-                  <m:oMath xmlns:m="http://schemas.openxmlformats.org/officeDocument/2006/math">
-                    <m:r>
-                      <a:rPr lang="en-US" sz="1400" b="0" i="1" smtClean="0">
-                        <a:latin typeface="Cambria Math" panose="02040503050406030204" pitchFamily="18" charset="0"/>
-                      </a:rPr>
-                      <m:t>𝑂</m:t>
-                    </m:r>
-                    <m:d>
-                      <m:dPr>
-                        <m:ctrlPr>
-                          <a:rPr lang="en-US" sz="1400" b="0" i="1" smtClean="0">
-                            <a:latin typeface="Cambria Math" panose="02040503050406030204" pitchFamily="18" charset="0"/>
-                          </a:rPr>
-                        </m:ctrlPr>
-                      </m:dPr>
-                      <m:e>
-                        <m:sSup>
-                          <m:sSupPr>
-                            <m:ctrlPr>
-                              <a:rPr lang="en-US" sz="1400" b="0" i="1" smtClean="0">
-                                <a:latin typeface="Cambria Math" panose="02040503050406030204" pitchFamily="18" charset="0"/>
-                              </a:rPr>
-                            </m:ctrlPr>
-                          </m:sSupPr>
-                          <m:e>
-                            <m:r>
-                              <a:rPr lang="en-US" sz="1400" b="0" i="1" smtClean="0">
-                                <a:latin typeface="Cambria Math" panose="02040503050406030204" pitchFamily="18" charset="0"/>
-                              </a:rPr>
-                              <m:t>𝑣</m:t>
-                            </m:r>
-                          </m:e>
-                          <m:sup>
-                            <m:r>
-                              <a:rPr lang="en-US" sz="1400" b="0" i="1" smtClean="0">
-                                <a:latin typeface="Cambria Math" panose="02040503050406030204" pitchFamily="18" charset="0"/>
-                              </a:rPr>
-                              <m:t>3</m:t>
-                            </m:r>
-                          </m:sup>
-                        </m:sSup>
-                      </m:e>
-                    </m:d>
-                  </m:oMath>
-                </a14:m>
-                <a:r>
-                  <a:rPr lang="en-US" sz="1400" dirty="0"/>
-                  <a:t>, </a:t>
-                </a:r>
-                <a:r>
-                  <a:rPr lang="ru-RU" sz="1400" dirty="0"/>
-                  <a:t>что значительно лучше алгоритма </a:t>
-                </a:r>
-                <a:r>
-                  <a:rPr lang="ru-RU" sz="1400" dirty="0" err="1"/>
-                  <a:t>Витерби</a:t>
-                </a:r>
-                <a:r>
-                  <a:rPr lang="ru-RU" sz="1400" dirty="0"/>
-                  <a:t> для </a:t>
-                </a:r>
-                <a:r>
-                  <a:rPr lang="ru-RU" sz="1400" dirty="0" err="1"/>
-                  <a:t>сверточных</a:t>
-                </a:r>
-                <a:r>
-                  <a:rPr lang="ru-RU" sz="1400" dirty="0"/>
-                  <a:t> кодов. Для декодирования будет использоваться проверочная матрица .</a:t>
-                </a:r>
-              </a:p>
-              <a:p>
-                <a:pPr marL="88900" indent="0">
-                  <a:buNone/>
-                </a:pPr>
-                <a:endParaRPr lang="ru-RU" sz="1400" dirty="0"/>
-              </a:p>
-              <a:p>
-                <a:pPr marL="88900" indent="0">
-                  <a:buNone/>
-                </a:pPr>
-                <a14:m>
-                  <m:oMathPara xmlns:m="http://schemas.openxmlformats.org/officeDocument/2006/math">
-                    <m:oMathParaPr>
-                      <m:jc m:val="centerGroup"/>
-                    </m:oMathParaPr>
-                    <m:oMath xmlns:m="http://schemas.openxmlformats.org/officeDocument/2006/math">
-                      <m:r>
-                        <a:rPr lang="en-US" sz="1400" b="0" i="1" smtClean="0">
-                          <a:latin typeface="Cambria Math" panose="02040503050406030204" pitchFamily="18" charset="0"/>
-                        </a:rPr>
-                        <m:t>𝐻</m:t>
-                      </m:r>
-                      <m:r>
-                        <a:rPr lang="en-US" sz="1400" b="0" i="1" smtClean="0">
-                          <a:latin typeface="Cambria Math" panose="02040503050406030204" pitchFamily="18" charset="0"/>
-                        </a:rPr>
-                        <m:t>= </m:t>
-                      </m:r>
-                      <m:d>
-                        <m:dPr>
-                          <m:ctrlPr>
-                            <a:rPr lang="en-US" sz="1400" b="0" i="1" smtClean="0">
-                              <a:latin typeface="Cambria Math" panose="02040503050406030204" pitchFamily="18" charset="0"/>
-                            </a:rPr>
-                          </m:ctrlPr>
-                        </m:dPr>
-                        <m:e>
-                          <m:m>
-                            <m:mPr>
-                              <m:mcs>
-                                <m:mc>
-                                  <m:mcPr>
-                                    <m:count m:val="4"/>
-                                    <m:mcJc m:val="center"/>
-                                  </m:mcPr>
-                                </m:mc>
-                              </m:mcs>
-                              <m:ctrlPr>
-                                <a:rPr lang="en-US" sz="1400" b="0" i="1" smtClean="0">
-                                  <a:latin typeface="Cambria Math" panose="02040503050406030204" pitchFamily="18" charset="0"/>
-                                </a:rPr>
-                              </m:ctrlPr>
-                            </m:mPr>
-                            <m:mr>
-                              <m:e>
-                                <m:r>
-                                  <m:rPr>
-                                    <m:brk m:alnAt="7"/>
-                                  </m:rPr>
-                                  <a:rPr lang="en-US" sz="1400" b="0" i="1" smtClean="0">
-                                    <a:latin typeface="Cambria Math" panose="02040503050406030204" pitchFamily="18" charset="0"/>
-                                  </a:rPr>
-                                  <m:t>1</m:t>
-                                </m:r>
-                                <m:r>
-                                  <a:rPr lang="en-US" sz="1400" b="0" i="1" smtClean="0">
-                                    <a:latin typeface="Cambria Math" panose="02040503050406030204" pitchFamily="18" charset="0"/>
-                                  </a:rPr>
-                                  <m:t>+</m:t>
-                                </m:r>
-                                <m:r>
-                                  <a:rPr lang="en-US" sz="1400" b="0" i="1" smtClean="0">
-                                    <a:latin typeface="Cambria Math" panose="02040503050406030204" pitchFamily="18" charset="0"/>
-                                  </a:rPr>
-                                  <m:t>𝐷</m:t>
-                                </m:r>
-                                <m:r>
-                                  <a:rPr lang="en-US" sz="1400" b="0" i="1" smtClean="0">
-                                    <a:latin typeface="Cambria Math" panose="02040503050406030204" pitchFamily="18" charset="0"/>
-                                  </a:rPr>
-                                  <m:t>+</m:t>
-                                </m:r>
-                                <m:sSup>
-                                  <m:sSupPr>
-                                    <m:ctrlPr>
-                                      <a:rPr lang="en-US" sz="1400" b="0" i="1" smtClean="0">
-                                        <a:latin typeface="Cambria Math" panose="02040503050406030204" pitchFamily="18" charset="0"/>
-                                      </a:rPr>
-                                    </m:ctrlPr>
-                                  </m:sSupPr>
-                                  <m:e>
-                                    <m:r>
-                                      <a:rPr lang="en-US" sz="1400" b="0" i="1" smtClean="0">
-                                        <a:latin typeface="Cambria Math" panose="02040503050406030204" pitchFamily="18" charset="0"/>
-                                      </a:rPr>
-                                      <m:t>𝐷</m:t>
-                                    </m:r>
-                                  </m:e>
-                                  <m:sup>
-                                    <m:r>
-                                      <a:rPr lang="en-US" sz="1400" b="0" i="1" smtClean="0">
-                                        <a:latin typeface="Cambria Math" panose="02040503050406030204" pitchFamily="18" charset="0"/>
-                                      </a:rPr>
-                                      <m:t>2</m:t>
-                                    </m:r>
-                                  </m:sup>
-                                </m:sSup>
-                              </m:e>
-                              <m:e>
-                                <m:r>
-                                  <a:rPr lang="en-US" sz="1400" b="0" i="1" smtClean="0">
-                                    <a:latin typeface="Cambria Math" panose="02040503050406030204" pitchFamily="18" charset="0"/>
-                                  </a:rPr>
-                                  <m:t>1+</m:t>
-                                </m:r>
-                                <m:sSup>
-                                  <m:sSupPr>
-                                    <m:ctrlPr>
-                                      <a:rPr lang="en-US" sz="1400" b="0" i="1" smtClean="0">
-                                        <a:latin typeface="Cambria Math" panose="02040503050406030204" pitchFamily="18" charset="0"/>
-                                      </a:rPr>
-                                    </m:ctrlPr>
-                                  </m:sSupPr>
-                                  <m:e>
-                                    <m:r>
-                                      <a:rPr lang="en-US" sz="1400" b="0" i="1" smtClean="0">
-                                        <a:latin typeface="Cambria Math" panose="02040503050406030204" pitchFamily="18" charset="0"/>
-                                      </a:rPr>
-                                      <m:t>𝐷</m:t>
-                                    </m:r>
-                                  </m:e>
-                                  <m:sup>
-                                    <m:r>
-                                      <a:rPr lang="en-US" sz="1400" b="0" i="1" smtClean="0">
-                                        <a:latin typeface="Cambria Math" panose="02040503050406030204" pitchFamily="18" charset="0"/>
-                                      </a:rPr>
-                                      <m:t>2</m:t>
-                                    </m:r>
-                                  </m:sup>
-                                </m:sSup>
-                              </m:e>
-                              <m:e>
-                                <m:r>
-                                  <a:rPr lang="en-US" sz="1400" b="0" i="1" smtClean="0">
-                                    <a:latin typeface="Cambria Math" panose="02040503050406030204" pitchFamily="18" charset="0"/>
-                                  </a:rPr>
-                                  <m:t>1+</m:t>
-                                </m:r>
-                                <m:r>
-                                  <a:rPr lang="en-US" sz="1400" b="0" i="1" smtClean="0">
-                                    <a:latin typeface="Cambria Math" panose="02040503050406030204" pitchFamily="18" charset="0"/>
-                                  </a:rPr>
-                                  <m:t>𝐷</m:t>
-                                </m:r>
-                              </m:e>
-                              <m:e>
-                                <m:r>
-                                  <a:rPr lang="en-US" sz="1400" b="0" i="1" smtClean="0">
-                                    <a:latin typeface="Cambria Math" panose="02040503050406030204" pitchFamily="18" charset="0"/>
-                                  </a:rPr>
-                                  <m:t>1</m:t>
-                                </m:r>
-                              </m:e>
-                            </m:mr>
-                          </m:m>
-                        </m:e>
-                      </m:d>
-                    </m:oMath>
-                  </m:oMathPara>
-                </a14:m>
-                <a:endParaRPr lang="en-US" sz="1400" dirty="0"/>
-              </a:p>
-              <a:p>
-                <a:pPr marL="88900" indent="0">
-                  <a:buNone/>
-                </a:pPr>
-                <a:r>
-                  <a:rPr lang="ru-RU" sz="1400" dirty="0"/>
-                  <a:t>Разложив эту матрицу по степеням </a:t>
-                </a:r>
-                <a:r>
-                  <a:rPr lang="en-US" sz="1400" dirty="0"/>
-                  <a:t>D, </a:t>
-                </a:r>
-                <a:r>
-                  <a:rPr lang="ru-RU" sz="1400" dirty="0"/>
-                  <a:t>получим </a:t>
-                </a:r>
-                <a:r>
-                  <a:rPr lang="ru-RU" sz="1400" dirty="0" err="1"/>
-                  <a:t>полубесконечную</a:t>
-                </a:r>
-                <a:r>
-                  <a:rPr lang="ru-RU" sz="1400" dirty="0"/>
-                  <a:t> матрицу, из которой мы возьмем только определенную подматрицу, использующуюся в процессе декодирования.</a:t>
-                </a:r>
-                <a:endParaRPr lang="en-US" sz="1400" dirty="0"/>
-              </a:p>
-            </p:txBody>
-          </p:sp>
-        </mc:Choice>
-        <mc:Fallback>
-          <p:sp>
-            <p:nvSpPr>
-              <p:cNvPr id="6" name="Текст 1">
-                <a:extLst>
-                  <a:ext uri="{FF2B5EF4-FFF2-40B4-BE49-F238E27FC236}">
-                    <a16:creationId xmlns:a16="http://schemas.microsoft.com/office/drawing/2014/main" id="{9642E377-5160-4F47-9FE8-3CB3FE08838C}"/>
-                  </a:ext>
-                </a:extLst>
-              </p:cNvPr>
-              <p:cNvSpPr>
-                <a:spLocks noGrp="1" noRot="1" noChangeAspect="1" noMove="1" noResize="1" noEditPoints="1" noAdjustHandles="1" noChangeArrowheads="1" noChangeShapeType="1" noTextEdit="1"/>
-              </p:cNvSpPr>
-              <p:nvPr>
-                <p:ph type="body" idx="1"/>
-              </p:nvPr>
-            </p:nvSpPr>
-            <p:spPr>
-              <a:xfrm>
-                <a:off x="313058" y="1394786"/>
-                <a:ext cx="8520416" cy="3195216"/>
-              </a:xfrm>
-              <a:blipFill>
-                <a:blip r:embed="rId2"/>
-                <a:stretch>
-                  <a:fillRect r="-143"/>
-                </a:stretch>
-              </a:blipFill>
-            </p:spPr>
-            <p:txBody>
-              <a:bodyPr/>
-              <a:lstStyle/>
-              <a:p>
-                <a:r>
-                  <a:rPr lang="ru-RU">
-                    <a:noFill/>
-                  </a:rPr>
-                  <a:t> </a:t>
-                </a:r>
-              </a:p>
-            </p:txBody>
-          </p:sp>
-        </mc:Fallback>
-      </mc:AlternateContent>
-    </p:spTree>
-    <p:extLst>
-      <p:ext uri="{BB962C8B-B14F-4D97-AF65-F5344CB8AC3E}">
-        <p14:creationId xmlns:p14="http://schemas.microsoft.com/office/powerpoint/2010/main" val="2792312960"/>
       </p:ext>
     </p:extLst>
   </p:cSld>

</xml_diff>